<commit_message>
# Agregadas algunas partes de la clase muy básicas
</commit_message>
<xml_diff>
--- a/Slides/Clase.pptx
+++ b/Slides/Clase.pptx
@@ -9,8 +9,23 @@
     <p:sldId id="258" r:id="rId3"/>
     <p:sldId id="260" r:id="rId4"/>
     <p:sldId id="257" r:id="rId5"/>
-    <p:sldId id="259" r:id="rId6"/>
-    <p:sldId id="261" r:id="rId7"/>
+    <p:sldId id="262" r:id="rId6"/>
+    <p:sldId id="263" r:id="rId7"/>
+    <p:sldId id="265" r:id="rId8"/>
+    <p:sldId id="267" r:id="rId9"/>
+    <p:sldId id="264" r:id="rId10"/>
+    <p:sldId id="266" r:id="rId11"/>
+    <p:sldId id="268" r:id="rId12"/>
+    <p:sldId id="269" r:id="rId13"/>
+    <p:sldId id="270" r:id="rId14"/>
+    <p:sldId id="271" r:id="rId15"/>
+    <p:sldId id="272" r:id="rId16"/>
+    <p:sldId id="274" r:id="rId17"/>
+    <p:sldId id="273" r:id="rId18"/>
+    <p:sldId id="275" r:id="rId19"/>
+    <p:sldId id="276" r:id="rId20"/>
+    <p:sldId id="259" r:id="rId21"/>
+    <p:sldId id="261" r:id="rId22"/>
   </p:sldIdLst>
   <p:sldSz cx="12192000" cy="6858000"/>
   <p:notesSz cx="6858000" cy="9144000"/>
@@ -109,6 +124,11 @@
       </a:defRPr>
     </a:lvl9pPr>
   </p:defaultTextStyle>
+  <p:extLst>
+    <p:ext uri="{EFAFB233-063F-42B5-8137-9DF3F51BA10A}">
+      <p15:sldGuideLst xmlns:p15="http://schemas.microsoft.com/office/powerpoint/2012/main"/>
+    </p:ext>
+  </p:extLst>
 </p:presentation>
 </file>
 
@@ -243,7 +263,7 @@
           <a:p>
             <a:fld id="{8C91A079-CAE8-47E0-8427-4BEC14467E6E}" type="datetimeFigureOut">
               <a:rPr lang="en-US" smtClean="0"/>
-              <a:t>5/27/2013</a:t>
+              <a:t>6/2/2013</a:t>
             </a:fld>
             <a:endParaRPr lang="en-US"/>
           </a:p>
@@ -413,7 +433,7 @@
           <a:p>
             <a:fld id="{8C91A079-CAE8-47E0-8427-4BEC14467E6E}" type="datetimeFigureOut">
               <a:rPr lang="en-US" smtClean="0"/>
-              <a:t>5/27/2013</a:t>
+              <a:t>6/2/2013</a:t>
             </a:fld>
             <a:endParaRPr lang="en-US"/>
           </a:p>
@@ -593,7 +613,7 @@
           <a:p>
             <a:fld id="{8C91A079-CAE8-47E0-8427-4BEC14467E6E}" type="datetimeFigureOut">
               <a:rPr lang="en-US" smtClean="0"/>
-              <a:t>5/27/2013</a:t>
+              <a:t>6/2/2013</a:t>
             </a:fld>
             <a:endParaRPr lang="en-US"/>
           </a:p>
@@ -763,7 +783,7 @@
           <a:p>
             <a:fld id="{8C91A079-CAE8-47E0-8427-4BEC14467E6E}" type="datetimeFigureOut">
               <a:rPr lang="en-US" smtClean="0"/>
-              <a:t>5/27/2013</a:t>
+              <a:t>6/2/2013</a:t>
             </a:fld>
             <a:endParaRPr lang="en-US"/>
           </a:p>
@@ -1009,7 +1029,7 @@
           <a:p>
             <a:fld id="{8C91A079-CAE8-47E0-8427-4BEC14467E6E}" type="datetimeFigureOut">
               <a:rPr lang="en-US" smtClean="0"/>
-              <a:t>5/27/2013</a:t>
+              <a:t>6/2/2013</a:t>
             </a:fld>
             <a:endParaRPr lang="en-US"/>
           </a:p>
@@ -1241,7 +1261,7 @@
           <a:p>
             <a:fld id="{8C91A079-CAE8-47E0-8427-4BEC14467E6E}" type="datetimeFigureOut">
               <a:rPr lang="en-US" smtClean="0"/>
-              <a:t>5/27/2013</a:t>
+              <a:t>6/2/2013</a:t>
             </a:fld>
             <a:endParaRPr lang="en-US"/>
           </a:p>
@@ -1608,7 +1628,7 @@
           <a:p>
             <a:fld id="{8C91A079-CAE8-47E0-8427-4BEC14467E6E}" type="datetimeFigureOut">
               <a:rPr lang="en-US" smtClean="0"/>
-              <a:t>5/27/2013</a:t>
+              <a:t>6/2/2013</a:t>
             </a:fld>
             <a:endParaRPr lang="en-US"/>
           </a:p>
@@ -1726,7 +1746,7 @@
           <a:p>
             <a:fld id="{8C91A079-CAE8-47E0-8427-4BEC14467E6E}" type="datetimeFigureOut">
               <a:rPr lang="en-US" smtClean="0"/>
-              <a:t>5/27/2013</a:t>
+              <a:t>6/2/2013</a:t>
             </a:fld>
             <a:endParaRPr lang="en-US"/>
           </a:p>
@@ -1821,7 +1841,7 @@
           <a:p>
             <a:fld id="{8C91A079-CAE8-47E0-8427-4BEC14467E6E}" type="datetimeFigureOut">
               <a:rPr lang="en-US" smtClean="0"/>
-              <a:t>5/27/2013</a:t>
+              <a:t>6/2/2013</a:t>
             </a:fld>
             <a:endParaRPr lang="en-US"/>
           </a:p>
@@ -2098,7 +2118,7 @@
           <a:p>
             <a:fld id="{8C91A079-CAE8-47E0-8427-4BEC14467E6E}" type="datetimeFigureOut">
               <a:rPr lang="en-US" smtClean="0"/>
-              <a:t>5/27/2013</a:t>
+              <a:t>6/2/2013</a:t>
             </a:fld>
             <a:endParaRPr lang="en-US"/>
           </a:p>
@@ -2351,7 +2371,7 @@
           <a:p>
             <a:fld id="{8C91A079-CAE8-47E0-8427-4BEC14467E6E}" type="datetimeFigureOut">
               <a:rPr lang="en-US" smtClean="0"/>
-              <a:t>5/27/2013</a:t>
+              <a:t>6/2/2013</a:t>
             </a:fld>
             <a:endParaRPr lang="en-US"/>
           </a:p>
@@ -2564,7 +2584,7 @@
           <a:p>
             <a:fld id="{8C91A079-CAE8-47E0-8427-4BEC14467E6E}" type="datetimeFigureOut">
               <a:rPr lang="en-US" smtClean="0"/>
-              <a:t>5/27/2013</a:t>
+              <a:t>6/2/2013</a:t>
             </a:fld>
             <a:endParaRPr lang="en-US"/>
           </a:p>
@@ -3028,6 +3048,1313 @@
 </p:sld>
 </file>
 
+<file path=ppt/slides/slide10.xml><?xml version="1.0" encoding="utf-8"?>
+<p:sld xmlns:a="http://schemas.openxmlformats.org/drawingml/2006/main" xmlns:r="http://schemas.openxmlformats.org/officeDocument/2006/relationships" xmlns:p="http://schemas.openxmlformats.org/presentationml/2006/main">
+  <p:cSld>
+    <p:spTree>
+      <p:nvGrpSpPr>
+        <p:cNvPr id="1" name=""/>
+        <p:cNvGrpSpPr/>
+        <p:nvPr/>
+      </p:nvGrpSpPr>
+      <p:grpSpPr>
+        <a:xfrm>
+          <a:off x="0" y="0"/>
+          <a:ext cx="0" cy="0"/>
+          <a:chOff x="0" y="0"/>
+          <a:chExt cx="0" cy="0"/>
+        </a:xfrm>
+      </p:grpSpPr>
+      <p:sp>
+        <p:nvSpPr>
+          <p:cNvPr id="2" name="Title 1"/>
+          <p:cNvSpPr>
+            <a:spLocks noGrp="1"/>
+          </p:cNvSpPr>
+          <p:nvPr>
+            <p:ph type="title"/>
+          </p:nvPr>
+        </p:nvSpPr>
+        <p:spPr/>
+        <p:txBody>
+          <a:bodyPr/>
+          <a:lstStyle/>
+          <a:p>
+            <a:r>
+              <a:rPr lang="es-ES_tradnl" dirty="0" smtClean="0"/>
+              <a:t>Elementos básicos Head</a:t>
+            </a:r>
+            <a:endParaRPr lang="en-US" dirty="0"/>
+          </a:p>
+        </p:txBody>
+      </p:sp>
+      <p:sp>
+        <p:nvSpPr>
+          <p:cNvPr id="3" name="Content Placeholder 2"/>
+          <p:cNvSpPr>
+            <a:spLocks noGrp="1"/>
+          </p:cNvSpPr>
+          <p:nvPr>
+            <p:ph idx="1"/>
+          </p:nvPr>
+        </p:nvSpPr>
+        <p:spPr/>
+        <p:txBody>
+          <a:bodyPr/>
+          <a:lstStyle/>
+          <a:p>
+            <a:r>
+              <a:rPr lang="es-ES_tradnl" dirty="0" smtClean="0"/>
+              <a:t>&lt;</a:t>
+            </a:r>
+            <a:r>
+              <a:rPr lang="es-ES_tradnl" dirty="0" err="1"/>
+              <a:t>t</a:t>
+            </a:r>
+            <a:r>
+              <a:rPr lang="es-ES_tradnl" dirty="0" err="1" smtClean="0"/>
+              <a:t>itle</a:t>
+            </a:r>
+            <a:r>
+              <a:rPr lang="es-ES_tradnl" dirty="0" smtClean="0"/>
+              <a:t>&gt;</a:t>
+            </a:r>
+          </a:p>
+          <a:p>
+            <a:r>
+              <a:rPr lang="es-ES_tradnl" dirty="0" smtClean="0"/>
+              <a:t>&lt;meta&gt;</a:t>
+            </a:r>
+          </a:p>
+          <a:p>
+            <a:r>
+              <a:rPr lang="es-ES_tradnl" dirty="0" smtClean="0"/>
+              <a:t>&lt;link&gt;</a:t>
+            </a:r>
+          </a:p>
+          <a:p>
+            <a:r>
+              <a:rPr lang="es-ES_tradnl" dirty="0" smtClean="0"/>
+              <a:t>&lt;script&gt;</a:t>
+            </a:r>
+          </a:p>
+          <a:p>
+            <a:r>
+              <a:rPr lang="es-ES_tradnl" dirty="0" smtClean="0"/>
+              <a:t>&lt;</a:t>
+            </a:r>
+            <a:r>
+              <a:rPr lang="es-ES_tradnl" dirty="0" err="1" smtClean="0"/>
+              <a:t>style</a:t>
+            </a:r>
+            <a:r>
+              <a:rPr lang="es-ES_tradnl" dirty="0" smtClean="0"/>
+              <a:t>&gt;</a:t>
+            </a:r>
+            <a:endParaRPr lang="en-US" dirty="0"/>
+          </a:p>
+        </p:txBody>
+      </p:sp>
+    </p:spTree>
+    <p:extLst>
+      <p:ext uri="{BB962C8B-B14F-4D97-AF65-F5344CB8AC3E}">
+        <p14:creationId xmlns:p14="http://schemas.microsoft.com/office/powerpoint/2010/main" val="202465279"/>
+      </p:ext>
+    </p:extLst>
+  </p:cSld>
+  <p:clrMapOvr>
+    <a:masterClrMapping/>
+  </p:clrMapOvr>
+</p:sld>
+</file>
+
+<file path=ppt/slides/slide11.xml><?xml version="1.0" encoding="utf-8"?>
+<p:sld xmlns:a="http://schemas.openxmlformats.org/drawingml/2006/main" xmlns:r="http://schemas.openxmlformats.org/officeDocument/2006/relationships" xmlns:p="http://schemas.openxmlformats.org/presentationml/2006/main">
+  <p:cSld>
+    <p:spTree>
+      <p:nvGrpSpPr>
+        <p:cNvPr id="1" name=""/>
+        <p:cNvGrpSpPr/>
+        <p:nvPr/>
+      </p:nvGrpSpPr>
+      <p:grpSpPr>
+        <a:xfrm>
+          <a:off x="0" y="0"/>
+          <a:ext cx="0" cy="0"/>
+          <a:chOff x="0" y="0"/>
+          <a:chExt cx="0" cy="0"/>
+        </a:xfrm>
+      </p:grpSpPr>
+      <p:sp>
+        <p:nvSpPr>
+          <p:cNvPr id="2" name="Title 1"/>
+          <p:cNvSpPr>
+            <a:spLocks noGrp="1"/>
+          </p:cNvSpPr>
+          <p:nvPr>
+            <p:ph type="title"/>
+          </p:nvPr>
+        </p:nvSpPr>
+        <p:spPr/>
+        <p:txBody>
+          <a:bodyPr/>
+          <a:lstStyle/>
+          <a:p>
+            <a:r>
+              <a:rPr lang="es-ES_tradnl" dirty="0" smtClean="0"/>
+              <a:t>HTML 5</a:t>
+            </a:r>
+            <a:endParaRPr lang="en-US" dirty="0"/>
+          </a:p>
+        </p:txBody>
+      </p:sp>
+      <p:sp>
+        <p:nvSpPr>
+          <p:cNvPr id="3" name="Content Placeholder 2"/>
+          <p:cNvSpPr>
+            <a:spLocks noGrp="1"/>
+          </p:cNvSpPr>
+          <p:nvPr>
+            <p:ph idx="1"/>
+          </p:nvPr>
+        </p:nvSpPr>
+        <p:spPr/>
+        <p:txBody>
+          <a:bodyPr/>
+          <a:lstStyle/>
+          <a:p>
+            <a:endParaRPr lang="en-US" dirty="0"/>
+          </a:p>
+        </p:txBody>
+      </p:sp>
+    </p:spTree>
+    <p:extLst>
+      <p:ext uri="{BB962C8B-B14F-4D97-AF65-F5344CB8AC3E}">
+        <p14:creationId xmlns:p14="http://schemas.microsoft.com/office/powerpoint/2010/main" val="1199194102"/>
+      </p:ext>
+    </p:extLst>
+  </p:cSld>
+  <p:clrMapOvr>
+    <a:masterClrMapping/>
+  </p:clrMapOvr>
+</p:sld>
+</file>
+
+<file path=ppt/slides/slide12.xml><?xml version="1.0" encoding="utf-8"?>
+<p:sld xmlns:a="http://schemas.openxmlformats.org/drawingml/2006/main" xmlns:r="http://schemas.openxmlformats.org/officeDocument/2006/relationships" xmlns:p="http://schemas.openxmlformats.org/presentationml/2006/main">
+  <p:cSld>
+    <p:spTree>
+      <p:nvGrpSpPr>
+        <p:cNvPr id="1" name=""/>
+        <p:cNvGrpSpPr/>
+        <p:nvPr/>
+      </p:nvGrpSpPr>
+      <p:grpSpPr>
+        <a:xfrm>
+          <a:off x="0" y="0"/>
+          <a:ext cx="0" cy="0"/>
+          <a:chOff x="0" y="0"/>
+          <a:chExt cx="0" cy="0"/>
+        </a:xfrm>
+      </p:grpSpPr>
+      <p:sp>
+        <p:nvSpPr>
+          <p:cNvPr id="2" name="Title 1"/>
+          <p:cNvSpPr>
+            <a:spLocks noGrp="1"/>
+          </p:cNvSpPr>
+          <p:nvPr>
+            <p:ph type="title"/>
+          </p:nvPr>
+        </p:nvSpPr>
+        <p:spPr/>
+        <p:txBody>
+          <a:bodyPr/>
+          <a:lstStyle/>
+          <a:p>
+            <a:r>
+              <a:rPr lang="es-ES_tradnl" dirty="0" smtClean="0"/>
+              <a:t>Nuevos </a:t>
+            </a:r>
+            <a:r>
+              <a:rPr lang="es-ES_tradnl" dirty="0" err="1" smtClean="0"/>
+              <a:t>Tags</a:t>
+            </a:r>
+            <a:r>
+              <a:rPr lang="es-ES_tradnl" dirty="0" smtClean="0"/>
+              <a:t> (media)</a:t>
+            </a:r>
+            <a:endParaRPr lang="en-US" dirty="0"/>
+          </a:p>
+        </p:txBody>
+      </p:sp>
+      <p:sp>
+        <p:nvSpPr>
+          <p:cNvPr id="3" name="Content Placeholder 2"/>
+          <p:cNvSpPr>
+            <a:spLocks noGrp="1"/>
+          </p:cNvSpPr>
+          <p:nvPr>
+            <p:ph idx="1"/>
+          </p:nvPr>
+        </p:nvSpPr>
+        <p:spPr/>
+        <p:txBody>
+          <a:bodyPr/>
+          <a:lstStyle/>
+          <a:p>
+            <a:r>
+              <a:rPr lang="es-ES_tradnl" dirty="0" smtClean="0"/>
+              <a:t>&lt;audio&gt;</a:t>
+            </a:r>
+          </a:p>
+          <a:p>
+            <a:r>
+              <a:rPr lang="es-ES_tradnl" dirty="0" smtClean="0"/>
+              <a:t>&lt;video&gt;</a:t>
+            </a:r>
+          </a:p>
+          <a:p>
+            <a:r>
+              <a:rPr lang="es-ES_tradnl" dirty="0" smtClean="0"/>
+              <a:t>&lt;</a:t>
+            </a:r>
+            <a:r>
+              <a:rPr lang="es-ES_tradnl" dirty="0" err="1" smtClean="0"/>
+              <a:t>canvas</a:t>
+            </a:r>
+            <a:r>
+              <a:rPr lang="es-ES_tradnl" dirty="0" smtClean="0"/>
+              <a:t>&gt;</a:t>
+            </a:r>
+            <a:endParaRPr lang="en-US" dirty="0"/>
+          </a:p>
+        </p:txBody>
+      </p:sp>
+    </p:spTree>
+    <p:extLst>
+      <p:ext uri="{BB962C8B-B14F-4D97-AF65-F5344CB8AC3E}">
+        <p14:creationId xmlns:p14="http://schemas.microsoft.com/office/powerpoint/2010/main" val="2125965985"/>
+      </p:ext>
+    </p:extLst>
+  </p:cSld>
+  <p:clrMapOvr>
+    <a:masterClrMapping/>
+  </p:clrMapOvr>
+</p:sld>
+</file>
+
+<file path=ppt/slides/slide13.xml><?xml version="1.0" encoding="utf-8"?>
+<p:sld xmlns:a="http://schemas.openxmlformats.org/drawingml/2006/main" xmlns:r="http://schemas.openxmlformats.org/officeDocument/2006/relationships" xmlns:p="http://schemas.openxmlformats.org/presentationml/2006/main">
+  <p:cSld>
+    <p:spTree>
+      <p:nvGrpSpPr>
+        <p:cNvPr id="1" name=""/>
+        <p:cNvGrpSpPr/>
+        <p:nvPr/>
+      </p:nvGrpSpPr>
+      <p:grpSpPr>
+        <a:xfrm>
+          <a:off x="0" y="0"/>
+          <a:ext cx="0" cy="0"/>
+          <a:chOff x="0" y="0"/>
+          <a:chExt cx="0" cy="0"/>
+        </a:xfrm>
+      </p:grpSpPr>
+      <p:sp>
+        <p:nvSpPr>
+          <p:cNvPr id="2" name="Title 1"/>
+          <p:cNvSpPr>
+            <a:spLocks noGrp="1"/>
+          </p:cNvSpPr>
+          <p:nvPr>
+            <p:ph type="title"/>
+          </p:nvPr>
+        </p:nvSpPr>
+        <p:spPr/>
+        <p:txBody>
+          <a:bodyPr/>
+          <a:lstStyle/>
+          <a:p>
+            <a:r>
+              <a:rPr lang="es-ES_tradnl" dirty="0" smtClean="0"/>
+              <a:t>Nuevos </a:t>
+            </a:r>
+            <a:r>
+              <a:rPr lang="es-ES_tradnl" dirty="0" err="1" smtClean="0"/>
+              <a:t>tags</a:t>
+            </a:r>
+            <a:r>
+              <a:rPr lang="es-ES_tradnl" dirty="0" smtClean="0"/>
+              <a:t> (estructurales)</a:t>
+            </a:r>
+            <a:endParaRPr lang="en-US" dirty="0"/>
+          </a:p>
+        </p:txBody>
+      </p:sp>
+      <p:sp>
+        <p:nvSpPr>
+          <p:cNvPr id="3" name="Content Placeholder 2"/>
+          <p:cNvSpPr>
+            <a:spLocks noGrp="1"/>
+          </p:cNvSpPr>
+          <p:nvPr>
+            <p:ph idx="1"/>
+          </p:nvPr>
+        </p:nvSpPr>
+        <p:spPr/>
+        <p:txBody>
+          <a:bodyPr/>
+          <a:lstStyle/>
+          <a:p>
+            <a:r>
+              <a:rPr lang="es-ES_tradnl" dirty="0" smtClean="0"/>
+              <a:t>&lt;</a:t>
+            </a:r>
+            <a:r>
+              <a:rPr lang="es-ES_tradnl" dirty="0" err="1" smtClean="0"/>
+              <a:t>header</a:t>
+            </a:r>
+            <a:r>
+              <a:rPr lang="es-ES_tradnl" dirty="0" smtClean="0"/>
+              <a:t>&gt; </a:t>
+            </a:r>
+            <a:r>
+              <a:rPr lang="es-ES_tradnl" dirty="0" smtClean="0">
+                <a:sym typeface="Wingdings" panose="05000000000000000000" pitchFamily="2" charset="2"/>
+              </a:rPr>
+              <a:t> encabezado</a:t>
+            </a:r>
+            <a:endParaRPr lang="es-ES_tradnl" dirty="0" smtClean="0"/>
+          </a:p>
+          <a:p>
+            <a:r>
+              <a:rPr lang="es-ES_tradnl" dirty="0" smtClean="0"/>
+              <a:t>&lt;</a:t>
+            </a:r>
+            <a:r>
+              <a:rPr lang="es-ES_tradnl" dirty="0" err="1" smtClean="0"/>
+              <a:t>aside</a:t>
+            </a:r>
+            <a:r>
+              <a:rPr lang="es-ES_tradnl" dirty="0" smtClean="0"/>
+              <a:t>&gt; </a:t>
+            </a:r>
+            <a:r>
+              <a:rPr lang="es-ES_tradnl" dirty="0" smtClean="0">
+                <a:sym typeface="Wingdings" panose="05000000000000000000" pitchFamily="2" charset="2"/>
+              </a:rPr>
+              <a:t> </a:t>
+            </a:r>
+            <a:r>
+              <a:rPr lang="es-ES_tradnl" dirty="0" err="1" smtClean="0">
+                <a:sym typeface="Wingdings" panose="05000000000000000000" pitchFamily="2" charset="2"/>
+              </a:rPr>
+              <a:t>info</a:t>
+            </a:r>
+            <a:r>
+              <a:rPr lang="es-ES_tradnl" dirty="0" smtClean="0">
+                <a:sym typeface="Wingdings" panose="05000000000000000000" pitchFamily="2" charset="2"/>
+              </a:rPr>
+              <a:t> complementaria / </a:t>
+            </a:r>
+            <a:r>
+              <a:rPr lang="es-ES_tradnl" dirty="0" err="1" smtClean="0">
+                <a:sym typeface="Wingdings" panose="05000000000000000000" pitchFamily="2" charset="2"/>
+              </a:rPr>
+              <a:t>sidebar</a:t>
+            </a:r>
+            <a:endParaRPr lang="es-ES_tradnl" dirty="0" smtClean="0"/>
+          </a:p>
+          <a:p>
+            <a:r>
+              <a:rPr lang="es-ES_tradnl" dirty="0" smtClean="0"/>
+              <a:t>&lt;</a:t>
+            </a:r>
+            <a:r>
+              <a:rPr lang="es-ES_tradnl" dirty="0" err="1" smtClean="0"/>
+              <a:t>footer</a:t>
+            </a:r>
+            <a:r>
+              <a:rPr lang="es-ES_tradnl" dirty="0" smtClean="0"/>
+              <a:t>&gt; </a:t>
+            </a:r>
+            <a:r>
+              <a:rPr lang="es-ES_tradnl" dirty="0" smtClean="0">
+                <a:sym typeface="Wingdings" panose="05000000000000000000" pitchFamily="2" charset="2"/>
+              </a:rPr>
+              <a:t> pie de página</a:t>
+            </a:r>
+            <a:endParaRPr lang="es-ES_tradnl" dirty="0" smtClean="0"/>
+          </a:p>
+          <a:p>
+            <a:r>
+              <a:rPr lang="es-ES_tradnl" dirty="0" smtClean="0"/>
+              <a:t>&lt;</a:t>
+            </a:r>
+            <a:r>
+              <a:rPr lang="es-ES_tradnl" dirty="0" err="1" smtClean="0"/>
+              <a:t>hgroup</a:t>
+            </a:r>
+            <a:r>
+              <a:rPr lang="es-ES_tradnl" dirty="0" smtClean="0"/>
+              <a:t>&gt; </a:t>
+            </a:r>
+            <a:r>
+              <a:rPr lang="es-ES_tradnl" dirty="0" smtClean="0">
+                <a:sym typeface="Wingdings" panose="05000000000000000000" pitchFamily="2" charset="2"/>
+              </a:rPr>
+              <a:t> grupo de encabezados</a:t>
+            </a:r>
+            <a:endParaRPr lang="es-ES_tradnl" dirty="0" smtClean="0"/>
+          </a:p>
+          <a:p>
+            <a:r>
+              <a:rPr lang="es-ES_tradnl" dirty="0" smtClean="0"/>
+              <a:t>&lt;</a:t>
+            </a:r>
+            <a:r>
+              <a:rPr lang="es-ES_tradnl" dirty="0" err="1" smtClean="0"/>
+              <a:t>nav</a:t>
+            </a:r>
+            <a:r>
+              <a:rPr lang="es-ES_tradnl" dirty="0" smtClean="0"/>
+              <a:t>&gt; </a:t>
+            </a:r>
+            <a:r>
+              <a:rPr lang="es-ES_tradnl" dirty="0" smtClean="0">
+                <a:sym typeface="Wingdings" panose="05000000000000000000" pitchFamily="2" charset="2"/>
+              </a:rPr>
+              <a:t> menú de navegación</a:t>
+            </a:r>
+            <a:endParaRPr lang="en-US" dirty="0" smtClean="0"/>
+          </a:p>
+        </p:txBody>
+      </p:sp>
+    </p:spTree>
+    <p:extLst>
+      <p:ext uri="{BB962C8B-B14F-4D97-AF65-F5344CB8AC3E}">
+        <p14:creationId xmlns:p14="http://schemas.microsoft.com/office/powerpoint/2010/main" val="3014043091"/>
+      </p:ext>
+    </p:extLst>
+  </p:cSld>
+  <p:clrMapOvr>
+    <a:masterClrMapping/>
+  </p:clrMapOvr>
+</p:sld>
+</file>
+
+<file path=ppt/slides/slide14.xml><?xml version="1.0" encoding="utf-8"?>
+<p:sld xmlns:a="http://schemas.openxmlformats.org/drawingml/2006/main" xmlns:r="http://schemas.openxmlformats.org/officeDocument/2006/relationships" xmlns:p="http://schemas.openxmlformats.org/presentationml/2006/main">
+  <p:cSld>
+    <p:spTree>
+      <p:nvGrpSpPr>
+        <p:cNvPr id="1" name=""/>
+        <p:cNvGrpSpPr/>
+        <p:nvPr/>
+      </p:nvGrpSpPr>
+      <p:grpSpPr>
+        <a:xfrm>
+          <a:off x="0" y="0"/>
+          <a:ext cx="0" cy="0"/>
+          <a:chOff x="0" y="0"/>
+          <a:chExt cx="0" cy="0"/>
+        </a:xfrm>
+      </p:grpSpPr>
+      <p:sp>
+        <p:nvSpPr>
+          <p:cNvPr id="2" name="Title 1"/>
+          <p:cNvSpPr>
+            <a:spLocks noGrp="1"/>
+          </p:cNvSpPr>
+          <p:nvPr>
+            <p:ph type="title"/>
+          </p:nvPr>
+        </p:nvSpPr>
+        <p:spPr/>
+        <p:txBody>
+          <a:bodyPr/>
+          <a:lstStyle/>
+          <a:p>
+            <a:r>
+              <a:rPr lang="es-ES_tradnl" dirty="0" smtClean="0"/>
+              <a:t>Nuevos </a:t>
+            </a:r>
+            <a:r>
+              <a:rPr lang="es-ES_tradnl" dirty="0" err="1" smtClean="0"/>
+              <a:t>tags</a:t>
+            </a:r>
+            <a:r>
+              <a:rPr lang="es-ES_tradnl" dirty="0" smtClean="0"/>
+              <a:t> (semánticos)</a:t>
+            </a:r>
+            <a:endParaRPr lang="en-US" dirty="0"/>
+          </a:p>
+        </p:txBody>
+      </p:sp>
+      <p:sp>
+        <p:nvSpPr>
+          <p:cNvPr id="3" name="Content Placeholder 2"/>
+          <p:cNvSpPr>
+            <a:spLocks noGrp="1"/>
+          </p:cNvSpPr>
+          <p:nvPr>
+            <p:ph idx="1"/>
+          </p:nvPr>
+        </p:nvSpPr>
+        <p:spPr/>
+        <p:txBody>
+          <a:bodyPr/>
+          <a:lstStyle/>
+          <a:p>
+            <a:r>
+              <a:rPr lang="es-ES_tradnl" dirty="0"/>
+              <a:t>&lt;</a:t>
+            </a:r>
+            <a:r>
+              <a:rPr lang="es-ES_tradnl" dirty="0" err="1"/>
+              <a:t>article</a:t>
+            </a:r>
+            <a:r>
+              <a:rPr lang="es-ES_tradnl" dirty="0" smtClean="0"/>
+              <a:t>&gt; </a:t>
+            </a:r>
+            <a:r>
+              <a:rPr lang="es-ES_tradnl" dirty="0" smtClean="0">
+                <a:sym typeface="Wingdings" panose="05000000000000000000" pitchFamily="2" charset="2"/>
+              </a:rPr>
+              <a:t> unidad de información</a:t>
+            </a:r>
+            <a:endParaRPr lang="es-ES_tradnl" dirty="0"/>
+          </a:p>
+          <a:p>
+            <a:r>
+              <a:rPr lang="es-ES_tradnl" dirty="0" smtClean="0"/>
+              <a:t>&lt;</a:t>
+            </a:r>
+            <a:r>
+              <a:rPr lang="es-ES_tradnl" dirty="0" err="1" smtClean="0"/>
+              <a:t>section</a:t>
+            </a:r>
+            <a:r>
+              <a:rPr lang="es-ES_tradnl" dirty="0" smtClean="0"/>
+              <a:t>&gt; </a:t>
+            </a:r>
+            <a:r>
+              <a:rPr lang="es-ES_tradnl" dirty="0" smtClean="0">
+                <a:sym typeface="Wingdings" panose="05000000000000000000" pitchFamily="2" charset="2"/>
+              </a:rPr>
+              <a:t> grupo de unidades de información</a:t>
+            </a:r>
+            <a:endParaRPr lang="es-ES_tradnl" dirty="0" smtClean="0"/>
+          </a:p>
+          <a:p>
+            <a:r>
+              <a:rPr lang="es-ES_tradnl" dirty="0" smtClean="0"/>
+              <a:t>&lt;time&gt; </a:t>
+            </a:r>
+            <a:r>
+              <a:rPr lang="es-ES_tradnl" dirty="0" smtClean="0">
+                <a:sym typeface="Wingdings" panose="05000000000000000000" pitchFamily="2" charset="2"/>
+              </a:rPr>
+              <a:t> fecha/hora</a:t>
+            </a:r>
+            <a:endParaRPr lang="en-US" dirty="0"/>
+          </a:p>
+        </p:txBody>
+      </p:sp>
+    </p:spTree>
+    <p:extLst>
+      <p:ext uri="{BB962C8B-B14F-4D97-AF65-F5344CB8AC3E}">
+        <p14:creationId xmlns:p14="http://schemas.microsoft.com/office/powerpoint/2010/main" val="3573270690"/>
+      </p:ext>
+    </p:extLst>
+  </p:cSld>
+  <p:clrMapOvr>
+    <a:masterClrMapping/>
+  </p:clrMapOvr>
+</p:sld>
+</file>
+
+<file path=ppt/slides/slide15.xml><?xml version="1.0" encoding="utf-8"?>
+<p:sld xmlns:a="http://schemas.openxmlformats.org/drawingml/2006/main" xmlns:r="http://schemas.openxmlformats.org/officeDocument/2006/relationships" xmlns:p="http://schemas.openxmlformats.org/presentationml/2006/main">
+  <p:cSld>
+    <p:spTree>
+      <p:nvGrpSpPr>
+        <p:cNvPr id="1" name=""/>
+        <p:cNvGrpSpPr/>
+        <p:nvPr/>
+      </p:nvGrpSpPr>
+      <p:grpSpPr>
+        <a:xfrm>
+          <a:off x="0" y="0"/>
+          <a:ext cx="0" cy="0"/>
+          <a:chOff x="0" y="0"/>
+          <a:chExt cx="0" cy="0"/>
+        </a:xfrm>
+      </p:grpSpPr>
+      <p:sp>
+        <p:nvSpPr>
+          <p:cNvPr id="2" name="Title 1"/>
+          <p:cNvSpPr>
+            <a:spLocks noGrp="1"/>
+          </p:cNvSpPr>
+          <p:nvPr>
+            <p:ph type="title"/>
+          </p:nvPr>
+        </p:nvSpPr>
+        <p:spPr/>
+        <p:txBody>
+          <a:bodyPr/>
+          <a:lstStyle/>
+          <a:p>
+            <a:r>
+              <a:rPr lang="es-ES_tradnl" dirty="0" err="1" smtClean="0"/>
+              <a:t>Class</a:t>
+            </a:r>
+            <a:r>
+              <a:rPr lang="es-ES_tradnl" dirty="0" smtClean="0"/>
+              <a:t> vs Id</a:t>
+            </a:r>
+            <a:endParaRPr lang="en-US" dirty="0"/>
+          </a:p>
+        </p:txBody>
+      </p:sp>
+      <p:sp>
+        <p:nvSpPr>
+          <p:cNvPr id="3" name="Content Placeholder 2"/>
+          <p:cNvSpPr>
+            <a:spLocks noGrp="1"/>
+          </p:cNvSpPr>
+          <p:nvPr>
+            <p:ph idx="1"/>
+          </p:nvPr>
+        </p:nvSpPr>
+        <p:spPr/>
+        <p:txBody>
+          <a:bodyPr/>
+          <a:lstStyle/>
+          <a:p>
+            <a:r>
+              <a:rPr lang="es-ES_tradnl" dirty="0" err="1" smtClean="0"/>
+              <a:t>Class</a:t>
+            </a:r>
+            <a:r>
+              <a:rPr lang="es-ES_tradnl" dirty="0" smtClean="0"/>
+              <a:t> == muchas veces</a:t>
+            </a:r>
+          </a:p>
+          <a:p>
+            <a:pPr lvl="1"/>
+            <a:r>
+              <a:rPr lang="es-ES_tradnl" dirty="0" smtClean="0"/>
+              <a:t>reutilización</a:t>
+            </a:r>
+          </a:p>
+          <a:p>
+            <a:r>
+              <a:rPr lang="es-ES_tradnl" dirty="0" smtClean="0"/>
+              <a:t>Id == solo una vez</a:t>
+            </a:r>
+          </a:p>
+          <a:p>
+            <a:pPr lvl="1"/>
+            <a:r>
+              <a:rPr lang="es-ES_tradnl" dirty="0" smtClean="0"/>
+              <a:t>diferenciación</a:t>
+            </a:r>
+            <a:endParaRPr lang="en-US" dirty="0"/>
+          </a:p>
+        </p:txBody>
+      </p:sp>
+    </p:spTree>
+    <p:extLst>
+      <p:ext uri="{BB962C8B-B14F-4D97-AF65-F5344CB8AC3E}">
+        <p14:creationId xmlns:p14="http://schemas.microsoft.com/office/powerpoint/2010/main" val="1580177591"/>
+      </p:ext>
+    </p:extLst>
+  </p:cSld>
+  <p:clrMapOvr>
+    <a:masterClrMapping/>
+  </p:clrMapOvr>
+</p:sld>
+</file>
+
+<file path=ppt/slides/slide16.xml><?xml version="1.0" encoding="utf-8"?>
+<p:sld xmlns:a="http://schemas.openxmlformats.org/drawingml/2006/main" xmlns:r="http://schemas.openxmlformats.org/officeDocument/2006/relationships" xmlns:p="http://schemas.openxmlformats.org/presentationml/2006/main">
+  <p:cSld>
+    <p:spTree>
+      <p:nvGrpSpPr>
+        <p:cNvPr id="1" name=""/>
+        <p:cNvGrpSpPr/>
+        <p:nvPr/>
+      </p:nvGrpSpPr>
+      <p:grpSpPr>
+        <a:xfrm>
+          <a:off x="0" y="0"/>
+          <a:ext cx="0" cy="0"/>
+          <a:chOff x="0" y="0"/>
+          <a:chExt cx="0" cy="0"/>
+        </a:xfrm>
+      </p:grpSpPr>
+      <p:sp>
+        <p:nvSpPr>
+          <p:cNvPr id="4" name="Title 3"/>
+          <p:cNvSpPr>
+            <a:spLocks noGrp="1"/>
+          </p:cNvSpPr>
+          <p:nvPr>
+            <p:ph type="title"/>
+          </p:nvPr>
+        </p:nvSpPr>
+        <p:spPr/>
+        <p:txBody>
+          <a:bodyPr/>
+          <a:lstStyle/>
+          <a:p>
+            <a:r>
+              <a:rPr lang="es-ES_tradnl" dirty="0" smtClean="0"/>
+              <a:t>CSS :  </a:t>
+            </a:r>
+            <a:r>
+              <a:rPr lang="es-ES_tradnl" dirty="0" err="1" smtClean="0"/>
+              <a:t>Cascading</a:t>
+            </a:r>
+            <a:r>
+              <a:rPr lang="es-ES_tradnl" dirty="0" smtClean="0"/>
+              <a:t> </a:t>
+            </a:r>
+            <a:r>
+              <a:rPr lang="es-ES_tradnl" dirty="0" err="1" smtClean="0"/>
+              <a:t>style</a:t>
+            </a:r>
+            <a:r>
+              <a:rPr lang="es-ES_tradnl" dirty="0" smtClean="0"/>
+              <a:t> </a:t>
+            </a:r>
+            <a:r>
+              <a:rPr lang="es-ES_tradnl" dirty="0" err="1" smtClean="0"/>
+              <a:t>sheets</a:t>
+            </a:r>
+            <a:endParaRPr lang="en-US" dirty="0"/>
+          </a:p>
+        </p:txBody>
+      </p:sp>
+    </p:spTree>
+    <p:extLst>
+      <p:ext uri="{BB962C8B-B14F-4D97-AF65-F5344CB8AC3E}">
+        <p14:creationId xmlns:p14="http://schemas.microsoft.com/office/powerpoint/2010/main" val="769260831"/>
+      </p:ext>
+    </p:extLst>
+  </p:cSld>
+  <p:clrMapOvr>
+    <a:masterClrMapping/>
+  </p:clrMapOvr>
+</p:sld>
+</file>
+
+<file path=ppt/slides/slide17.xml><?xml version="1.0" encoding="utf-8"?>
+<p:sld xmlns:a="http://schemas.openxmlformats.org/drawingml/2006/main" xmlns:r="http://schemas.openxmlformats.org/officeDocument/2006/relationships" xmlns:p="http://schemas.openxmlformats.org/presentationml/2006/main">
+  <p:cSld>
+    <p:spTree>
+      <p:nvGrpSpPr>
+        <p:cNvPr id="1" name=""/>
+        <p:cNvGrpSpPr/>
+        <p:nvPr/>
+      </p:nvGrpSpPr>
+      <p:grpSpPr>
+        <a:xfrm>
+          <a:off x="0" y="0"/>
+          <a:ext cx="0" cy="0"/>
+          <a:chOff x="0" y="0"/>
+          <a:chExt cx="0" cy="0"/>
+        </a:xfrm>
+      </p:grpSpPr>
+      <p:sp>
+        <p:nvSpPr>
+          <p:cNvPr id="2" name="Title 1"/>
+          <p:cNvSpPr>
+            <a:spLocks noGrp="1"/>
+          </p:cNvSpPr>
+          <p:nvPr>
+            <p:ph type="title"/>
+          </p:nvPr>
+        </p:nvSpPr>
+        <p:spPr/>
+        <p:txBody>
+          <a:bodyPr/>
+          <a:lstStyle/>
+          <a:p>
+            <a:r>
+              <a:rPr lang="es-ES_tradnl" dirty="0" smtClean="0"/>
+              <a:t>Sintaxis CSS</a:t>
+            </a:r>
+            <a:endParaRPr lang="en-US" dirty="0"/>
+          </a:p>
+        </p:txBody>
+      </p:sp>
+      <p:sp>
+        <p:nvSpPr>
+          <p:cNvPr id="3" name="Content Placeholder 2"/>
+          <p:cNvSpPr>
+            <a:spLocks noGrp="1"/>
+          </p:cNvSpPr>
+          <p:nvPr>
+            <p:ph idx="1"/>
+          </p:nvPr>
+        </p:nvSpPr>
+        <p:spPr>
+          <a:xfrm>
+            <a:off x="4544792" y="3110138"/>
+            <a:ext cx="3494314" cy="2115004"/>
+          </a:xfrm>
+        </p:spPr>
+        <p:txBody>
+          <a:bodyPr/>
+          <a:lstStyle/>
+          <a:p>
+            <a:pPr marL="0" indent="0">
+              <a:buNone/>
+            </a:pPr>
+            <a:r>
+              <a:rPr lang="es-ES_tradnl" dirty="0">
+                <a:solidFill>
+                  <a:schemeClr val="accent2">
+                    <a:lumMod val="75000"/>
+                  </a:schemeClr>
+                </a:solidFill>
+              </a:rPr>
+              <a:t>s</a:t>
+            </a:r>
+            <a:r>
+              <a:rPr lang="es-ES_tradnl" dirty="0" smtClean="0">
+                <a:solidFill>
+                  <a:schemeClr val="accent2">
+                    <a:lumMod val="75000"/>
+                  </a:schemeClr>
+                </a:solidFill>
+              </a:rPr>
+              <a:t>elector {</a:t>
+            </a:r>
+          </a:p>
+          <a:p>
+            <a:pPr marL="0" indent="0">
+              <a:buNone/>
+            </a:pPr>
+            <a:r>
+              <a:rPr lang="es-ES_tradnl" dirty="0"/>
+              <a:t>	</a:t>
+            </a:r>
+            <a:r>
+              <a:rPr lang="es-ES_tradnl" dirty="0" smtClean="0">
+                <a:solidFill>
+                  <a:schemeClr val="accent6"/>
+                </a:solidFill>
+              </a:rPr>
+              <a:t>regla1</a:t>
+            </a:r>
+            <a:r>
+              <a:rPr lang="es-ES_tradnl" dirty="0" smtClean="0"/>
+              <a:t>: valor1;</a:t>
+            </a:r>
+          </a:p>
+          <a:p>
+            <a:pPr marL="0" indent="0">
+              <a:buNone/>
+            </a:pPr>
+            <a:r>
+              <a:rPr lang="es-ES_tradnl" dirty="0"/>
+              <a:t>	</a:t>
+            </a:r>
+            <a:r>
+              <a:rPr lang="es-ES_tradnl" dirty="0" smtClean="0">
+                <a:solidFill>
+                  <a:schemeClr val="accent6"/>
+                </a:solidFill>
+              </a:rPr>
+              <a:t>regla2</a:t>
+            </a:r>
+            <a:r>
+              <a:rPr lang="es-ES_tradnl" dirty="0" smtClean="0"/>
+              <a:t>: valor2;</a:t>
+            </a:r>
+          </a:p>
+          <a:p>
+            <a:pPr marL="0" indent="0">
+              <a:buNone/>
+            </a:pPr>
+            <a:r>
+              <a:rPr lang="es-ES_tradnl" dirty="0">
+                <a:solidFill>
+                  <a:schemeClr val="accent2">
+                    <a:lumMod val="75000"/>
+                  </a:schemeClr>
+                </a:solidFill>
+              </a:rPr>
+              <a:t>}</a:t>
+            </a:r>
+            <a:endParaRPr lang="en-US" dirty="0">
+              <a:solidFill>
+                <a:schemeClr val="accent2">
+                  <a:lumMod val="75000"/>
+                </a:schemeClr>
+              </a:solidFill>
+            </a:endParaRPr>
+          </a:p>
+        </p:txBody>
+      </p:sp>
+      <p:sp>
+        <p:nvSpPr>
+          <p:cNvPr id="4" name="Rounded Rectangular Callout 3"/>
+          <p:cNvSpPr/>
+          <p:nvPr/>
+        </p:nvSpPr>
+        <p:spPr>
+          <a:xfrm>
+            <a:off x="1752606" y="2148517"/>
+            <a:ext cx="2198914" cy="961621"/>
+          </a:xfrm>
+          <a:prstGeom prst="wedgeRoundRectCallout">
+            <a:avLst>
+              <a:gd name="adj1" fmla="val 78106"/>
+              <a:gd name="adj2" fmla="val 54705"/>
+              <a:gd name="adj3" fmla="val 16667"/>
+            </a:avLst>
+          </a:prstGeom>
+        </p:spPr>
+        <p:style>
+          <a:lnRef idx="2">
+            <a:schemeClr val="accent1">
+              <a:shade val="50000"/>
+            </a:schemeClr>
+          </a:lnRef>
+          <a:fillRef idx="1">
+            <a:schemeClr val="accent1"/>
+          </a:fillRef>
+          <a:effectRef idx="0">
+            <a:schemeClr val="accent1"/>
+          </a:effectRef>
+          <a:fontRef idx="minor">
+            <a:schemeClr val="lt1"/>
+          </a:fontRef>
+        </p:style>
+        <p:txBody>
+          <a:bodyPr rtlCol="0" anchor="ctr"/>
+          <a:lstStyle/>
+          <a:p>
+            <a:pPr algn="ctr"/>
+            <a:r>
+              <a:rPr lang="es-ES_tradnl" sz="3200" dirty="0" smtClean="0"/>
+              <a:t>Que se modifica</a:t>
+            </a:r>
+            <a:endParaRPr lang="en-US" sz="3200" dirty="0"/>
+          </a:p>
+        </p:txBody>
+      </p:sp>
+      <p:sp>
+        <p:nvSpPr>
+          <p:cNvPr id="5" name="Rounded Rectangular Callout 4"/>
+          <p:cNvSpPr/>
+          <p:nvPr/>
+        </p:nvSpPr>
+        <p:spPr>
+          <a:xfrm>
+            <a:off x="8382006" y="3686829"/>
+            <a:ext cx="2198914" cy="961621"/>
+          </a:xfrm>
+          <a:prstGeom prst="wedgeRoundRectCallout">
+            <a:avLst>
+              <a:gd name="adj1" fmla="val -74368"/>
+              <a:gd name="adj2" fmla="val -20009"/>
+              <a:gd name="adj3" fmla="val 16667"/>
+            </a:avLst>
+          </a:prstGeom>
+        </p:spPr>
+        <p:style>
+          <a:lnRef idx="2">
+            <a:schemeClr val="accent1">
+              <a:shade val="50000"/>
+            </a:schemeClr>
+          </a:lnRef>
+          <a:fillRef idx="1">
+            <a:schemeClr val="accent1"/>
+          </a:fillRef>
+          <a:effectRef idx="0">
+            <a:schemeClr val="accent1"/>
+          </a:effectRef>
+          <a:fontRef idx="minor">
+            <a:schemeClr val="lt1"/>
+          </a:fontRef>
+        </p:style>
+        <p:txBody>
+          <a:bodyPr rtlCol="0" anchor="ctr"/>
+          <a:lstStyle/>
+          <a:p>
+            <a:pPr algn="ctr"/>
+            <a:r>
+              <a:rPr lang="es-ES_tradnl" sz="3200" dirty="0" smtClean="0"/>
+              <a:t>Como se modifica</a:t>
+            </a:r>
+            <a:endParaRPr lang="en-US" sz="3200" dirty="0"/>
+          </a:p>
+        </p:txBody>
+      </p:sp>
+    </p:spTree>
+    <p:extLst>
+      <p:ext uri="{BB962C8B-B14F-4D97-AF65-F5344CB8AC3E}">
+        <p14:creationId xmlns:p14="http://schemas.microsoft.com/office/powerpoint/2010/main" val="3042965058"/>
+      </p:ext>
+    </p:extLst>
+  </p:cSld>
+  <p:clrMapOvr>
+    <a:masterClrMapping/>
+  </p:clrMapOvr>
+</p:sld>
+</file>
+
+<file path=ppt/slides/slide18.xml><?xml version="1.0" encoding="utf-8"?>
+<p:sld xmlns:a="http://schemas.openxmlformats.org/drawingml/2006/main" xmlns:r="http://schemas.openxmlformats.org/officeDocument/2006/relationships" xmlns:p="http://schemas.openxmlformats.org/presentationml/2006/main">
+  <p:cSld>
+    <p:spTree>
+      <p:nvGrpSpPr>
+        <p:cNvPr id="1" name=""/>
+        <p:cNvGrpSpPr/>
+        <p:nvPr/>
+      </p:nvGrpSpPr>
+      <p:grpSpPr>
+        <a:xfrm>
+          <a:off x="0" y="0"/>
+          <a:ext cx="0" cy="0"/>
+          <a:chOff x="0" y="0"/>
+          <a:chExt cx="0" cy="0"/>
+        </a:xfrm>
+      </p:grpSpPr>
+      <p:sp>
+        <p:nvSpPr>
+          <p:cNvPr id="2" name="Title 1"/>
+          <p:cNvSpPr>
+            <a:spLocks noGrp="1"/>
+          </p:cNvSpPr>
+          <p:nvPr>
+            <p:ph type="title"/>
+          </p:nvPr>
+        </p:nvSpPr>
+        <p:spPr/>
+        <p:txBody>
+          <a:bodyPr/>
+          <a:lstStyle/>
+          <a:p>
+            <a:r>
+              <a:rPr lang="es-ES_tradnl" dirty="0" smtClean="0"/>
+              <a:t>Sintaxis de selectores</a:t>
+            </a:r>
+            <a:endParaRPr lang="en-US" dirty="0"/>
+          </a:p>
+        </p:txBody>
+      </p:sp>
+      <p:sp>
+        <p:nvSpPr>
+          <p:cNvPr id="3" name="Content Placeholder 2"/>
+          <p:cNvSpPr>
+            <a:spLocks noGrp="1"/>
+          </p:cNvSpPr>
+          <p:nvPr>
+            <p:ph idx="1"/>
+          </p:nvPr>
+        </p:nvSpPr>
+        <p:spPr/>
+        <p:txBody>
+          <a:bodyPr/>
+          <a:lstStyle/>
+          <a:p>
+            <a:pPr marL="0" indent="0">
+              <a:buNone/>
+            </a:pPr>
+            <a:endParaRPr lang="es-ES_tradnl" dirty="0" smtClean="0"/>
+          </a:p>
+          <a:p>
+            <a:pPr marL="0" indent="0">
+              <a:buNone/>
+            </a:pPr>
+            <a:r>
+              <a:rPr lang="es-ES_tradnl" dirty="0" smtClean="0"/>
+              <a:t>Etiqueta </a:t>
+            </a:r>
+            <a:r>
+              <a:rPr lang="es-ES_tradnl" dirty="0" smtClean="0">
+                <a:sym typeface="Wingdings" panose="05000000000000000000" pitchFamily="2" charset="2"/>
+              </a:rPr>
+              <a:t> &lt;etiqueta&gt;</a:t>
+            </a:r>
+            <a:endParaRPr lang="es-ES_tradnl" dirty="0" smtClean="0"/>
+          </a:p>
+          <a:p>
+            <a:pPr marL="0" indent="0">
+              <a:buNone/>
+            </a:pPr>
+            <a:r>
+              <a:rPr lang="es-ES_tradnl" dirty="0" smtClean="0"/>
+              <a:t>.clase </a:t>
+            </a:r>
+            <a:r>
+              <a:rPr lang="es-ES_tradnl" dirty="0" smtClean="0">
+                <a:sym typeface="Wingdings" panose="05000000000000000000" pitchFamily="2" charset="2"/>
+              </a:rPr>
+              <a:t> </a:t>
+            </a:r>
+            <a:r>
+              <a:rPr lang="es-ES_tradnl" dirty="0" err="1" smtClean="0">
+                <a:sym typeface="Wingdings" panose="05000000000000000000" pitchFamily="2" charset="2"/>
+              </a:rPr>
+              <a:t>class</a:t>
+            </a:r>
+            <a:r>
+              <a:rPr lang="es-ES_tradnl" dirty="0" smtClean="0">
+                <a:sym typeface="Wingdings" panose="05000000000000000000" pitchFamily="2" charset="2"/>
+              </a:rPr>
+              <a:t>=“clase”</a:t>
+            </a:r>
+            <a:endParaRPr lang="es-ES_tradnl" dirty="0" smtClean="0"/>
+          </a:p>
+          <a:p>
+            <a:pPr marL="0" indent="0">
+              <a:buNone/>
+            </a:pPr>
+            <a:r>
+              <a:rPr lang="es-ES_tradnl" dirty="0" smtClean="0"/>
+              <a:t>#id </a:t>
+            </a:r>
+            <a:r>
+              <a:rPr lang="es-ES_tradnl" dirty="0" smtClean="0">
+                <a:sym typeface="Wingdings" panose="05000000000000000000" pitchFamily="2" charset="2"/>
+              </a:rPr>
+              <a:t>id=“id”</a:t>
+            </a:r>
+            <a:endParaRPr lang="en-US" dirty="0"/>
+          </a:p>
+        </p:txBody>
+      </p:sp>
+    </p:spTree>
+    <p:extLst>
+      <p:ext uri="{BB962C8B-B14F-4D97-AF65-F5344CB8AC3E}">
+        <p14:creationId xmlns:p14="http://schemas.microsoft.com/office/powerpoint/2010/main" val="660177771"/>
+      </p:ext>
+    </p:extLst>
+  </p:cSld>
+  <p:clrMapOvr>
+    <a:masterClrMapping/>
+  </p:clrMapOvr>
+</p:sld>
+</file>
+
+<file path=ppt/slides/slide19.xml><?xml version="1.0" encoding="utf-8"?>
+<p:sld xmlns:a="http://schemas.openxmlformats.org/drawingml/2006/main" xmlns:r="http://schemas.openxmlformats.org/officeDocument/2006/relationships" xmlns:p="http://schemas.openxmlformats.org/presentationml/2006/main">
+  <p:cSld>
+    <p:spTree>
+      <p:nvGrpSpPr>
+        <p:cNvPr id="1" name=""/>
+        <p:cNvGrpSpPr/>
+        <p:nvPr/>
+      </p:nvGrpSpPr>
+      <p:grpSpPr>
+        <a:xfrm>
+          <a:off x="0" y="0"/>
+          <a:ext cx="0" cy="0"/>
+          <a:chOff x="0" y="0"/>
+          <a:chExt cx="0" cy="0"/>
+        </a:xfrm>
+      </p:grpSpPr>
+      <p:sp>
+        <p:nvSpPr>
+          <p:cNvPr id="2" name="Title 1"/>
+          <p:cNvSpPr>
+            <a:spLocks noGrp="1"/>
+          </p:cNvSpPr>
+          <p:nvPr>
+            <p:ph type="title"/>
+          </p:nvPr>
+        </p:nvSpPr>
+        <p:spPr/>
+        <p:txBody>
+          <a:bodyPr/>
+          <a:lstStyle/>
+          <a:p>
+            <a:r>
+              <a:rPr lang="es-ES_tradnl" dirty="0" smtClean="0"/>
+              <a:t>Modelo de caja</a:t>
+            </a:r>
+            <a:endParaRPr lang="en-US" dirty="0"/>
+          </a:p>
+        </p:txBody>
+      </p:sp>
+      <p:sp>
+        <p:nvSpPr>
+          <p:cNvPr id="3" name="Content Placeholder 2"/>
+          <p:cNvSpPr>
+            <a:spLocks noGrp="1"/>
+          </p:cNvSpPr>
+          <p:nvPr>
+            <p:ph idx="1"/>
+          </p:nvPr>
+        </p:nvSpPr>
+        <p:spPr/>
+        <p:txBody>
+          <a:bodyPr/>
+          <a:lstStyle/>
+          <a:p>
+            <a:r>
+              <a:rPr lang="es-ES_tradnl" dirty="0" err="1" smtClean="0"/>
+              <a:t>Margin</a:t>
+            </a:r>
+            <a:r>
+              <a:rPr lang="es-ES_tradnl" dirty="0" smtClean="0"/>
+              <a:t>, </a:t>
+            </a:r>
+            <a:r>
+              <a:rPr lang="es-ES_tradnl" dirty="0" err="1" smtClean="0"/>
+              <a:t>border</a:t>
+            </a:r>
+            <a:r>
+              <a:rPr lang="es-ES_tradnl" dirty="0" smtClean="0"/>
+              <a:t>, </a:t>
+            </a:r>
+            <a:r>
+              <a:rPr lang="es-ES_tradnl" dirty="0" err="1" smtClean="0"/>
+              <a:t>padding</a:t>
+            </a:r>
+            <a:r>
+              <a:rPr lang="es-ES_tradnl" dirty="0" smtClean="0"/>
+              <a:t>, </a:t>
+            </a:r>
+            <a:r>
+              <a:rPr lang="es-ES_tradnl" dirty="0" err="1" smtClean="0"/>
+              <a:t>height</a:t>
+            </a:r>
+            <a:r>
+              <a:rPr lang="es-ES_tradnl" dirty="0" smtClean="0"/>
+              <a:t> &amp; </a:t>
+            </a:r>
+            <a:r>
+              <a:rPr lang="es-ES_tradnl" dirty="0" err="1" smtClean="0"/>
+              <a:t>width</a:t>
+            </a:r>
+            <a:endParaRPr lang="en-US" dirty="0"/>
+          </a:p>
+        </p:txBody>
+      </p:sp>
+    </p:spTree>
+    <p:extLst>
+      <p:ext uri="{BB962C8B-B14F-4D97-AF65-F5344CB8AC3E}">
+        <p14:creationId xmlns:p14="http://schemas.microsoft.com/office/powerpoint/2010/main" val="3680185540"/>
+      </p:ext>
+    </p:extLst>
+  </p:cSld>
+  <p:clrMapOvr>
+    <a:masterClrMapping/>
+  </p:clrMapOvr>
+</p:sld>
+</file>
+
 <file path=ppt/slides/slide2.xml><?xml version="1.0" encoding="utf-8"?>
 <p:sld xmlns:a="http://schemas.openxmlformats.org/drawingml/2006/main" xmlns:r="http://schemas.openxmlformats.org/officeDocument/2006/relationships" xmlns:p="http://schemas.openxmlformats.org/presentationml/2006/main">
   <p:cSld>
@@ -3111,6 +4438,237 @@
     <p:extLst>
       <p:ext uri="{BB962C8B-B14F-4D97-AF65-F5344CB8AC3E}">
         <p14:creationId xmlns:p14="http://schemas.microsoft.com/office/powerpoint/2010/main" val="2884283473"/>
+      </p:ext>
+    </p:extLst>
+  </p:cSld>
+  <p:clrMapOvr>
+    <a:masterClrMapping/>
+  </p:clrMapOvr>
+</p:sld>
+</file>
+
+<file path=ppt/slides/slide20.xml><?xml version="1.0" encoding="utf-8"?>
+<p:sld xmlns:a="http://schemas.openxmlformats.org/drawingml/2006/main" xmlns:r="http://schemas.openxmlformats.org/officeDocument/2006/relationships" xmlns:p="http://schemas.openxmlformats.org/presentationml/2006/main">
+  <p:cSld>
+    <p:spTree>
+      <p:nvGrpSpPr>
+        <p:cNvPr id="1" name=""/>
+        <p:cNvGrpSpPr/>
+        <p:nvPr/>
+      </p:nvGrpSpPr>
+      <p:grpSpPr>
+        <a:xfrm>
+          <a:off x="0" y="0"/>
+          <a:ext cx="0" cy="0"/>
+          <a:chOff x="0" y="0"/>
+          <a:chExt cx="0" cy="0"/>
+        </a:xfrm>
+      </p:grpSpPr>
+      <p:sp>
+        <p:nvSpPr>
+          <p:cNvPr id="2" name="Title 1"/>
+          <p:cNvSpPr>
+            <a:spLocks noGrp="1"/>
+          </p:cNvSpPr>
+          <p:nvPr>
+            <p:ph type="title"/>
+          </p:nvPr>
+        </p:nvSpPr>
+        <p:spPr/>
+        <p:txBody>
+          <a:bodyPr/>
+          <a:lstStyle/>
+          <a:p>
+            <a:r>
+              <a:rPr lang="es-ES_tradnl" dirty="0" smtClean="0"/>
+              <a:t>Para ver	</a:t>
+            </a:r>
+            <a:endParaRPr lang="en-US" dirty="0"/>
+          </a:p>
+        </p:txBody>
+      </p:sp>
+      <p:sp>
+        <p:nvSpPr>
+          <p:cNvPr id="3" name="Content Placeholder 2"/>
+          <p:cNvSpPr>
+            <a:spLocks noGrp="1"/>
+          </p:cNvSpPr>
+          <p:nvPr>
+            <p:ph idx="1"/>
+          </p:nvPr>
+        </p:nvSpPr>
+        <p:spPr/>
+        <p:txBody>
+          <a:bodyPr>
+            <a:normAutofit lnSpcReduction="10000"/>
+          </a:bodyPr>
+          <a:lstStyle/>
+          <a:p>
+            <a:r>
+              <a:rPr lang="en-US" dirty="0" smtClean="0">
+                <a:hlinkClick r:id="rId2"/>
+              </a:rPr>
+              <a:t>https://speakerdeck.com/shesho/html-plus-css</a:t>
+            </a:r>
+            <a:endParaRPr lang="en-US" dirty="0" smtClean="0"/>
+          </a:p>
+          <a:p>
+            <a:r>
+              <a:rPr lang="en-US" dirty="0" smtClean="0">
+                <a:hlinkClick r:id="rId3"/>
+              </a:rPr>
+              <a:t>https://speakerdeck.com/ryhan/introductory-html-and-css</a:t>
+            </a:r>
+            <a:endParaRPr lang="en-US" dirty="0" smtClean="0"/>
+          </a:p>
+          <a:p>
+            <a:endParaRPr lang="es-ES_tradnl" dirty="0" smtClean="0"/>
+          </a:p>
+          <a:p>
+            <a:r>
+              <a:rPr lang="en-US" dirty="0" smtClean="0">
+                <a:hlinkClick r:id="rId4"/>
+              </a:rPr>
+              <a:t>https://speakerdeck.com/lumilux/intro-to-html</a:t>
+            </a:r>
+            <a:endParaRPr lang="en-US" dirty="0" smtClean="0"/>
+          </a:p>
+          <a:p>
+            <a:endParaRPr lang="es-ES_tradnl" dirty="0"/>
+          </a:p>
+          <a:p>
+            <a:r>
+              <a:rPr lang="en-US" dirty="0" smtClean="0">
+                <a:hlinkClick r:id="rId5"/>
+              </a:rPr>
+              <a:t>https://speakerdeck.com/stupig/html-and-css-basics</a:t>
+            </a:r>
+            <a:endParaRPr lang="es-ES_tradnl" dirty="0"/>
+          </a:p>
+          <a:p>
+            <a:endParaRPr lang="es-ES_tradnl" dirty="0" smtClean="0"/>
+          </a:p>
+          <a:p>
+            <a:r>
+              <a:rPr lang="en-US" dirty="0" smtClean="0">
+                <a:hlinkClick r:id="rId6"/>
+              </a:rPr>
+              <a:t>https://speakerdeck.com/pacheco_hn/html-5</a:t>
+            </a:r>
+            <a:endParaRPr lang="en-US" dirty="0" smtClean="0"/>
+          </a:p>
+          <a:p>
+            <a:r>
+              <a:rPr lang="en-US" dirty="0" smtClean="0">
+                <a:hlinkClick r:id="rId7"/>
+              </a:rPr>
+              <a:t>https://speakerdeck.com/slant/html-and-css</a:t>
+            </a:r>
+            <a:endParaRPr lang="en-US" dirty="0" smtClean="0"/>
+          </a:p>
+          <a:p>
+            <a:endParaRPr lang="en-US" dirty="0"/>
+          </a:p>
+        </p:txBody>
+      </p:sp>
+    </p:spTree>
+    <p:extLst>
+      <p:ext uri="{BB962C8B-B14F-4D97-AF65-F5344CB8AC3E}">
+        <p14:creationId xmlns:p14="http://schemas.microsoft.com/office/powerpoint/2010/main" val="982115055"/>
+      </p:ext>
+    </p:extLst>
+  </p:cSld>
+  <p:clrMapOvr>
+    <a:masterClrMapping/>
+  </p:clrMapOvr>
+</p:sld>
+</file>
+
+<file path=ppt/slides/slide21.xml><?xml version="1.0" encoding="utf-8"?>
+<p:sld xmlns:a="http://schemas.openxmlformats.org/drawingml/2006/main" xmlns:r="http://schemas.openxmlformats.org/officeDocument/2006/relationships" xmlns:p="http://schemas.openxmlformats.org/presentationml/2006/main">
+  <p:cSld>
+    <p:spTree>
+      <p:nvGrpSpPr>
+        <p:cNvPr id="1" name=""/>
+        <p:cNvGrpSpPr/>
+        <p:nvPr/>
+      </p:nvGrpSpPr>
+      <p:grpSpPr>
+        <a:xfrm>
+          <a:off x="0" y="0"/>
+          <a:ext cx="0" cy="0"/>
+          <a:chOff x="0" y="0"/>
+          <a:chExt cx="0" cy="0"/>
+        </a:xfrm>
+      </p:grpSpPr>
+      <p:sp>
+        <p:nvSpPr>
+          <p:cNvPr id="2" name="Title 1"/>
+          <p:cNvSpPr>
+            <a:spLocks noGrp="1"/>
+          </p:cNvSpPr>
+          <p:nvPr>
+            <p:ph type="title"/>
+          </p:nvPr>
+        </p:nvSpPr>
+        <p:spPr/>
+        <p:txBody>
+          <a:bodyPr/>
+          <a:lstStyle/>
+          <a:p>
+            <a:r>
+              <a:rPr lang="es-ES_tradnl" dirty="0" err="1" smtClean="0"/>
+              <a:t>Frameworks</a:t>
+            </a:r>
+            <a:r>
+              <a:rPr lang="es-ES_tradnl" dirty="0" smtClean="0"/>
+              <a:t> CSS</a:t>
+            </a:r>
+            <a:endParaRPr lang="en-US" dirty="0"/>
+          </a:p>
+        </p:txBody>
+      </p:sp>
+      <p:sp>
+        <p:nvSpPr>
+          <p:cNvPr id="3" name="Content Placeholder 2"/>
+          <p:cNvSpPr>
+            <a:spLocks noGrp="1"/>
+          </p:cNvSpPr>
+          <p:nvPr>
+            <p:ph idx="1"/>
+          </p:nvPr>
+        </p:nvSpPr>
+        <p:spPr/>
+        <p:txBody>
+          <a:bodyPr/>
+          <a:lstStyle/>
+          <a:p>
+            <a:r>
+              <a:rPr lang="en-US" dirty="0" smtClean="0">
+                <a:hlinkClick r:id="rId2"/>
+              </a:rPr>
+              <a:t>http://www.getskeleton.com/</a:t>
+            </a:r>
+            <a:endParaRPr lang="en-US" dirty="0" smtClean="0"/>
+          </a:p>
+          <a:p>
+            <a:endParaRPr lang="es-ES_tradnl" dirty="0"/>
+          </a:p>
+          <a:p>
+            <a:r>
+              <a:rPr lang="en-US" smtClean="0">
+                <a:hlinkClick r:id="rId3"/>
+              </a:rPr>
+              <a:t>http://twitter.github.io/bootstrap/</a:t>
+            </a:r>
+            <a:endParaRPr lang="en-US"/>
+          </a:p>
+        </p:txBody>
+      </p:sp>
+    </p:spTree>
+    <p:extLst>
+      <p:ext uri="{BB962C8B-B14F-4D97-AF65-F5344CB8AC3E}">
+        <p14:creationId xmlns:p14="http://schemas.microsoft.com/office/powerpoint/2010/main" val="2313433037"/>
       </p:ext>
     </p:extLst>
   </p:cSld>
@@ -3340,117 +4898,630 @@
           <a:chExt cx="0" cy="0"/>
         </a:xfrm>
       </p:grpSpPr>
-      <p:sp>
-        <p:nvSpPr>
-          <p:cNvPr id="2" name="Title 1"/>
-          <p:cNvSpPr>
-            <a:spLocks noGrp="1"/>
-          </p:cNvSpPr>
-          <p:nvPr>
-            <p:ph type="title"/>
-          </p:nvPr>
-        </p:nvSpPr>
-        <p:spPr/>
-        <p:txBody>
-          <a:bodyPr/>
-          <a:lstStyle/>
-          <a:p>
-            <a:r>
-              <a:rPr lang="es-ES_tradnl" dirty="0" smtClean="0"/>
-              <a:t>Para ver	</a:t>
-            </a:r>
-            <a:endParaRPr lang="en-US" dirty="0"/>
-          </a:p>
-        </p:txBody>
-      </p:sp>
-      <p:sp>
-        <p:nvSpPr>
-          <p:cNvPr id="3" name="Content Placeholder 2"/>
-          <p:cNvSpPr>
-            <a:spLocks noGrp="1"/>
-          </p:cNvSpPr>
-          <p:nvPr>
-            <p:ph idx="1"/>
-          </p:nvPr>
-        </p:nvSpPr>
-        <p:spPr/>
-        <p:txBody>
-          <a:bodyPr>
-            <a:normAutofit lnSpcReduction="10000"/>
-          </a:bodyPr>
-          <a:lstStyle/>
-          <a:p>
-            <a:r>
-              <a:rPr lang="en-US" dirty="0" smtClean="0">
-                <a:hlinkClick r:id="rId2"/>
-              </a:rPr>
-              <a:t>https://speakerdeck.com/shesho/html-plus-css</a:t>
-            </a:r>
-            <a:endParaRPr lang="en-US" dirty="0" smtClean="0"/>
-          </a:p>
-          <a:p>
-            <a:r>
-              <a:rPr lang="en-US" dirty="0" smtClean="0">
-                <a:hlinkClick r:id="rId3"/>
-              </a:rPr>
-              <a:t>https://speakerdeck.com/ryhan/introductory-html-and-css</a:t>
-            </a:r>
-            <a:endParaRPr lang="en-US" dirty="0" smtClean="0"/>
-          </a:p>
-          <a:p>
-            <a:endParaRPr lang="es-ES_tradnl" dirty="0" smtClean="0"/>
-          </a:p>
-          <a:p>
-            <a:r>
-              <a:rPr lang="en-US" dirty="0" smtClean="0">
-                <a:hlinkClick r:id="rId4"/>
-              </a:rPr>
-              <a:t>https://speakerdeck.com/lumilux/intro-to-html</a:t>
-            </a:r>
-            <a:endParaRPr lang="en-US" dirty="0" smtClean="0"/>
-          </a:p>
-          <a:p>
-            <a:endParaRPr lang="es-ES_tradnl" dirty="0"/>
-          </a:p>
-          <a:p>
-            <a:r>
-              <a:rPr lang="en-US" dirty="0" smtClean="0">
-                <a:hlinkClick r:id="rId5"/>
-              </a:rPr>
-              <a:t>https://speakerdeck.com/stupig/html-and-css-basics</a:t>
-            </a:r>
-            <a:endParaRPr lang="es-ES_tradnl" dirty="0"/>
-          </a:p>
-          <a:p>
-            <a:endParaRPr lang="es-ES_tradnl" dirty="0" smtClean="0"/>
-          </a:p>
-          <a:p>
-            <a:r>
-              <a:rPr lang="en-US" dirty="0" smtClean="0">
-                <a:hlinkClick r:id="rId6"/>
-              </a:rPr>
-              <a:t>https://speakerdeck.com/pacheco_hn/html-5</a:t>
-            </a:r>
-            <a:endParaRPr lang="en-US" dirty="0" smtClean="0"/>
-          </a:p>
-          <a:p>
-            <a:r>
-              <a:rPr lang="en-US" dirty="0" smtClean="0">
-                <a:hlinkClick r:id="rId7"/>
-              </a:rPr>
-              <a:t>https://speakerdeck.com/slant/html-and-css</a:t>
-            </a:r>
-            <a:endParaRPr lang="en-US" dirty="0" smtClean="0"/>
-          </a:p>
-          <a:p>
-            <a:endParaRPr lang="en-US" dirty="0"/>
-          </a:p>
-        </p:txBody>
-      </p:sp>
+      <p:grpSp>
+        <p:nvGrpSpPr>
+          <p:cNvPr id="28" name="Group 27"/>
+          <p:cNvGrpSpPr/>
+          <p:nvPr/>
+        </p:nvGrpSpPr>
+        <p:grpSpPr>
+          <a:xfrm>
+            <a:off x="2783347" y="901336"/>
+            <a:ext cx="6625306" cy="5055328"/>
+            <a:chOff x="2783347" y="945405"/>
+            <a:chExt cx="6625306" cy="5055328"/>
+          </a:xfrm>
+        </p:grpSpPr>
+        <p:grpSp>
+          <p:nvGrpSpPr>
+            <p:cNvPr id="21" name="Group 20"/>
+            <p:cNvGrpSpPr/>
+            <p:nvPr/>
+          </p:nvGrpSpPr>
+          <p:grpSpPr>
+            <a:xfrm>
+              <a:off x="2783347" y="1530179"/>
+              <a:ext cx="6625306" cy="3885779"/>
+              <a:chOff x="1971523" y="772523"/>
+              <a:chExt cx="6625306" cy="3885779"/>
+            </a:xfrm>
+          </p:grpSpPr>
+          <p:pic>
+            <p:nvPicPr>
+              <p:cNvPr id="1026" name="Picture 2" descr="http://3.bp.blogspot.com/-sY7whMXT83o/UECGK-oSdeI/AAAAAAAAABM/-OXkkmppfvE/s1600/text-file-icon.png"/>
+              <p:cNvPicPr>
+                <a:picLocks noChangeAspect="1" noChangeArrowheads="1"/>
+              </p:cNvPicPr>
+              <p:nvPr/>
+            </p:nvPicPr>
+            <p:blipFill>
+              <a:blip r:embed="rId2" cstate="print">
+                <a:duotone>
+                  <a:prstClr val="black"/>
+                  <a:schemeClr val="accent2">
+                    <a:tint val="45000"/>
+                    <a:satMod val="400000"/>
+                  </a:schemeClr>
+                </a:duotone>
+                <a:extLst>
+                  <a:ext uri="{28A0092B-C50C-407E-A947-70E740481C1C}">
+                    <a14:useLocalDpi xmlns:a14="http://schemas.microsoft.com/office/drawing/2010/main" val="0"/>
+                  </a:ext>
+                </a:extLst>
+              </a:blip>
+              <a:srcRect/>
+              <a:stretch>
+                <a:fillRect/>
+              </a:stretch>
+            </p:blipFill>
+            <p:spPr bwMode="auto">
+              <a:xfrm flipV="1">
+                <a:off x="4617407" y="772523"/>
+                <a:ext cx="1408820" cy="1408820"/>
+              </a:xfrm>
+              <a:prstGeom prst="rect">
+                <a:avLst/>
+              </a:prstGeom>
+              <a:noFill/>
+              <a:extLst>
+                <a:ext uri="{909E8E84-426E-40DD-AFC4-6F175D3DCCD1}">
+                  <a14:hiddenFill xmlns:a14="http://schemas.microsoft.com/office/drawing/2010/main">
+                    <a:solidFill>
+                      <a:srgbClr val="FFFFFF"/>
+                    </a:solidFill>
+                  </a14:hiddenFill>
+                </a:ext>
+              </a:extLst>
+            </p:spPr>
+          </p:pic>
+          <p:pic>
+            <p:nvPicPr>
+              <p:cNvPr id="5" name="Picture 2" descr="http://3.bp.blogspot.com/-sY7whMXT83o/UECGK-oSdeI/AAAAAAAAABM/-OXkkmppfvE/s1600/text-file-icon.png"/>
+              <p:cNvPicPr>
+                <a:picLocks noChangeAspect="1" noChangeArrowheads="1"/>
+              </p:cNvPicPr>
+              <p:nvPr/>
+            </p:nvPicPr>
+            <p:blipFill>
+              <a:blip r:embed="rId2" cstate="print">
+                <a:duotone>
+                  <a:prstClr val="black"/>
+                  <a:schemeClr val="accent6">
+                    <a:tint val="45000"/>
+                    <a:satMod val="400000"/>
+                  </a:schemeClr>
+                </a:duotone>
+                <a:extLst>
+                  <a:ext uri="{28A0092B-C50C-407E-A947-70E740481C1C}">
+                    <a14:useLocalDpi xmlns:a14="http://schemas.microsoft.com/office/drawing/2010/main" val="0"/>
+                  </a:ext>
+                </a:extLst>
+              </a:blip>
+              <a:srcRect/>
+              <a:stretch>
+                <a:fillRect/>
+              </a:stretch>
+            </p:blipFill>
+            <p:spPr bwMode="auto">
+              <a:xfrm flipV="1">
+                <a:off x="1971523" y="3249482"/>
+                <a:ext cx="1408820" cy="1408820"/>
+              </a:xfrm>
+              <a:prstGeom prst="rect">
+                <a:avLst/>
+              </a:prstGeom>
+              <a:noFill/>
+              <a:extLst>
+                <a:ext uri="{909E8E84-426E-40DD-AFC4-6F175D3DCCD1}">
+                  <a14:hiddenFill xmlns:a14="http://schemas.microsoft.com/office/drawing/2010/main">
+                    <a:solidFill>
+                      <a:srgbClr val="FFFFFF"/>
+                    </a:solidFill>
+                  </a14:hiddenFill>
+                </a:ext>
+              </a:extLst>
+            </p:spPr>
+          </p:pic>
+          <p:pic>
+            <p:nvPicPr>
+              <p:cNvPr id="6" name="Picture 2" descr="http://3.bp.blogspot.com/-sY7whMXT83o/UECGK-oSdeI/AAAAAAAAABM/-OXkkmppfvE/s1600/text-file-icon.png"/>
+              <p:cNvPicPr>
+                <a:picLocks noChangeAspect="1" noChangeArrowheads="1"/>
+              </p:cNvPicPr>
+              <p:nvPr/>
+            </p:nvPicPr>
+            <p:blipFill>
+              <a:blip r:embed="rId2" cstate="print">
+                <a:duotone>
+                  <a:prstClr val="black"/>
+                  <a:schemeClr val="accent6">
+                    <a:tint val="45000"/>
+                    <a:satMod val="400000"/>
+                  </a:schemeClr>
+                </a:duotone>
+                <a:extLst>
+                  <a:ext uri="{28A0092B-C50C-407E-A947-70E740481C1C}">
+                    <a14:useLocalDpi xmlns:a14="http://schemas.microsoft.com/office/drawing/2010/main" val="0"/>
+                  </a:ext>
+                </a:extLst>
+              </a:blip>
+              <a:srcRect/>
+              <a:stretch>
+                <a:fillRect/>
+              </a:stretch>
+            </p:blipFill>
+            <p:spPr bwMode="auto">
+              <a:xfrm flipV="1">
+                <a:off x="3710352" y="3249482"/>
+                <a:ext cx="1408820" cy="1408820"/>
+              </a:xfrm>
+              <a:prstGeom prst="rect">
+                <a:avLst/>
+              </a:prstGeom>
+              <a:noFill/>
+              <a:extLst>
+                <a:ext uri="{909E8E84-426E-40DD-AFC4-6F175D3DCCD1}">
+                  <a14:hiddenFill xmlns:a14="http://schemas.microsoft.com/office/drawing/2010/main">
+                    <a:solidFill>
+                      <a:srgbClr val="FFFFFF"/>
+                    </a:solidFill>
+                  </a14:hiddenFill>
+                </a:ext>
+              </a:extLst>
+            </p:spPr>
+          </p:pic>
+          <p:pic>
+            <p:nvPicPr>
+              <p:cNvPr id="8" name="Picture 2" descr="http://3.bp.blogspot.com/-sY7whMXT83o/UECGK-oSdeI/AAAAAAAAABM/-OXkkmppfvE/s1600/text-file-icon.png"/>
+              <p:cNvPicPr>
+                <a:picLocks noChangeAspect="1" noChangeArrowheads="1"/>
+              </p:cNvPicPr>
+              <p:nvPr/>
+            </p:nvPicPr>
+            <p:blipFill>
+              <a:blip r:embed="rId2" cstate="print">
+                <a:duotone>
+                  <a:prstClr val="black"/>
+                  <a:schemeClr val="accent6">
+                    <a:tint val="45000"/>
+                    <a:satMod val="400000"/>
+                  </a:schemeClr>
+                </a:duotone>
+                <a:extLst>
+                  <a:ext uri="{28A0092B-C50C-407E-A947-70E740481C1C}">
+                    <a14:useLocalDpi xmlns:a14="http://schemas.microsoft.com/office/drawing/2010/main" val="0"/>
+                  </a:ext>
+                </a:extLst>
+              </a:blip>
+              <a:srcRect/>
+              <a:stretch>
+                <a:fillRect/>
+              </a:stretch>
+            </p:blipFill>
+            <p:spPr bwMode="auto">
+              <a:xfrm flipV="1">
+                <a:off x="5449181" y="3249482"/>
+                <a:ext cx="1408820" cy="1408820"/>
+              </a:xfrm>
+              <a:prstGeom prst="rect">
+                <a:avLst/>
+              </a:prstGeom>
+              <a:noFill/>
+              <a:extLst>
+                <a:ext uri="{909E8E84-426E-40DD-AFC4-6F175D3DCCD1}">
+                  <a14:hiddenFill xmlns:a14="http://schemas.microsoft.com/office/drawing/2010/main">
+                    <a:solidFill>
+                      <a:srgbClr val="FFFFFF"/>
+                    </a:solidFill>
+                  </a14:hiddenFill>
+                </a:ext>
+              </a:extLst>
+            </p:spPr>
+          </p:pic>
+          <p:pic>
+            <p:nvPicPr>
+              <p:cNvPr id="9" name="Picture 2" descr="http://3.bp.blogspot.com/-sY7whMXT83o/UECGK-oSdeI/AAAAAAAAABM/-OXkkmppfvE/s1600/text-file-icon.png"/>
+              <p:cNvPicPr>
+                <a:picLocks noChangeAspect="1" noChangeArrowheads="1"/>
+              </p:cNvPicPr>
+              <p:nvPr/>
+            </p:nvPicPr>
+            <p:blipFill>
+              <a:blip r:embed="rId2" cstate="print">
+                <a:duotone>
+                  <a:prstClr val="black"/>
+                  <a:schemeClr val="accent6">
+                    <a:tint val="45000"/>
+                    <a:satMod val="400000"/>
+                  </a:schemeClr>
+                </a:duotone>
+                <a:extLst>
+                  <a:ext uri="{28A0092B-C50C-407E-A947-70E740481C1C}">
+                    <a14:useLocalDpi xmlns:a14="http://schemas.microsoft.com/office/drawing/2010/main" val="0"/>
+                  </a:ext>
+                </a:extLst>
+              </a:blip>
+              <a:srcRect/>
+              <a:stretch>
+                <a:fillRect/>
+              </a:stretch>
+            </p:blipFill>
+            <p:spPr bwMode="auto">
+              <a:xfrm flipV="1">
+                <a:off x="7188009" y="3249482"/>
+                <a:ext cx="1408820" cy="1408820"/>
+              </a:xfrm>
+              <a:prstGeom prst="rect">
+                <a:avLst/>
+              </a:prstGeom>
+              <a:noFill/>
+              <a:extLst>
+                <a:ext uri="{909E8E84-426E-40DD-AFC4-6F175D3DCCD1}">
+                  <a14:hiddenFill xmlns:a14="http://schemas.microsoft.com/office/drawing/2010/main">
+                    <a:solidFill>
+                      <a:srgbClr val="FFFFFF"/>
+                    </a:solidFill>
+                  </a14:hiddenFill>
+                </a:ext>
+              </a:extLst>
+            </p:spPr>
+          </p:pic>
+          <p:cxnSp>
+            <p:nvCxnSpPr>
+              <p:cNvPr id="10" name="Elbow Connector 9"/>
+              <p:cNvCxnSpPr>
+                <a:stCxn id="5" idx="2"/>
+                <a:endCxn id="1026" idx="0"/>
+              </p:cNvCxnSpPr>
+              <p:nvPr/>
+            </p:nvCxnSpPr>
+            <p:spPr>
+              <a:xfrm rot="5400000" flipH="1" flipV="1">
+                <a:off x="3464806" y="1392471"/>
+                <a:ext cx="1068139" cy="2645884"/>
+              </a:xfrm>
+              <a:prstGeom prst="bentConnector3">
+                <a:avLst/>
+              </a:prstGeom>
+              <a:ln w="28575">
+                <a:tailEnd type="triangle"/>
+              </a:ln>
+            </p:spPr>
+            <p:style>
+              <a:lnRef idx="3">
+                <a:schemeClr val="dk1"/>
+              </a:lnRef>
+              <a:fillRef idx="0">
+                <a:schemeClr val="dk1"/>
+              </a:fillRef>
+              <a:effectRef idx="2">
+                <a:schemeClr val="dk1"/>
+              </a:effectRef>
+              <a:fontRef idx="minor">
+                <a:schemeClr val="tx1"/>
+              </a:fontRef>
+            </p:style>
+          </p:cxnSp>
+          <p:cxnSp>
+            <p:nvCxnSpPr>
+              <p:cNvPr id="12" name="Elbow Connector 11"/>
+              <p:cNvCxnSpPr>
+                <a:stCxn id="6" idx="2"/>
+                <a:endCxn id="1026" idx="0"/>
+              </p:cNvCxnSpPr>
+              <p:nvPr/>
+            </p:nvCxnSpPr>
+            <p:spPr>
+              <a:xfrm rot="5400000" flipH="1" flipV="1">
+                <a:off x="4334220" y="2261886"/>
+                <a:ext cx="1068139" cy="907055"/>
+              </a:xfrm>
+              <a:prstGeom prst="bentConnector3">
+                <a:avLst/>
+              </a:prstGeom>
+              <a:ln w="28575">
+                <a:tailEnd type="triangle"/>
+              </a:ln>
+            </p:spPr>
+            <p:style>
+              <a:lnRef idx="3">
+                <a:schemeClr val="dk1"/>
+              </a:lnRef>
+              <a:fillRef idx="0">
+                <a:schemeClr val="dk1"/>
+              </a:fillRef>
+              <a:effectRef idx="2">
+                <a:schemeClr val="dk1"/>
+              </a:effectRef>
+              <a:fontRef idx="minor">
+                <a:schemeClr val="tx1"/>
+              </a:fontRef>
+            </p:style>
+          </p:cxnSp>
+          <p:cxnSp>
+            <p:nvCxnSpPr>
+              <p:cNvPr id="18" name="Elbow Connector 17"/>
+              <p:cNvCxnSpPr>
+                <a:stCxn id="8" idx="2"/>
+                <a:endCxn id="1026" idx="0"/>
+              </p:cNvCxnSpPr>
+              <p:nvPr/>
+            </p:nvCxnSpPr>
+            <p:spPr>
+              <a:xfrm rot="16200000" flipV="1">
+                <a:off x="5203635" y="2299526"/>
+                <a:ext cx="1068139" cy="831774"/>
+              </a:xfrm>
+              <a:prstGeom prst="bentConnector3">
+                <a:avLst/>
+              </a:prstGeom>
+              <a:ln w="28575">
+                <a:tailEnd type="triangle"/>
+              </a:ln>
+            </p:spPr>
+            <p:style>
+              <a:lnRef idx="3">
+                <a:schemeClr val="dk1"/>
+              </a:lnRef>
+              <a:fillRef idx="0">
+                <a:schemeClr val="dk1"/>
+              </a:fillRef>
+              <a:effectRef idx="2">
+                <a:schemeClr val="dk1"/>
+              </a:effectRef>
+              <a:fontRef idx="minor">
+                <a:schemeClr val="tx1"/>
+              </a:fontRef>
+            </p:style>
+          </p:cxnSp>
+          <p:cxnSp>
+            <p:nvCxnSpPr>
+              <p:cNvPr id="20" name="Elbow Connector 19"/>
+              <p:cNvCxnSpPr>
+                <a:stCxn id="9" idx="2"/>
+                <a:endCxn id="1026" idx="0"/>
+              </p:cNvCxnSpPr>
+              <p:nvPr/>
+            </p:nvCxnSpPr>
+            <p:spPr>
+              <a:xfrm rot="16200000" flipV="1">
+                <a:off x="6073049" y="1430112"/>
+                <a:ext cx="1068139" cy="2570602"/>
+              </a:xfrm>
+              <a:prstGeom prst="bentConnector3">
+                <a:avLst/>
+              </a:prstGeom>
+              <a:ln w="28575">
+                <a:tailEnd type="triangle"/>
+              </a:ln>
+            </p:spPr>
+            <p:style>
+              <a:lnRef idx="3">
+                <a:schemeClr val="dk1"/>
+              </a:lnRef>
+              <a:fillRef idx="0">
+                <a:schemeClr val="dk1"/>
+              </a:fillRef>
+              <a:effectRef idx="2">
+                <a:schemeClr val="dk1"/>
+              </a:effectRef>
+              <a:fontRef idx="minor">
+                <a:schemeClr val="tx1"/>
+              </a:fontRef>
+            </p:style>
+          </p:cxnSp>
+        </p:grpSp>
+        <p:sp>
+          <p:nvSpPr>
+            <p:cNvPr id="22" name="TextBox 21"/>
+            <p:cNvSpPr txBox="1"/>
+            <p:nvPr/>
+          </p:nvSpPr>
+          <p:spPr>
+            <a:xfrm>
+              <a:off x="5747133" y="945405"/>
+              <a:ext cx="782587" cy="584775"/>
+            </a:xfrm>
+            <a:prstGeom prst="rect">
+              <a:avLst/>
+            </a:prstGeom>
+            <a:noFill/>
+          </p:spPr>
+          <p:txBody>
+            <a:bodyPr wrap="none" rtlCol="0">
+              <a:spAutoFit/>
+            </a:bodyPr>
+            <a:lstStyle/>
+            <a:p>
+              <a:r>
+                <a:rPr lang="es-ES_tradnl" sz="3200" dirty="0" smtClean="0">
+                  <a:solidFill>
+                    <a:srgbClr val="C00000"/>
+                  </a:solidFill>
+                </a:rPr>
+                <a:t>CSS</a:t>
+              </a:r>
+              <a:endParaRPr lang="en-US" sz="3200" dirty="0">
+                <a:solidFill>
+                  <a:srgbClr val="C00000"/>
+                </a:solidFill>
+              </a:endParaRPr>
+            </a:p>
+          </p:txBody>
+        </p:sp>
+        <p:sp>
+          <p:nvSpPr>
+            <p:cNvPr id="24" name="TextBox 23"/>
+            <p:cNvSpPr txBox="1"/>
+            <p:nvPr/>
+          </p:nvSpPr>
+          <p:spPr>
+            <a:xfrm>
+              <a:off x="2904905" y="5415958"/>
+              <a:ext cx="1165704" cy="584775"/>
+            </a:xfrm>
+            <a:prstGeom prst="rect">
+              <a:avLst/>
+            </a:prstGeom>
+            <a:noFill/>
+          </p:spPr>
+          <p:txBody>
+            <a:bodyPr wrap="none" rtlCol="0">
+              <a:spAutoFit/>
+            </a:bodyPr>
+            <a:lstStyle/>
+            <a:p>
+              <a:r>
+                <a:rPr lang="es-ES_tradnl" sz="3200" dirty="0" smtClean="0">
+                  <a:solidFill>
+                    <a:schemeClr val="accent6">
+                      <a:lumMod val="75000"/>
+                    </a:schemeClr>
+                  </a:solidFill>
+                </a:rPr>
+                <a:t>HTML</a:t>
+              </a:r>
+              <a:endParaRPr lang="en-US" sz="3200" dirty="0">
+                <a:solidFill>
+                  <a:schemeClr val="accent6">
+                    <a:lumMod val="75000"/>
+                  </a:schemeClr>
+                </a:solidFill>
+              </a:endParaRPr>
+            </a:p>
+          </p:txBody>
+        </p:sp>
+        <p:sp>
+          <p:nvSpPr>
+            <p:cNvPr id="25" name="TextBox 24"/>
+            <p:cNvSpPr txBox="1"/>
+            <p:nvPr/>
+          </p:nvSpPr>
+          <p:spPr>
+            <a:xfrm>
+              <a:off x="4643733" y="5415957"/>
+              <a:ext cx="1165704" cy="584775"/>
+            </a:xfrm>
+            <a:prstGeom prst="rect">
+              <a:avLst/>
+            </a:prstGeom>
+            <a:noFill/>
+          </p:spPr>
+          <p:txBody>
+            <a:bodyPr wrap="none" rtlCol="0">
+              <a:spAutoFit/>
+            </a:bodyPr>
+            <a:lstStyle/>
+            <a:p>
+              <a:r>
+                <a:rPr lang="es-ES_tradnl" sz="3200" dirty="0" smtClean="0">
+                  <a:solidFill>
+                    <a:schemeClr val="accent6">
+                      <a:lumMod val="75000"/>
+                    </a:schemeClr>
+                  </a:solidFill>
+                </a:rPr>
+                <a:t>HTML</a:t>
+              </a:r>
+              <a:endParaRPr lang="en-US" sz="3200" dirty="0">
+                <a:solidFill>
+                  <a:schemeClr val="accent6">
+                    <a:lumMod val="75000"/>
+                  </a:schemeClr>
+                </a:solidFill>
+              </a:endParaRPr>
+            </a:p>
+          </p:txBody>
+        </p:sp>
+        <p:sp>
+          <p:nvSpPr>
+            <p:cNvPr id="26" name="TextBox 25"/>
+            <p:cNvSpPr txBox="1"/>
+            <p:nvPr/>
+          </p:nvSpPr>
+          <p:spPr>
+            <a:xfrm>
+              <a:off x="6382563" y="5415956"/>
+              <a:ext cx="1165704" cy="584775"/>
+            </a:xfrm>
+            <a:prstGeom prst="rect">
+              <a:avLst/>
+            </a:prstGeom>
+            <a:noFill/>
+          </p:spPr>
+          <p:txBody>
+            <a:bodyPr wrap="none" rtlCol="0">
+              <a:spAutoFit/>
+            </a:bodyPr>
+            <a:lstStyle/>
+            <a:p>
+              <a:r>
+                <a:rPr lang="es-ES_tradnl" sz="3200" dirty="0" smtClean="0">
+                  <a:solidFill>
+                    <a:schemeClr val="accent6">
+                      <a:lumMod val="75000"/>
+                    </a:schemeClr>
+                  </a:solidFill>
+                </a:rPr>
+                <a:t>HTML</a:t>
+              </a:r>
+              <a:endParaRPr lang="en-US" sz="3200" dirty="0">
+                <a:solidFill>
+                  <a:schemeClr val="accent6">
+                    <a:lumMod val="75000"/>
+                  </a:schemeClr>
+                </a:solidFill>
+              </a:endParaRPr>
+            </a:p>
+          </p:txBody>
+        </p:sp>
+        <p:sp>
+          <p:nvSpPr>
+            <p:cNvPr id="27" name="TextBox 26"/>
+            <p:cNvSpPr txBox="1"/>
+            <p:nvPr/>
+          </p:nvSpPr>
+          <p:spPr>
+            <a:xfrm>
+              <a:off x="8121391" y="5415955"/>
+              <a:ext cx="1165704" cy="584775"/>
+            </a:xfrm>
+            <a:prstGeom prst="rect">
+              <a:avLst/>
+            </a:prstGeom>
+            <a:noFill/>
+          </p:spPr>
+          <p:txBody>
+            <a:bodyPr wrap="none" rtlCol="0">
+              <a:spAutoFit/>
+            </a:bodyPr>
+            <a:lstStyle/>
+            <a:p>
+              <a:r>
+                <a:rPr lang="es-ES_tradnl" sz="3200" dirty="0" smtClean="0">
+                  <a:solidFill>
+                    <a:schemeClr val="accent6">
+                      <a:lumMod val="75000"/>
+                    </a:schemeClr>
+                  </a:solidFill>
+                </a:rPr>
+                <a:t>HTML</a:t>
+              </a:r>
+              <a:endParaRPr lang="en-US" sz="3200" dirty="0">
+                <a:solidFill>
+                  <a:schemeClr val="accent6">
+                    <a:lumMod val="75000"/>
+                  </a:schemeClr>
+                </a:solidFill>
+              </a:endParaRPr>
+            </a:p>
+          </p:txBody>
+        </p:sp>
+      </p:grpSp>
     </p:spTree>
     <p:extLst>
       <p:ext uri="{BB962C8B-B14F-4D97-AF65-F5344CB8AC3E}">
-        <p14:creationId xmlns:p14="http://schemas.microsoft.com/office/powerpoint/2010/main" val="982115055"/>
+        <p14:creationId xmlns:p14="http://schemas.microsoft.com/office/powerpoint/2010/main" val="665291203"/>
       </p:ext>
     </p:extLst>
   </p:cSld>
@@ -3493,12 +5564,8 @@
           <a:lstStyle/>
           <a:p>
             <a:r>
-              <a:rPr lang="es-ES_tradnl" dirty="0" err="1" smtClean="0"/>
-              <a:t>Frameworks</a:t>
-            </a:r>
-            <a:r>
-              <a:rPr lang="es-ES_tradnl" dirty="0" smtClean="0"/>
-              <a:t> CSS</a:t>
+              <a:rPr lang="es-ES_tradnl" dirty="0" smtClean="0"/>
+              <a:t>Sintaxis HTML</a:t>
             </a:r>
             <a:endParaRPr lang="en-US" dirty="0"/>
           </a:p>
@@ -3514,37 +5581,651 @@
             <p:ph idx="1"/>
           </p:nvPr>
         </p:nvSpPr>
-        <p:spPr/>
-        <p:txBody>
-          <a:bodyPr/>
-          <a:lstStyle/>
-          <a:p>
-            <a:r>
-              <a:rPr lang="en-US" dirty="0" smtClean="0">
-                <a:hlinkClick r:id="rId2"/>
+        <p:spPr>
+          <a:xfrm>
+            <a:off x="2733102" y="2872227"/>
+            <a:ext cx="2885501" cy="1611638"/>
+          </a:xfrm>
+        </p:spPr>
+        <p:txBody>
+          <a:bodyPr/>
+          <a:lstStyle/>
+          <a:p>
+            <a:pPr marL="0" indent="0">
+              <a:buNone/>
+            </a:pPr>
+            <a:r>
+              <a:rPr lang="es-ES_tradnl" dirty="0" smtClean="0">
+                <a:solidFill>
+                  <a:schemeClr val="accent2"/>
+                </a:solidFill>
               </a:rPr>
-              <a:t>http://www.getskeleton.com/</a:t>
-            </a:r>
-            <a:endParaRPr lang="en-US" dirty="0" smtClean="0"/>
-          </a:p>
-          <a:p>
-            <a:endParaRPr lang="es-ES_tradnl" dirty="0"/>
-          </a:p>
-          <a:p>
-            <a:r>
-              <a:rPr lang="en-US" smtClean="0">
-                <a:hlinkClick r:id="rId3"/>
+              <a:t>&lt;etiqueta&gt;</a:t>
+            </a:r>
+          </a:p>
+          <a:p>
+            <a:pPr marL="0" indent="0">
+              <a:buNone/>
+            </a:pPr>
+            <a:r>
+              <a:rPr lang="es-ES_tradnl" dirty="0"/>
+              <a:t>	</a:t>
+            </a:r>
+            <a:r>
+              <a:rPr lang="es-ES_tradnl" dirty="0" smtClean="0">
+                <a:solidFill>
+                  <a:srgbClr val="00B050"/>
+                </a:solidFill>
               </a:rPr>
-              <a:t>http://twitter.github.io/bootstrap/</a:t>
-            </a:r>
-            <a:endParaRPr lang="en-US"/>
+              <a:t>contenido</a:t>
+            </a:r>
+          </a:p>
+          <a:p>
+            <a:pPr marL="0" indent="0">
+              <a:buNone/>
+            </a:pPr>
+            <a:r>
+              <a:rPr lang="es-ES_tradnl" dirty="0" smtClean="0">
+                <a:solidFill>
+                  <a:schemeClr val="accent2"/>
+                </a:solidFill>
+              </a:rPr>
+              <a:t>&lt;/etiqueta</a:t>
+            </a:r>
+            <a:r>
+              <a:rPr lang="es-ES_tradnl" dirty="0">
+                <a:solidFill>
+                  <a:schemeClr val="accent2"/>
+                </a:solidFill>
+              </a:rPr>
+              <a:t>&gt;</a:t>
+            </a:r>
+            <a:endParaRPr lang="en-US" dirty="0">
+              <a:solidFill>
+                <a:schemeClr val="accent2"/>
+              </a:solidFill>
+            </a:endParaRPr>
+          </a:p>
+        </p:txBody>
+      </p:sp>
+      <p:sp>
+        <p:nvSpPr>
+          <p:cNvPr id="4" name="Rounded Rectangular Callout 3"/>
+          <p:cNvSpPr/>
+          <p:nvPr/>
+        </p:nvSpPr>
+        <p:spPr>
+          <a:xfrm>
+            <a:off x="5051232" y="1776269"/>
+            <a:ext cx="2175831" cy="1010377"/>
+          </a:xfrm>
+          <a:prstGeom prst="wedgeRoundRectCallout">
+            <a:avLst>
+              <a:gd name="adj1" fmla="val -78555"/>
+              <a:gd name="adj2" fmla="val 62500"/>
+              <a:gd name="adj3" fmla="val 16667"/>
+            </a:avLst>
+          </a:prstGeom>
+        </p:spPr>
+        <p:style>
+          <a:lnRef idx="2">
+            <a:schemeClr val="accent1">
+              <a:shade val="50000"/>
+            </a:schemeClr>
+          </a:lnRef>
+          <a:fillRef idx="1">
+            <a:schemeClr val="accent1"/>
+          </a:fillRef>
+          <a:effectRef idx="0">
+            <a:schemeClr val="accent1"/>
+          </a:effectRef>
+          <a:fontRef idx="minor">
+            <a:schemeClr val="lt1"/>
+          </a:fontRef>
+        </p:style>
+        <p:txBody>
+          <a:bodyPr rtlCol="0" anchor="ctr"/>
+          <a:lstStyle/>
+          <a:p>
+            <a:pPr algn="ctr"/>
+            <a:r>
+              <a:rPr lang="es-ES_tradnl" sz="3200" dirty="0" smtClean="0"/>
+              <a:t>Apertura</a:t>
+            </a:r>
+            <a:endParaRPr lang="en-US" sz="3200" dirty="0"/>
+          </a:p>
+        </p:txBody>
+      </p:sp>
+      <p:sp>
+        <p:nvSpPr>
+          <p:cNvPr id="5" name="Rounded Rectangular Callout 4"/>
+          <p:cNvSpPr/>
+          <p:nvPr/>
+        </p:nvSpPr>
+        <p:spPr>
+          <a:xfrm>
+            <a:off x="4996149" y="4483865"/>
+            <a:ext cx="1779225" cy="1010377"/>
+          </a:xfrm>
+          <a:prstGeom prst="wedgeRoundRectCallout">
+            <a:avLst>
+              <a:gd name="adj1" fmla="val -78555"/>
+              <a:gd name="adj2" fmla="val -70525"/>
+              <a:gd name="adj3" fmla="val 16667"/>
+            </a:avLst>
+          </a:prstGeom>
+        </p:spPr>
+        <p:style>
+          <a:lnRef idx="2">
+            <a:schemeClr val="accent1">
+              <a:shade val="50000"/>
+            </a:schemeClr>
+          </a:lnRef>
+          <a:fillRef idx="1">
+            <a:schemeClr val="accent1"/>
+          </a:fillRef>
+          <a:effectRef idx="0">
+            <a:schemeClr val="accent1"/>
+          </a:effectRef>
+          <a:fontRef idx="minor">
+            <a:schemeClr val="lt1"/>
+          </a:fontRef>
+        </p:style>
+        <p:txBody>
+          <a:bodyPr rtlCol="0" anchor="ctr"/>
+          <a:lstStyle/>
+          <a:p>
+            <a:pPr algn="ctr"/>
+            <a:r>
+              <a:rPr lang="es-ES_tradnl" sz="3200" dirty="0" smtClean="0"/>
+              <a:t>Cierre</a:t>
+            </a:r>
+            <a:endParaRPr lang="en-US" sz="3200" dirty="0"/>
           </a:p>
         </p:txBody>
       </p:sp>
     </p:spTree>
     <p:extLst>
       <p:ext uri="{BB962C8B-B14F-4D97-AF65-F5344CB8AC3E}">
-        <p14:creationId xmlns:p14="http://schemas.microsoft.com/office/powerpoint/2010/main" val="2313433037"/>
+        <p14:creationId xmlns:p14="http://schemas.microsoft.com/office/powerpoint/2010/main" val="2483002363"/>
+      </p:ext>
+    </p:extLst>
+  </p:cSld>
+  <p:clrMapOvr>
+    <a:masterClrMapping/>
+  </p:clrMapOvr>
+</p:sld>
+</file>
+
+<file path=ppt/slides/slide7.xml><?xml version="1.0" encoding="utf-8"?>
+<p:sld xmlns:a="http://schemas.openxmlformats.org/drawingml/2006/main" xmlns:r="http://schemas.openxmlformats.org/officeDocument/2006/relationships" xmlns:p="http://schemas.openxmlformats.org/presentationml/2006/main">
+  <p:cSld>
+    <p:spTree>
+      <p:nvGrpSpPr>
+        <p:cNvPr id="1" name=""/>
+        <p:cNvGrpSpPr/>
+        <p:nvPr/>
+      </p:nvGrpSpPr>
+      <p:grpSpPr>
+        <a:xfrm>
+          <a:off x="0" y="0"/>
+          <a:ext cx="0" cy="0"/>
+          <a:chOff x="0" y="0"/>
+          <a:chExt cx="0" cy="0"/>
+        </a:xfrm>
+      </p:grpSpPr>
+      <p:sp>
+        <p:nvSpPr>
+          <p:cNvPr id="2" name="Title 1"/>
+          <p:cNvSpPr>
+            <a:spLocks noGrp="1"/>
+          </p:cNvSpPr>
+          <p:nvPr>
+            <p:ph type="title"/>
+          </p:nvPr>
+        </p:nvSpPr>
+        <p:spPr/>
+        <p:txBody>
+          <a:bodyPr/>
+          <a:lstStyle/>
+          <a:p>
+            <a:r>
+              <a:rPr lang="es-ES_tradnl" dirty="0" smtClean="0"/>
+              <a:t>Estructura básica</a:t>
+            </a:r>
+            <a:endParaRPr lang="en-US" dirty="0"/>
+          </a:p>
+        </p:txBody>
+      </p:sp>
+      <p:sp>
+        <p:nvSpPr>
+          <p:cNvPr id="3" name="Content Placeholder 2"/>
+          <p:cNvSpPr>
+            <a:spLocks noGrp="1"/>
+          </p:cNvSpPr>
+          <p:nvPr>
+            <p:ph idx="1"/>
+          </p:nvPr>
+        </p:nvSpPr>
+        <p:spPr/>
+        <p:txBody>
+          <a:bodyPr/>
+          <a:lstStyle/>
+          <a:p>
+            <a:pPr marL="0" indent="0">
+              <a:buNone/>
+            </a:pPr>
+            <a:r>
+              <a:rPr lang="es-ES_tradnl" dirty="0" smtClean="0"/>
+              <a:t>&lt;</a:t>
+            </a:r>
+            <a:r>
+              <a:rPr lang="es-ES_tradnl" dirty="0" err="1" smtClean="0"/>
+              <a:t>html</a:t>
+            </a:r>
+            <a:r>
+              <a:rPr lang="es-ES_tradnl" dirty="0" smtClean="0"/>
+              <a:t>&gt;</a:t>
+            </a:r>
+          </a:p>
+          <a:p>
+            <a:pPr marL="457200" lvl="1" indent="0">
+              <a:buNone/>
+            </a:pPr>
+            <a:r>
+              <a:rPr lang="es-ES_tradnl" dirty="0" smtClean="0">
+                <a:solidFill>
+                  <a:srgbClr val="00B050"/>
+                </a:solidFill>
+              </a:rPr>
+              <a:t>&lt;head&gt;</a:t>
+            </a:r>
+          </a:p>
+          <a:p>
+            <a:pPr marL="457200" lvl="1" indent="0">
+              <a:buNone/>
+            </a:pPr>
+            <a:r>
+              <a:rPr lang="es-ES_tradnl" dirty="0" smtClean="0">
+                <a:solidFill>
+                  <a:srgbClr val="00B050"/>
+                </a:solidFill>
+              </a:rPr>
+              <a:t>…</a:t>
+            </a:r>
+          </a:p>
+          <a:p>
+            <a:pPr marL="457200" lvl="1" indent="0">
+              <a:buNone/>
+            </a:pPr>
+            <a:r>
+              <a:rPr lang="es-ES_tradnl" dirty="0" smtClean="0">
+                <a:solidFill>
+                  <a:srgbClr val="00B050"/>
+                </a:solidFill>
+              </a:rPr>
+              <a:t>&lt;/head&gt;</a:t>
+            </a:r>
+          </a:p>
+          <a:p>
+            <a:pPr marL="457200" lvl="1" indent="0">
+              <a:buNone/>
+            </a:pPr>
+            <a:r>
+              <a:rPr lang="es-ES_tradnl" dirty="0" smtClean="0">
+                <a:solidFill>
+                  <a:schemeClr val="accent2">
+                    <a:lumMod val="75000"/>
+                  </a:schemeClr>
+                </a:solidFill>
+              </a:rPr>
+              <a:t>&lt;</a:t>
+            </a:r>
+            <a:r>
+              <a:rPr lang="es-ES_tradnl" dirty="0" err="1" smtClean="0">
+                <a:solidFill>
+                  <a:schemeClr val="accent2">
+                    <a:lumMod val="75000"/>
+                  </a:schemeClr>
+                </a:solidFill>
+              </a:rPr>
+              <a:t>body</a:t>
+            </a:r>
+            <a:r>
+              <a:rPr lang="es-ES_tradnl" dirty="0" smtClean="0">
+                <a:solidFill>
+                  <a:schemeClr val="accent2">
+                    <a:lumMod val="75000"/>
+                  </a:schemeClr>
+                </a:solidFill>
+              </a:rPr>
+              <a:t>&gt;</a:t>
+            </a:r>
+          </a:p>
+          <a:p>
+            <a:pPr marL="457200" lvl="1" indent="0">
+              <a:buNone/>
+            </a:pPr>
+            <a:r>
+              <a:rPr lang="es-ES_tradnl" dirty="0" smtClean="0">
+                <a:solidFill>
+                  <a:schemeClr val="accent2">
+                    <a:lumMod val="75000"/>
+                  </a:schemeClr>
+                </a:solidFill>
+              </a:rPr>
+              <a:t>…</a:t>
+            </a:r>
+          </a:p>
+          <a:p>
+            <a:pPr marL="457200" lvl="1" indent="0">
+              <a:buNone/>
+            </a:pPr>
+            <a:r>
+              <a:rPr lang="es-ES_tradnl" dirty="0" smtClean="0">
+                <a:solidFill>
+                  <a:schemeClr val="accent2">
+                    <a:lumMod val="75000"/>
+                  </a:schemeClr>
+                </a:solidFill>
+              </a:rPr>
+              <a:t>&lt;/</a:t>
+            </a:r>
+            <a:r>
+              <a:rPr lang="es-ES_tradnl" dirty="0" err="1" smtClean="0">
+                <a:solidFill>
+                  <a:schemeClr val="accent2">
+                    <a:lumMod val="75000"/>
+                  </a:schemeClr>
+                </a:solidFill>
+              </a:rPr>
+              <a:t>body</a:t>
+            </a:r>
+            <a:r>
+              <a:rPr lang="es-ES_tradnl" dirty="0" smtClean="0">
+                <a:solidFill>
+                  <a:schemeClr val="accent2">
+                    <a:lumMod val="75000"/>
+                  </a:schemeClr>
+                </a:solidFill>
+              </a:rPr>
+              <a:t>&gt;</a:t>
+            </a:r>
+          </a:p>
+          <a:p>
+            <a:pPr marL="0" indent="0">
+              <a:buNone/>
+            </a:pPr>
+            <a:r>
+              <a:rPr lang="es-ES_tradnl" dirty="0" smtClean="0"/>
+              <a:t>&lt;/</a:t>
+            </a:r>
+            <a:r>
+              <a:rPr lang="es-ES_tradnl" dirty="0" err="1" smtClean="0"/>
+              <a:t>html</a:t>
+            </a:r>
+            <a:r>
+              <a:rPr lang="es-ES_tradnl" dirty="0" smtClean="0"/>
+              <a:t>&gt;</a:t>
+            </a:r>
+            <a:endParaRPr lang="en-US" dirty="0"/>
+          </a:p>
+        </p:txBody>
+      </p:sp>
+    </p:spTree>
+    <p:extLst>
+      <p:ext uri="{BB962C8B-B14F-4D97-AF65-F5344CB8AC3E}">
+        <p14:creationId xmlns:p14="http://schemas.microsoft.com/office/powerpoint/2010/main" val="2347869269"/>
+      </p:ext>
+    </p:extLst>
+  </p:cSld>
+  <p:clrMapOvr>
+    <a:masterClrMapping/>
+  </p:clrMapOvr>
+</p:sld>
+</file>
+
+<file path=ppt/slides/slide8.xml><?xml version="1.0" encoding="utf-8"?>
+<p:sld xmlns:a="http://schemas.openxmlformats.org/drawingml/2006/main" xmlns:r="http://schemas.openxmlformats.org/officeDocument/2006/relationships" xmlns:p="http://schemas.openxmlformats.org/presentationml/2006/main">
+  <p:cSld>
+    <p:spTree>
+      <p:nvGrpSpPr>
+        <p:cNvPr id="1" name=""/>
+        <p:cNvGrpSpPr/>
+        <p:nvPr/>
+      </p:nvGrpSpPr>
+      <p:grpSpPr>
+        <a:xfrm>
+          <a:off x="0" y="0"/>
+          <a:ext cx="0" cy="0"/>
+          <a:chOff x="0" y="0"/>
+          <a:chExt cx="0" cy="0"/>
+        </a:xfrm>
+      </p:grpSpPr>
+      <p:sp>
+        <p:nvSpPr>
+          <p:cNvPr id="2" name="Title 1"/>
+          <p:cNvSpPr>
+            <a:spLocks noGrp="1"/>
+          </p:cNvSpPr>
+          <p:nvPr>
+            <p:ph type="title"/>
+          </p:nvPr>
+        </p:nvSpPr>
+        <p:spPr/>
+        <p:txBody>
+          <a:bodyPr/>
+          <a:lstStyle/>
+          <a:p>
+            <a:r>
+              <a:rPr lang="es-ES_tradnl" dirty="0" smtClean="0"/>
+              <a:t>Modelo basado en cajas</a:t>
+            </a:r>
+            <a:endParaRPr lang="en-US" dirty="0"/>
+          </a:p>
+        </p:txBody>
+      </p:sp>
+      <p:sp>
+        <p:nvSpPr>
+          <p:cNvPr id="3" name="Content Placeholder 2"/>
+          <p:cNvSpPr>
+            <a:spLocks noGrp="1"/>
+          </p:cNvSpPr>
+          <p:nvPr>
+            <p:ph idx="1"/>
+          </p:nvPr>
+        </p:nvSpPr>
+        <p:spPr/>
+        <p:txBody>
+          <a:bodyPr/>
+          <a:lstStyle/>
+          <a:p>
+            <a:r>
+              <a:rPr lang="es-ES_tradnl" dirty="0" err="1" smtClean="0"/>
+              <a:t>Boxing</a:t>
+            </a:r>
+            <a:r>
+              <a:rPr lang="es-ES_tradnl" dirty="0" smtClean="0"/>
+              <a:t> vs </a:t>
+            </a:r>
+            <a:r>
+              <a:rPr lang="es-ES_tradnl" dirty="0" err="1" smtClean="0"/>
+              <a:t>inline</a:t>
+            </a:r>
+            <a:endParaRPr lang="en-US" dirty="0"/>
+          </a:p>
+        </p:txBody>
+      </p:sp>
+    </p:spTree>
+    <p:extLst>
+      <p:ext uri="{BB962C8B-B14F-4D97-AF65-F5344CB8AC3E}">
+        <p14:creationId xmlns:p14="http://schemas.microsoft.com/office/powerpoint/2010/main" val="3714999485"/>
+      </p:ext>
+    </p:extLst>
+  </p:cSld>
+  <p:clrMapOvr>
+    <a:masterClrMapping/>
+  </p:clrMapOvr>
+</p:sld>
+</file>
+
+<file path=ppt/slides/slide9.xml><?xml version="1.0" encoding="utf-8"?>
+<p:sld xmlns:a="http://schemas.openxmlformats.org/drawingml/2006/main" xmlns:r="http://schemas.openxmlformats.org/officeDocument/2006/relationships" xmlns:p="http://schemas.openxmlformats.org/presentationml/2006/main">
+  <p:cSld>
+    <p:spTree>
+      <p:nvGrpSpPr>
+        <p:cNvPr id="1" name=""/>
+        <p:cNvGrpSpPr/>
+        <p:nvPr/>
+      </p:nvGrpSpPr>
+      <p:grpSpPr>
+        <a:xfrm>
+          <a:off x="0" y="0"/>
+          <a:ext cx="0" cy="0"/>
+          <a:chOff x="0" y="0"/>
+          <a:chExt cx="0" cy="0"/>
+        </a:xfrm>
+      </p:grpSpPr>
+      <p:sp>
+        <p:nvSpPr>
+          <p:cNvPr id="2" name="Title 1"/>
+          <p:cNvSpPr>
+            <a:spLocks noGrp="1"/>
+          </p:cNvSpPr>
+          <p:nvPr>
+            <p:ph type="title"/>
+          </p:nvPr>
+        </p:nvSpPr>
+        <p:spPr/>
+        <p:txBody>
+          <a:bodyPr/>
+          <a:lstStyle/>
+          <a:p>
+            <a:r>
+              <a:rPr lang="es-ES_tradnl" dirty="0" smtClean="0"/>
+              <a:t>Elementos Básicos </a:t>
+            </a:r>
+            <a:r>
+              <a:rPr lang="es-ES_tradnl" dirty="0" err="1" smtClean="0"/>
+              <a:t>body</a:t>
+            </a:r>
+            <a:endParaRPr lang="en-US" dirty="0"/>
+          </a:p>
+        </p:txBody>
+      </p:sp>
+      <p:sp>
+        <p:nvSpPr>
+          <p:cNvPr id="3" name="Content Placeholder 2"/>
+          <p:cNvSpPr>
+            <a:spLocks noGrp="1"/>
+          </p:cNvSpPr>
+          <p:nvPr>
+            <p:ph idx="1"/>
+          </p:nvPr>
+        </p:nvSpPr>
+        <p:spPr/>
+        <p:txBody>
+          <a:bodyPr>
+            <a:normAutofit lnSpcReduction="10000"/>
+          </a:bodyPr>
+          <a:lstStyle/>
+          <a:p>
+            <a:r>
+              <a:rPr lang="es-ES_tradnl" dirty="0" smtClean="0"/>
+              <a:t>&lt;p&gt;</a:t>
+            </a:r>
+          </a:p>
+          <a:p>
+            <a:r>
+              <a:rPr lang="es-ES_tradnl" dirty="0" smtClean="0"/>
+              <a:t>&lt;a&gt;</a:t>
+            </a:r>
+          </a:p>
+          <a:p>
+            <a:r>
+              <a:rPr lang="es-ES_tradnl" dirty="0" smtClean="0"/>
+              <a:t>&lt;</a:t>
+            </a:r>
+            <a:r>
+              <a:rPr lang="es-ES_tradnl" dirty="0" err="1"/>
+              <a:t>s</a:t>
+            </a:r>
+            <a:r>
+              <a:rPr lang="es-ES_tradnl" dirty="0" err="1" smtClean="0"/>
+              <a:t>trong</a:t>
+            </a:r>
+            <a:r>
+              <a:rPr lang="es-ES_tradnl" dirty="0" smtClean="0"/>
+              <a:t>&gt;</a:t>
+            </a:r>
+          </a:p>
+          <a:p>
+            <a:r>
+              <a:rPr lang="es-ES_tradnl" dirty="0" smtClean="0"/>
+              <a:t>&lt;</a:t>
+            </a:r>
+            <a:r>
+              <a:rPr lang="es-ES_tradnl" dirty="0" err="1" smtClean="0"/>
+              <a:t>em</a:t>
+            </a:r>
+            <a:r>
+              <a:rPr lang="es-ES_tradnl" dirty="0" smtClean="0"/>
+              <a:t>&gt;</a:t>
+            </a:r>
+          </a:p>
+          <a:p>
+            <a:r>
+              <a:rPr lang="es-ES_tradnl" dirty="0" smtClean="0"/>
+              <a:t>&lt;h1&gt; &lt;h2&gt; … &lt;h6&gt;</a:t>
+            </a:r>
+          </a:p>
+          <a:p>
+            <a:r>
+              <a:rPr lang="es-ES_tradnl" dirty="0" smtClean="0"/>
+              <a:t>&lt;div&gt;</a:t>
+            </a:r>
+          </a:p>
+          <a:p>
+            <a:r>
+              <a:rPr lang="es-ES_tradnl" dirty="0" smtClean="0"/>
+              <a:t>&lt;</a:t>
+            </a:r>
+            <a:r>
+              <a:rPr lang="es-ES_tradnl" dirty="0" err="1" smtClean="0"/>
+              <a:t>span</a:t>
+            </a:r>
+            <a:r>
+              <a:rPr lang="es-ES_tradnl" dirty="0" smtClean="0"/>
+              <a:t>&gt;</a:t>
+            </a:r>
+          </a:p>
+          <a:p>
+            <a:r>
+              <a:rPr lang="es-ES_tradnl" dirty="0" smtClean="0"/>
+              <a:t>&lt;</a:t>
+            </a:r>
+            <a:r>
+              <a:rPr lang="es-ES_tradnl" dirty="0" err="1" smtClean="0"/>
+              <a:t>img</a:t>
+            </a:r>
+            <a:r>
+              <a:rPr lang="es-ES_tradnl" dirty="0" smtClean="0"/>
+              <a:t>&gt;</a:t>
+            </a:r>
+          </a:p>
+          <a:p>
+            <a:r>
+              <a:rPr lang="es-ES_tradnl" dirty="0" smtClean="0"/>
+              <a:t>&lt;input&gt;</a:t>
+            </a:r>
+            <a:endParaRPr lang="en-US" dirty="0"/>
+          </a:p>
+        </p:txBody>
+      </p:sp>
+    </p:spTree>
+    <p:extLst>
+      <p:ext uri="{BB962C8B-B14F-4D97-AF65-F5344CB8AC3E}">
+        <p14:creationId xmlns:p14="http://schemas.microsoft.com/office/powerpoint/2010/main" val="1457222021"/>
       </p:ext>
     </p:extLst>
   </p:cSld>

</xml_diff>

<commit_message>
# Algunos arreglos menores
</commit_message>
<xml_diff>
--- a/Slides/Clase.pptx
+++ b/Slides/Clase.pptx
@@ -5,40 +5,38 @@
     <p:sldMasterId id="2147483648" r:id="rId1"/>
   </p:sldMasterIdLst>
   <p:notesMasterIdLst>
-    <p:notesMasterId r:id="rId33"/>
+    <p:notesMasterId r:id="rId31"/>
   </p:notesMasterIdLst>
   <p:sldIdLst>
     <p:sldId id="256" r:id="rId2"/>
-    <p:sldId id="258" r:id="rId3"/>
-    <p:sldId id="260" r:id="rId4"/>
-    <p:sldId id="277" r:id="rId5"/>
-    <p:sldId id="278" r:id="rId6"/>
-    <p:sldId id="257" r:id="rId7"/>
-    <p:sldId id="262" r:id="rId8"/>
-    <p:sldId id="263" r:id="rId9"/>
-    <p:sldId id="282" r:id="rId10"/>
-    <p:sldId id="265" r:id="rId11"/>
-    <p:sldId id="267" r:id="rId12"/>
-    <p:sldId id="264" r:id="rId13"/>
-    <p:sldId id="266" r:id="rId14"/>
-    <p:sldId id="268" r:id="rId15"/>
-    <p:sldId id="269" r:id="rId16"/>
-    <p:sldId id="270" r:id="rId17"/>
-    <p:sldId id="271" r:id="rId18"/>
-    <p:sldId id="280" r:id="rId19"/>
-    <p:sldId id="272" r:id="rId20"/>
-    <p:sldId id="274" r:id="rId21"/>
-    <p:sldId id="273" r:id="rId22"/>
-    <p:sldId id="279" r:id="rId23"/>
-    <p:sldId id="275" r:id="rId24"/>
-    <p:sldId id="285" r:id="rId25"/>
-    <p:sldId id="284" r:id="rId26"/>
-    <p:sldId id="276" r:id="rId27"/>
-    <p:sldId id="286" r:id="rId28"/>
-    <p:sldId id="287" r:id="rId29"/>
+    <p:sldId id="260" r:id="rId3"/>
+    <p:sldId id="277" r:id="rId4"/>
+    <p:sldId id="278" r:id="rId5"/>
+    <p:sldId id="262" r:id="rId6"/>
+    <p:sldId id="263" r:id="rId7"/>
+    <p:sldId id="282" r:id="rId8"/>
+    <p:sldId id="265" r:id="rId9"/>
+    <p:sldId id="267" r:id="rId10"/>
+    <p:sldId id="264" r:id="rId11"/>
+    <p:sldId id="266" r:id="rId12"/>
+    <p:sldId id="268" r:id="rId13"/>
+    <p:sldId id="269" r:id="rId14"/>
+    <p:sldId id="270" r:id="rId15"/>
+    <p:sldId id="271" r:id="rId16"/>
+    <p:sldId id="280" r:id="rId17"/>
+    <p:sldId id="272" r:id="rId18"/>
+    <p:sldId id="274" r:id="rId19"/>
+    <p:sldId id="273" r:id="rId20"/>
+    <p:sldId id="279" r:id="rId21"/>
+    <p:sldId id="275" r:id="rId22"/>
+    <p:sldId id="285" r:id="rId23"/>
+    <p:sldId id="284" r:id="rId24"/>
+    <p:sldId id="276" r:id="rId25"/>
+    <p:sldId id="286" r:id="rId26"/>
+    <p:sldId id="287" r:id="rId27"/>
+    <p:sldId id="261" r:id="rId28"/>
+    <p:sldId id="283" r:id="rId29"/>
     <p:sldId id="259" r:id="rId30"/>
-    <p:sldId id="261" r:id="rId31"/>
-    <p:sldId id="283" r:id="rId32"/>
   </p:sldIdLst>
   <p:sldSz cx="12192000" cy="6858000"/>
   <p:notesSz cx="6858000" cy="9144000"/>
@@ -623,7 +621,7 @@
           <a:p>
             <a:fld id="{33490EC4-9ED2-4743-9A12-62D7D00FD99C}" type="slidenum">
               <a:rPr lang="en-US" smtClean="0"/>
-              <a:t>3</a:t>
+              <a:t>2</a:t>
             </a:fld>
             <a:endParaRPr lang="en-US"/>
           </a:p>
@@ -743,7 +741,7 @@
           <a:p>
             <a:fld id="{33490EC4-9ED2-4743-9A12-62D7D00FD99C}" type="slidenum">
               <a:rPr lang="en-US" smtClean="0"/>
-              <a:t>11</a:t>
+              <a:t>9</a:t>
             </a:fld>
             <a:endParaRPr lang="en-US"/>
           </a:p>
@@ -883,7 +881,7 @@
           <a:p>
             <a:fld id="{33490EC4-9ED2-4743-9A12-62D7D00FD99C}" type="slidenum">
               <a:rPr lang="en-US" smtClean="0"/>
-              <a:t>26</a:t>
+              <a:t>24</a:t>
             </a:fld>
             <a:endParaRPr lang="en-US"/>
           </a:p>
@@ -3852,7 +3850,11 @@
           <a:p>
             <a:r>
               <a:rPr lang="es-ES_tradnl" dirty="0" smtClean="0"/>
-              <a:t>Estructura básica</a:t>
+              <a:t>Elementos Básicos </a:t>
+            </a:r>
+            <a:r>
+              <a:rPr lang="es-ES_tradnl" dirty="0" err="1" smtClean="0"/>
+              <a:t>body</a:t>
             </a:r>
             <a:endParaRPr lang="en-US" dirty="0"/>
           </a:p>
@@ -3870,164 +3872,184 @@
         </p:nvSpPr>
         <p:spPr/>
         <p:txBody>
-          <a:bodyPr/>
-          <a:lstStyle/>
-          <a:p>
-            <a:pPr marL="0" indent="0">
-              <a:buNone/>
-            </a:pPr>
+          <a:bodyPr>
+            <a:normAutofit lnSpcReduction="10000"/>
+          </a:bodyPr>
+          <a:lstStyle/>
+          <a:p>
+            <a:r>
+              <a:rPr lang="es-ES_tradnl" dirty="0" smtClean="0"/>
+              <a:t>&lt;p&gt; </a:t>
+            </a:r>
+            <a:r>
+              <a:rPr lang="es-ES_tradnl" dirty="0" smtClean="0">
+                <a:sym typeface="Wingdings" panose="05000000000000000000" pitchFamily="2" charset="2"/>
+              </a:rPr>
+              <a:t> párrafo</a:t>
+            </a:r>
+            <a:endParaRPr lang="es-ES_tradnl" dirty="0" smtClean="0"/>
+          </a:p>
+          <a:p>
+            <a:r>
+              <a:rPr lang="es-ES_tradnl" dirty="0" smtClean="0"/>
+              <a:t>&lt;a&gt; </a:t>
+            </a:r>
+            <a:r>
+              <a:rPr lang="es-ES_tradnl" dirty="0" smtClean="0">
+                <a:sym typeface="Wingdings" panose="05000000000000000000" pitchFamily="2" charset="2"/>
+              </a:rPr>
+              <a:t> link</a:t>
+            </a:r>
+            <a:endParaRPr lang="es-ES_tradnl" dirty="0" smtClean="0"/>
+          </a:p>
+          <a:p>
             <a:r>
               <a:rPr lang="es-ES_tradnl" dirty="0" smtClean="0"/>
               <a:t>&lt;</a:t>
             </a:r>
             <a:r>
+              <a:rPr lang="es-ES_tradnl" dirty="0" err="1"/>
+              <a:t>s</a:t>
+            </a:r>
+            <a:r>
               <a:rPr lang="es-ES_tradnl" dirty="0" err="1" smtClean="0"/>
-              <a:t>html</a:t>
+              <a:t>trong</a:t>
             </a:r>
             <a:r>
               <a:rPr lang="es-ES_tradnl" dirty="0" smtClean="0"/>
-              <a:t>&gt;</a:t>
-            </a:r>
-          </a:p>
-          <a:p>
-            <a:pPr marL="457200" lvl="1" indent="0">
-              <a:buNone/>
-            </a:pPr>
+              <a:t>&gt; </a:t>
+            </a:r>
             <a:r>
               <a:rPr lang="es-ES_tradnl" dirty="0" smtClean="0">
-                <a:solidFill>
-                  <a:srgbClr val="00B050"/>
-                </a:solidFill>
-              </a:rPr>
-              <a:t>&lt;head&gt;</a:t>
-            </a:r>
-          </a:p>
-          <a:p>
-            <a:pPr marL="457200" lvl="1" indent="0">
-              <a:buNone/>
-            </a:pPr>
+                <a:sym typeface="Wingdings" panose="05000000000000000000" pitchFamily="2" charset="2"/>
+              </a:rPr>
+              <a:t> negrita</a:t>
+            </a:r>
+            <a:endParaRPr lang="es-ES_tradnl" dirty="0" smtClean="0"/>
+          </a:p>
+          <a:p>
+            <a:r>
+              <a:rPr lang="es-ES_tradnl" dirty="0" smtClean="0"/>
+              <a:t>&lt;</a:t>
+            </a:r>
+            <a:r>
+              <a:rPr lang="es-ES_tradnl" dirty="0" err="1" smtClean="0"/>
+              <a:t>em</a:t>
+            </a:r>
+            <a:r>
+              <a:rPr lang="es-ES_tradnl" dirty="0" smtClean="0"/>
+              <a:t>&gt; </a:t>
+            </a:r>
             <a:r>
               <a:rPr lang="es-ES_tradnl" dirty="0" smtClean="0">
-                <a:solidFill>
-                  <a:srgbClr val="00B050"/>
-                </a:solidFill>
-              </a:rPr>
-              <a:t>…</a:t>
-            </a:r>
-          </a:p>
-          <a:p>
-            <a:pPr marL="457200" lvl="1" indent="0">
-              <a:buNone/>
-            </a:pPr>
+                <a:sym typeface="Wingdings" panose="05000000000000000000" pitchFamily="2" charset="2"/>
+              </a:rPr>
+              <a:t> itálica</a:t>
+            </a:r>
+            <a:endParaRPr lang="es-ES_tradnl" dirty="0" smtClean="0"/>
+          </a:p>
+          <a:p>
+            <a:r>
+              <a:rPr lang="es-ES_tradnl" dirty="0" smtClean="0"/>
+              <a:t>&lt;h1&gt; &lt;h2&gt; … &lt;h6&gt; </a:t>
+            </a:r>
             <a:r>
               <a:rPr lang="es-ES_tradnl" dirty="0" smtClean="0">
-                <a:solidFill>
-                  <a:srgbClr val="00B050"/>
-                </a:solidFill>
-              </a:rPr>
-              <a:t>&lt;/head&gt;</a:t>
-            </a:r>
-          </a:p>
-          <a:p>
-            <a:pPr marL="457200" lvl="1" indent="0">
-              <a:buNone/>
-            </a:pPr>
+                <a:sym typeface="Wingdings" panose="05000000000000000000" pitchFamily="2" charset="2"/>
+              </a:rPr>
+              <a:t> </a:t>
+            </a:r>
+            <a:r>
+              <a:rPr lang="es-ES_tradnl" dirty="0" err="1" smtClean="0">
+                <a:sym typeface="Wingdings" panose="05000000000000000000" pitchFamily="2" charset="2"/>
+              </a:rPr>
+              <a:t>titulos</a:t>
+            </a:r>
+            <a:endParaRPr lang="es-ES_tradnl" dirty="0" smtClean="0"/>
+          </a:p>
+          <a:p>
+            <a:r>
+              <a:rPr lang="es-ES_tradnl" dirty="0" smtClean="0"/>
+              <a:t>&lt;div&gt; </a:t>
+            </a:r>
+            <a:r>
+              <a:rPr lang="es-ES_tradnl" dirty="0">
+                <a:sym typeface="Wingdings" panose="05000000000000000000" pitchFamily="2" charset="2"/>
+              </a:rPr>
+              <a:t> agrupación de elementos </a:t>
+            </a:r>
             <a:r>
               <a:rPr lang="es-ES_tradnl" dirty="0" smtClean="0">
-                <a:solidFill>
-                  <a:schemeClr val="accent2">
-                    <a:lumMod val="75000"/>
-                  </a:schemeClr>
-                </a:solidFill>
-              </a:rPr>
+                <a:sym typeface="Wingdings" panose="05000000000000000000" pitchFamily="2" charset="2"/>
+              </a:rPr>
+              <a:t>con box</a:t>
+            </a:r>
+            <a:endParaRPr lang="es-ES_tradnl" dirty="0" smtClean="0"/>
+          </a:p>
+          <a:p>
+            <a:r>
+              <a:rPr lang="es-ES_tradnl" dirty="0" smtClean="0"/>
               <a:t>&lt;</a:t>
             </a:r>
             <a:r>
+              <a:rPr lang="es-ES_tradnl" dirty="0" err="1" smtClean="0"/>
+              <a:t>span</a:t>
+            </a:r>
+            <a:r>
+              <a:rPr lang="es-ES_tradnl" dirty="0" smtClean="0"/>
+              <a:t>&gt; </a:t>
+            </a:r>
+            <a:r>
+              <a:rPr lang="es-ES_tradnl" dirty="0" smtClean="0">
+                <a:sym typeface="Wingdings" panose="05000000000000000000" pitchFamily="2" charset="2"/>
+              </a:rPr>
+              <a:t> agrupación de elementos </a:t>
+            </a:r>
+            <a:r>
               <a:rPr lang="es-ES_tradnl" dirty="0" err="1" smtClean="0">
-                <a:solidFill>
-                  <a:schemeClr val="accent2">
-                    <a:lumMod val="75000"/>
-                  </a:schemeClr>
-                </a:solidFill>
-              </a:rPr>
-              <a:t>body</a:t>
+                <a:sym typeface="Wingdings" panose="05000000000000000000" pitchFamily="2" charset="2"/>
+              </a:rPr>
+              <a:t>inline</a:t>
+            </a:r>
+            <a:endParaRPr lang="es-ES_tradnl" dirty="0" smtClean="0"/>
+          </a:p>
+          <a:p>
+            <a:r>
+              <a:rPr lang="es-ES_tradnl" dirty="0" smtClean="0"/>
+              <a:t>&lt;</a:t>
+            </a:r>
+            <a:r>
+              <a:rPr lang="es-ES_tradnl" dirty="0" err="1" smtClean="0"/>
+              <a:t>img</a:t>
+            </a:r>
+            <a:r>
+              <a:rPr lang="es-ES_tradnl" dirty="0" smtClean="0"/>
+              <a:t>&gt; </a:t>
             </a:r>
             <a:r>
               <a:rPr lang="es-ES_tradnl" dirty="0" smtClean="0">
-                <a:solidFill>
-                  <a:schemeClr val="accent2">
-                    <a:lumMod val="75000"/>
-                  </a:schemeClr>
-                </a:solidFill>
-              </a:rPr>
-              <a:t>&gt;</a:t>
-            </a:r>
-          </a:p>
-          <a:p>
-            <a:pPr marL="457200" lvl="1" indent="0">
-              <a:buNone/>
-            </a:pPr>
+                <a:sym typeface="Wingdings" panose="05000000000000000000" pitchFamily="2" charset="2"/>
+              </a:rPr>
+              <a:t> </a:t>
+            </a:r>
+            <a:r>
+              <a:rPr lang="es-ES_tradnl" dirty="0" err="1" smtClean="0">
+                <a:sym typeface="Wingdings" panose="05000000000000000000" pitchFamily="2" charset="2"/>
+              </a:rPr>
+              <a:t>imagenes</a:t>
+            </a:r>
+            <a:endParaRPr lang="es-ES_tradnl" dirty="0" smtClean="0"/>
+          </a:p>
+          <a:p>
+            <a:r>
+              <a:rPr lang="es-ES_tradnl" dirty="0" smtClean="0"/>
+              <a:t>&lt;input&gt; </a:t>
+            </a:r>
             <a:r>
               <a:rPr lang="es-ES_tradnl" dirty="0" smtClean="0">
-                <a:solidFill>
-                  <a:schemeClr val="accent2">
-                    <a:lumMod val="75000"/>
-                  </a:schemeClr>
-                </a:solidFill>
-              </a:rPr>
-              <a:t>…</a:t>
-            </a:r>
-          </a:p>
-          <a:p>
-            <a:pPr marL="457200" lvl="1" indent="0">
-              <a:buNone/>
-            </a:pPr>
-            <a:r>
-              <a:rPr lang="es-ES_tradnl" dirty="0" smtClean="0">
-                <a:solidFill>
-                  <a:schemeClr val="accent2">
-                    <a:lumMod val="75000"/>
-                  </a:schemeClr>
-                </a:solidFill>
-              </a:rPr>
-              <a:t>&lt;/</a:t>
-            </a:r>
-            <a:r>
-              <a:rPr lang="es-ES_tradnl" dirty="0" err="1" smtClean="0">
-                <a:solidFill>
-                  <a:schemeClr val="accent2">
-                    <a:lumMod val="75000"/>
-                  </a:schemeClr>
-                </a:solidFill>
-              </a:rPr>
-              <a:t>body</a:t>
-            </a:r>
-            <a:r>
-              <a:rPr lang="es-ES_tradnl" dirty="0" smtClean="0">
-                <a:solidFill>
-                  <a:schemeClr val="accent2">
-                    <a:lumMod val="75000"/>
-                  </a:schemeClr>
-                </a:solidFill>
-              </a:rPr>
-              <a:t>&gt;</a:t>
-            </a:r>
-          </a:p>
-          <a:p>
-            <a:pPr marL="0" indent="0">
-              <a:buNone/>
-            </a:pPr>
-            <a:r>
-              <a:rPr lang="es-ES_tradnl" dirty="0" smtClean="0"/>
-              <a:t>&lt;/</a:t>
-            </a:r>
-            <a:r>
-              <a:rPr lang="es-ES_tradnl" dirty="0" err="1" smtClean="0"/>
-              <a:t>html</a:t>
-            </a:r>
-            <a:r>
-              <a:rPr lang="es-ES_tradnl" dirty="0" smtClean="0"/>
-              <a:t>&gt;</a:t>
+                <a:sym typeface="Wingdings" panose="05000000000000000000" pitchFamily="2" charset="2"/>
+              </a:rPr>
+              <a:t> inputs en formularios</a:t>
             </a:r>
             <a:endParaRPr lang="en-US" dirty="0"/>
           </a:p>
@@ -4036,7 +4058,7 @@
     </p:spTree>
     <p:extLst>
       <p:ext uri="{BB962C8B-B14F-4D97-AF65-F5344CB8AC3E}">
-        <p14:creationId xmlns:p14="http://schemas.microsoft.com/office/powerpoint/2010/main" val="2347869269"/>
+        <p14:creationId xmlns:p14="http://schemas.microsoft.com/office/powerpoint/2010/main" val="1457222021"/>
       </p:ext>
     </p:extLst>
   </p:cSld>
@@ -4079,284 +4101,84 @@
           <a:lstStyle/>
           <a:p>
             <a:r>
-              <a:rPr lang="es-ES_tradnl" dirty="0"/>
-              <a:t>Block vs </a:t>
+              <a:rPr lang="es-ES_tradnl" dirty="0" smtClean="0"/>
+              <a:t>Elementos básicos Head</a:t>
+            </a:r>
+            <a:endParaRPr lang="en-US" dirty="0"/>
+          </a:p>
+        </p:txBody>
+      </p:sp>
+      <p:sp>
+        <p:nvSpPr>
+          <p:cNvPr id="3" name="Content Placeholder 2"/>
+          <p:cNvSpPr>
+            <a:spLocks noGrp="1"/>
+          </p:cNvSpPr>
+          <p:nvPr>
+            <p:ph idx="1"/>
+          </p:nvPr>
+        </p:nvSpPr>
+        <p:spPr/>
+        <p:txBody>
+          <a:bodyPr/>
+          <a:lstStyle/>
+          <a:p>
+            <a:r>
+              <a:rPr lang="es-ES_tradnl" dirty="0" smtClean="0"/>
+              <a:t>&lt;</a:t>
+            </a:r>
+            <a:r>
+              <a:rPr lang="es-ES_tradnl" dirty="0" err="1"/>
+              <a:t>t</a:t>
             </a:r>
             <a:r>
               <a:rPr lang="es-ES_tradnl" dirty="0" err="1" smtClean="0"/>
-              <a:t>inline</a:t>
+              <a:t>itle</a:t>
+            </a:r>
+            <a:r>
+              <a:rPr lang="es-ES_tradnl" dirty="0" smtClean="0"/>
+              <a:t>&gt;</a:t>
+            </a:r>
+          </a:p>
+          <a:p>
+            <a:r>
+              <a:rPr lang="es-ES_tradnl" dirty="0" smtClean="0"/>
+              <a:t>&lt;meta&gt;</a:t>
+            </a:r>
+          </a:p>
+          <a:p>
+            <a:r>
+              <a:rPr lang="es-ES_tradnl" dirty="0" smtClean="0"/>
+              <a:t>&lt;link&gt;</a:t>
+            </a:r>
+          </a:p>
+          <a:p>
+            <a:r>
+              <a:rPr lang="es-ES_tradnl" dirty="0" smtClean="0"/>
+              <a:t>&lt;script&gt;</a:t>
+            </a:r>
+          </a:p>
+          <a:p>
+            <a:r>
+              <a:rPr lang="es-ES_tradnl" dirty="0" smtClean="0"/>
+              <a:t>&lt;</a:t>
+            </a:r>
+            <a:r>
+              <a:rPr lang="es-ES_tradnl" dirty="0" err="1" smtClean="0"/>
+              <a:t>style</a:t>
+            </a:r>
+            <a:r>
+              <a:rPr lang="es-ES_tradnl" dirty="0" smtClean="0"/>
+              <a:t>&gt;</a:t>
             </a:r>
             <a:endParaRPr lang="en-US" dirty="0"/>
           </a:p>
         </p:txBody>
       </p:sp>
-      <p:grpSp>
-        <p:nvGrpSpPr>
-          <p:cNvPr id="14" name="Group 13"/>
-          <p:cNvGrpSpPr/>
-          <p:nvPr/>
-        </p:nvGrpSpPr>
-        <p:grpSpPr>
-          <a:xfrm>
-            <a:off x="1823047" y="2644131"/>
-            <a:ext cx="8545906" cy="2674638"/>
-            <a:chOff x="2233883" y="2702225"/>
-            <a:chExt cx="8545906" cy="2674638"/>
-          </a:xfrm>
-        </p:grpSpPr>
-        <p:grpSp>
-          <p:nvGrpSpPr>
-            <p:cNvPr id="12" name="Group 11"/>
-            <p:cNvGrpSpPr/>
-            <p:nvPr/>
-          </p:nvGrpSpPr>
-          <p:grpSpPr>
-            <a:xfrm>
-              <a:off x="2233883" y="2961019"/>
-              <a:ext cx="1897812" cy="1828800"/>
-              <a:chOff x="2398145" y="3657601"/>
-              <a:chExt cx="1897812" cy="1828800"/>
-            </a:xfrm>
-          </p:grpSpPr>
-          <p:sp>
-            <p:nvSpPr>
-              <p:cNvPr id="4" name="Rectangle 3"/>
-              <p:cNvSpPr/>
-              <p:nvPr/>
-            </p:nvSpPr>
-            <p:spPr>
-              <a:xfrm>
-                <a:off x="2398146" y="3657601"/>
-                <a:ext cx="1897811" cy="914400"/>
-              </a:xfrm>
-              <a:prstGeom prst="rect">
-                <a:avLst/>
-              </a:prstGeom>
-            </p:spPr>
-            <p:style>
-              <a:lnRef idx="2">
-                <a:schemeClr val="accent1">
-                  <a:shade val="50000"/>
-                </a:schemeClr>
-              </a:lnRef>
-              <a:fillRef idx="1">
-                <a:schemeClr val="accent1"/>
-              </a:fillRef>
-              <a:effectRef idx="0">
-                <a:schemeClr val="accent1"/>
-              </a:effectRef>
-              <a:fontRef idx="minor">
-                <a:schemeClr val="lt1"/>
-              </a:fontRef>
-            </p:style>
-            <p:txBody>
-              <a:bodyPr rtlCol="0" anchor="ctr"/>
-              <a:lstStyle/>
-              <a:p>
-                <a:pPr algn="ctr"/>
-                <a:r>
-                  <a:rPr lang="es-ES_tradnl" sz="3200" dirty="0"/>
-                  <a:t>b</a:t>
-                </a:r>
-                <a:r>
-                  <a:rPr lang="es-ES_tradnl" sz="3200" dirty="0" smtClean="0"/>
-                  <a:t>lock</a:t>
-                </a:r>
-                <a:endParaRPr lang="en-US" sz="3200" dirty="0"/>
-              </a:p>
-            </p:txBody>
-          </p:sp>
-          <p:sp>
-            <p:nvSpPr>
-              <p:cNvPr id="5" name="Rectangle 4"/>
-              <p:cNvSpPr/>
-              <p:nvPr/>
-            </p:nvSpPr>
-            <p:spPr>
-              <a:xfrm>
-                <a:off x="2398145" y="4572001"/>
-                <a:ext cx="1897811" cy="914400"/>
-              </a:xfrm>
-              <a:prstGeom prst="rect">
-                <a:avLst/>
-              </a:prstGeom>
-            </p:spPr>
-            <p:style>
-              <a:lnRef idx="2">
-                <a:schemeClr val="accent1">
-                  <a:shade val="50000"/>
-                </a:schemeClr>
-              </a:lnRef>
-              <a:fillRef idx="1">
-                <a:schemeClr val="accent1"/>
-              </a:fillRef>
-              <a:effectRef idx="0">
-                <a:schemeClr val="accent1"/>
-              </a:effectRef>
-              <a:fontRef idx="minor">
-                <a:schemeClr val="lt1"/>
-              </a:fontRef>
-            </p:style>
-            <p:txBody>
-              <a:bodyPr rtlCol="0" anchor="ctr"/>
-              <a:lstStyle/>
-              <a:p>
-                <a:pPr algn="ctr"/>
-                <a:r>
-                  <a:rPr lang="es-ES_tradnl" sz="3200" dirty="0" smtClean="0"/>
-                  <a:t>block</a:t>
-                </a:r>
-                <a:endParaRPr lang="en-US" sz="3200" dirty="0"/>
-              </a:p>
-            </p:txBody>
-          </p:sp>
-        </p:grpSp>
-        <p:grpSp>
-          <p:nvGrpSpPr>
-            <p:cNvPr id="11" name="Group 10"/>
-            <p:cNvGrpSpPr/>
-            <p:nvPr/>
-          </p:nvGrpSpPr>
-          <p:grpSpPr>
-            <a:xfrm>
-              <a:off x="6984167" y="3339218"/>
-              <a:ext cx="3795622" cy="914400"/>
-              <a:chOff x="6648094" y="3725246"/>
-              <a:chExt cx="3795622" cy="914400"/>
-            </a:xfrm>
-          </p:grpSpPr>
-          <p:sp>
-            <p:nvSpPr>
-              <p:cNvPr id="6" name="Rectangle 5"/>
-              <p:cNvSpPr/>
-              <p:nvPr/>
-            </p:nvSpPr>
-            <p:spPr>
-              <a:xfrm>
-                <a:off x="6648094" y="3725246"/>
-                <a:ext cx="1897811" cy="914400"/>
-              </a:xfrm>
-              <a:prstGeom prst="rect">
-                <a:avLst/>
-              </a:prstGeom>
-            </p:spPr>
-            <p:style>
-              <a:lnRef idx="2">
-                <a:schemeClr val="accent1">
-                  <a:shade val="50000"/>
-                </a:schemeClr>
-              </a:lnRef>
-              <a:fillRef idx="1">
-                <a:schemeClr val="accent1"/>
-              </a:fillRef>
-              <a:effectRef idx="0">
-                <a:schemeClr val="accent1"/>
-              </a:effectRef>
-              <a:fontRef idx="minor">
-                <a:schemeClr val="lt1"/>
-              </a:fontRef>
-            </p:style>
-            <p:txBody>
-              <a:bodyPr rtlCol="0" anchor="ctr"/>
-              <a:lstStyle/>
-              <a:p>
-                <a:pPr algn="ctr"/>
-                <a:r>
-                  <a:rPr lang="es-ES_tradnl" sz="3200" dirty="0" err="1" smtClean="0"/>
-                  <a:t>inline</a:t>
-                </a:r>
-                <a:endParaRPr lang="en-US" sz="3200" dirty="0"/>
-              </a:p>
-            </p:txBody>
-          </p:sp>
-          <p:sp>
-            <p:nvSpPr>
-              <p:cNvPr id="7" name="Rectangle 6"/>
-              <p:cNvSpPr/>
-              <p:nvPr/>
-            </p:nvSpPr>
-            <p:spPr>
-              <a:xfrm>
-                <a:off x="8545905" y="3725246"/>
-                <a:ext cx="1897811" cy="914400"/>
-              </a:xfrm>
-              <a:prstGeom prst="rect">
-                <a:avLst/>
-              </a:prstGeom>
-            </p:spPr>
-            <p:style>
-              <a:lnRef idx="2">
-                <a:schemeClr val="accent1">
-                  <a:shade val="50000"/>
-                </a:schemeClr>
-              </a:lnRef>
-              <a:fillRef idx="1">
-                <a:schemeClr val="accent1"/>
-              </a:fillRef>
-              <a:effectRef idx="0">
-                <a:schemeClr val="accent1"/>
-              </a:effectRef>
-              <a:fontRef idx="minor">
-                <a:schemeClr val="lt1"/>
-              </a:fontRef>
-            </p:style>
-            <p:txBody>
-              <a:bodyPr rtlCol="0" anchor="ctr"/>
-              <a:lstStyle/>
-              <a:p>
-                <a:pPr algn="ctr"/>
-                <a:r>
-                  <a:rPr lang="es-ES_tradnl" sz="3200" dirty="0" err="1" smtClean="0"/>
-                  <a:t>inline</a:t>
-                </a:r>
-                <a:endParaRPr lang="en-US" sz="3200" dirty="0"/>
-              </a:p>
-            </p:txBody>
-          </p:sp>
-        </p:grpSp>
-        <p:cxnSp>
-          <p:nvCxnSpPr>
-            <p:cNvPr id="9" name="Straight Connector 8"/>
-            <p:cNvCxnSpPr/>
-            <p:nvPr/>
-          </p:nvCxnSpPr>
-          <p:spPr>
-            <a:xfrm>
-              <a:off x="6000750" y="2702225"/>
-              <a:ext cx="0" cy="2674638"/>
-            </a:xfrm>
-            <a:prstGeom prst="line">
-              <a:avLst/>
-            </a:prstGeom>
-            <a:ln w="28575">
-              <a:solidFill>
-                <a:schemeClr val="bg2">
-                  <a:lumMod val="75000"/>
-                </a:schemeClr>
-              </a:solidFill>
-              <a:prstDash val="dash"/>
-            </a:ln>
-          </p:spPr>
-          <p:style>
-            <a:lnRef idx="1">
-              <a:schemeClr val="accent1"/>
-            </a:lnRef>
-            <a:fillRef idx="0">
-              <a:schemeClr val="accent1"/>
-            </a:fillRef>
-            <a:effectRef idx="0">
-              <a:schemeClr val="accent1"/>
-            </a:effectRef>
-            <a:fontRef idx="minor">
-              <a:schemeClr val="tx1"/>
-            </a:fontRef>
-          </p:style>
-        </p:cxnSp>
-      </p:grpSp>
     </p:spTree>
     <p:extLst>
       <p:ext uri="{BB962C8B-B14F-4D97-AF65-F5344CB8AC3E}">
-        <p14:creationId xmlns:p14="http://schemas.microsoft.com/office/powerpoint/2010/main" val="3714999485"/>
+        <p14:creationId xmlns:p14="http://schemas.microsoft.com/office/powerpoint/2010/main" val="202465279"/>
       </p:ext>
     </p:extLst>
   </p:cSld>
@@ -4400,226 +4222,48 @@
           <a:p>
             <a:r>
               <a:rPr lang="es-ES_tradnl" dirty="0" smtClean="0"/>
-              <a:t>Elementos Básicos </a:t>
+              <a:t>HTML 5</a:t>
+            </a:r>
+            <a:endParaRPr lang="en-US" dirty="0"/>
+          </a:p>
+        </p:txBody>
+      </p:sp>
+      <p:sp>
+        <p:nvSpPr>
+          <p:cNvPr id="3" name="Content Placeholder 2"/>
+          <p:cNvSpPr>
+            <a:spLocks noGrp="1"/>
+          </p:cNvSpPr>
+          <p:nvPr>
+            <p:ph idx="1"/>
+          </p:nvPr>
+        </p:nvSpPr>
+        <p:spPr/>
+        <p:txBody>
+          <a:bodyPr/>
+          <a:lstStyle/>
+          <a:p>
+            <a:r>
+              <a:rPr lang="es-ES_tradnl" dirty="0" smtClean="0"/>
+              <a:t>&lt;!DOCTYPE </a:t>
             </a:r>
             <a:r>
               <a:rPr lang="es-ES_tradnl" dirty="0" err="1" smtClean="0"/>
-              <a:t>body</a:t>
-            </a:r>
-            <a:endParaRPr lang="en-US" dirty="0"/>
-          </a:p>
-        </p:txBody>
-      </p:sp>
-      <p:sp>
-        <p:nvSpPr>
-          <p:cNvPr id="3" name="Content Placeholder 2"/>
-          <p:cNvSpPr>
-            <a:spLocks noGrp="1"/>
-          </p:cNvSpPr>
-          <p:nvPr>
-            <p:ph idx="1"/>
-          </p:nvPr>
-        </p:nvSpPr>
-        <p:spPr/>
-        <p:txBody>
-          <a:bodyPr>
-            <a:normAutofit lnSpcReduction="10000"/>
-          </a:bodyPr>
-          <a:lstStyle/>
-          <a:p>
+              <a:t>html</a:t>
+            </a:r>
             <a:r>
               <a:rPr lang="es-ES_tradnl" dirty="0" smtClean="0"/>
-              <a:t>&lt;p</a:t>
-            </a:r>
+              <a:t>&gt;</a:t>
+            </a:r>
+          </a:p>
+          <a:p>
             <a:r>
               <a:rPr lang="es-ES_tradnl" dirty="0" smtClean="0"/>
-              <a:t>&gt; </a:t>
-            </a:r>
-            <a:r>
-              <a:rPr lang="es-ES_tradnl" dirty="0" smtClean="0">
-                <a:sym typeface="Wingdings" panose="05000000000000000000" pitchFamily="2" charset="2"/>
-              </a:rPr>
-              <a:t> párrafo</a:t>
-            </a:r>
-            <a:endParaRPr lang="es-ES_tradnl" dirty="0" smtClean="0"/>
-          </a:p>
-          <a:p>
-            <a:r>
-              <a:rPr lang="es-ES_tradnl" dirty="0" smtClean="0"/>
-              <a:t>&lt;a</a:t>
-            </a:r>
-            <a:r>
-              <a:rPr lang="es-ES_tradnl" dirty="0" smtClean="0"/>
-              <a:t>&gt; </a:t>
-            </a:r>
-            <a:r>
-              <a:rPr lang="es-ES_tradnl" dirty="0" smtClean="0">
-                <a:sym typeface="Wingdings" panose="05000000000000000000" pitchFamily="2" charset="2"/>
-              </a:rPr>
-              <a:t> link</a:t>
-            </a:r>
-            <a:endParaRPr lang="es-ES_tradnl" dirty="0" smtClean="0"/>
-          </a:p>
-          <a:p>
-            <a:r>
-              <a:rPr lang="es-ES_tradnl" dirty="0" smtClean="0"/>
-              <a:t>&lt;</a:t>
-            </a:r>
-            <a:r>
-              <a:rPr lang="es-ES_tradnl" dirty="0" err="1"/>
-              <a:t>s</a:t>
+              <a:t>Nuevos </a:t>
             </a:r>
             <a:r>
               <a:rPr lang="es-ES_tradnl" dirty="0" err="1" smtClean="0"/>
-              <a:t>trong</a:t>
-            </a:r>
-            <a:r>
-              <a:rPr lang="es-ES_tradnl" dirty="0" smtClean="0"/>
-              <a:t>&gt; </a:t>
-            </a:r>
-            <a:r>
-              <a:rPr lang="es-ES_tradnl" dirty="0" smtClean="0">
-                <a:sym typeface="Wingdings" panose="05000000000000000000" pitchFamily="2" charset="2"/>
-              </a:rPr>
-              <a:t> negrita</a:t>
-            </a:r>
-            <a:endParaRPr lang="es-ES_tradnl" dirty="0" smtClean="0"/>
-          </a:p>
-          <a:p>
-            <a:r>
-              <a:rPr lang="es-ES_tradnl" dirty="0" smtClean="0"/>
-              <a:t>&lt;</a:t>
-            </a:r>
-            <a:r>
-              <a:rPr lang="es-ES_tradnl" dirty="0" err="1" smtClean="0"/>
-              <a:t>em</a:t>
-            </a:r>
-            <a:r>
-              <a:rPr lang="es-ES_tradnl" dirty="0" smtClean="0"/>
-              <a:t>&gt; </a:t>
-            </a:r>
-            <a:r>
-              <a:rPr lang="es-ES_tradnl" dirty="0" smtClean="0">
-                <a:sym typeface="Wingdings" panose="05000000000000000000" pitchFamily="2" charset="2"/>
-              </a:rPr>
-              <a:t> itálica</a:t>
-            </a:r>
-            <a:endParaRPr lang="es-ES_tradnl" dirty="0" smtClean="0"/>
-          </a:p>
-          <a:p>
-            <a:r>
-              <a:rPr lang="es-ES_tradnl" dirty="0" smtClean="0"/>
-              <a:t>&lt;h1&gt; &lt;h2&gt; … &lt;h6</a:t>
-            </a:r>
-            <a:r>
-              <a:rPr lang="es-ES_tradnl" dirty="0" smtClean="0"/>
-              <a:t>&gt; </a:t>
-            </a:r>
-            <a:r>
-              <a:rPr lang="es-ES_tradnl" dirty="0" smtClean="0">
-                <a:sym typeface="Wingdings" panose="05000000000000000000" pitchFamily="2" charset="2"/>
-              </a:rPr>
-              <a:t> </a:t>
-            </a:r>
-            <a:r>
-              <a:rPr lang="es-ES_tradnl" dirty="0" err="1" smtClean="0">
-                <a:sym typeface="Wingdings" panose="05000000000000000000" pitchFamily="2" charset="2"/>
-              </a:rPr>
-              <a:t>titulos</a:t>
-            </a:r>
-            <a:endParaRPr lang="es-ES_tradnl" dirty="0" smtClean="0"/>
-          </a:p>
-          <a:p>
-            <a:r>
-              <a:rPr lang="es-ES_tradnl" dirty="0" smtClean="0"/>
-              <a:t>&lt;div</a:t>
-            </a:r>
-            <a:r>
-              <a:rPr lang="es-ES_tradnl" dirty="0" smtClean="0"/>
-              <a:t>&gt; </a:t>
-            </a:r>
-            <a:r>
-              <a:rPr lang="es-ES_tradnl" dirty="0">
-                <a:sym typeface="Wingdings" panose="05000000000000000000" pitchFamily="2" charset="2"/>
-              </a:rPr>
-              <a:t> agrupación de elementos </a:t>
-            </a:r>
-            <a:r>
-              <a:rPr lang="es-ES_tradnl" dirty="0" smtClean="0">
-                <a:sym typeface="Wingdings" panose="05000000000000000000" pitchFamily="2" charset="2"/>
-              </a:rPr>
-              <a:t>con box</a:t>
-            </a:r>
-            <a:endParaRPr lang="es-ES_tradnl" dirty="0" smtClean="0"/>
-          </a:p>
-          <a:p>
-            <a:r>
-              <a:rPr lang="es-ES_tradnl" dirty="0" smtClean="0"/>
-              <a:t>&lt;</a:t>
-            </a:r>
-            <a:r>
-              <a:rPr lang="es-ES_tradnl" dirty="0" err="1" smtClean="0"/>
-              <a:t>span</a:t>
-            </a:r>
-            <a:r>
-              <a:rPr lang="es-ES_tradnl" dirty="0" smtClean="0"/>
-              <a:t>&gt; </a:t>
-            </a:r>
-            <a:r>
-              <a:rPr lang="es-ES_tradnl" dirty="0" smtClean="0">
-                <a:sym typeface="Wingdings" panose="05000000000000000000" pitchFamily="2" charset="2"/>
-              </a:rPr>
-              <a:t> agrupación de elementos </a:t>
-            </a:r>
-            <a:r>
-              <a:rPr lang="es-ES_tradnl" dirty="0" err="1" smtClean="0">
-                <a:sym typeface="Wingdings" panose="05000000000000000000" pitchFamily="2" charset="2"/>
-              </a:rPr>
-              <a:t>inline</a:t>
-            </a:r>
-            <a:endParaRPr lang="es-ES_tradnl" dirty="0" smtClean="0"/>
-          </a:p>
-          <a:p>
-            <a:r>
-              <a:rPr lang="es-ES_tradnl" dirty="0" smtClean="0"/>
-              <a:t>&lt;</a:t>
-            </a:r>
-            <a:r>
-              <a:rPr lang="es-ES_tradnl" dirty="0" err="1" smtClean="0"/>
-              <a:t>img</a:t>
-            </a:r>
-            <a:r>
-              <a:rPr lang="es-ES_tradnl" dirty="0" smtClean="0"/>
-              <a:t>&gt; </a:t>
-            </a:r>
-            <a:r>
-              <a:rPr lang="es-ES_tradnl" dirty="0" smtClean="0">
-                <a:sym typeface="Wingdings" panose="05000000000000000000" pitchFamily="2" charset="2"/>
-              </a:rPr>
-              <a:t> </a:t>
-            </a:r>
-            <a:r>
-              <a:rPr lang="es-ES_tradnl" dirty="0" err="1" smtClean="0">
-                <a:sym typeface="Wingdings" panose="05000000000000000000" pitchFamily="2" charset="2"/>
-              </a:rPr>
-              <a:t>imagenes</a:t>
-            </a:r>
-            <a:endParaRPr lang="es-ES_tradnl" dirty="0" smtClean="0"/>
-          </a:p>
-          <a:p>
-            <a:r>
-              <a:rPr lang="es-ES_tradnl" dirty="0" smtClean="0"/>
-              <a:t>&lt;input</a:t>
-            </a:r>
-            <a:r>
-              <a:rPr lang="es-ES_tradnl" dirty="0" smtClean="0"/>
-              <a:t>&gt; </a:t>
-            </a:r>
-            <a:r>
-              <a:rPr lang="es-ES_tradnl" dirty="0" smtClean="0">
-                <a:sym typeface="Wingdings" panose="05000000000000000000" pitchFamily="2" charset="2"/>
-              </a:rPr>
-              <a:t> inputs en formularios</a:t>
+              <a:t>tags</a:t>
             </a:r>
             <a:endParaRPr lang="en-US" dirty="0"/>
           </a:p>
@@ -4628,7 +4272,7 @@
     </p:spTree>
     <p:extLst>
       <p:ext uri="{BB962C8B-B14F-4D97-AF65-F5344CB8AC3E}">
-        <p14:creationId xmlns:p14="http://schemas.microsoft.com/office/powerpoint/2010/main" val="1457222021"/>
+        <p14:creationId xmlns:p14="http://schemas.microsoft.com/office/powerpoint/2010/main" val="1199194102"/>
       </p:ext>
     </p:extLst>
   </p:cSld>
@@ -4672,7 +4316,15 @@
           <a:p>
             <a:r>
               <a:rPr lang="es-ES_tradnl" dirty="0" smtClean="0"/>
-              <a:t>Elementos básicos Head</a:t>
+              <a:t>Nuevos </a:t>
+            </a:r>
+            <a:r>
+              <a:rPr lang="es-ES_tradnl" dirty="0" err="1" smtClean="0"/>
+              <a:t>Tags</a:t>
+            </a:r>
+            <a:r>
+              <a:rPr lang="es-ES_tradnl" dirty="0" smtClean="0"/>
+              <a:t> (media)</a:t>
             </a:r>
             <a:endParaRPr lang="en-US" dirty="0"/>
           </a:p>
@@ -4692,50 +4344,26 @@
         <p:txBody>
           <a:bodyPr/>
           <a:lstStyle/>
+          <a:p>
+            <a:r>
+              <a:rPr lang="es-ES_tradnl" dirty="0" smtClean="0"/>
+              <a:t>&lt;audio&gt;</a:t>
+            </a:r>
+          </a:p>
+          <a:p>
+            <a:r>
+              <a:rPr lang="es-ES_tradnl" dirty="0" smtClean="0"/>
+              <a:t>&lt;video&gt;</a:t>
+            </a:r>
+          </a:p>
           <a:p>
             <a:r>
               <a:rPr lang="es-ES_tradnl" dirty="0" smtClean="0"/>
               <a:t>&lt;</a:t>
             </a:r>
             <a:r>
-              <a:rPr lang="es-ES_tradnl" dirty="0" err="1"/>
-              <a:t>t</a:t>
-            </a:r>
-            <a:r>
               <a:rPr lang="es-ES_tradnl" dirty="0" err="1" smtClean="0"/>
-              <a:t>itle</a:t>
-            </a:r>
-            <a:r>
-              <a:rPr lang="es-ES_tradnl" dirty="0" smtClean="0"/>
-              <a:t>&gt;</a:t>
-            </a:r>
-          </a:p>
-          <a:p>
-            <a:r>
-              <a:rPr lang="es-ES_tradnl" dirty="0" smtClean="0"/>
-              <a:t>&lt;meta&gt;</a:t>
-            </a:r>
-          </a:p>
-          <a:p>
-            <a:r>
-              <a:rPr lang="es-ES_tradnl" dirty="0" smtClean="0"/>
-              <a:t>&lt;link&gt;</a:t>
-            </a:r>
-          </a:p>
-          <a:p>
-            <a:r>
-              <a:rPr lang="es-ES_tradnl" dirty="0" smtClean="0"/>
-              <a:t>&lt;script&gt;</a:t>
-            </a:r>
-          </a:p>
-          <a:p>
-            <a:r>
-              <a:rPr lang="es-ES_tradnl" dirty="0" smtClean="0"/>
-              <a:t>&lt;</a:t>
-            </a:r>
-            <a:r>
-              <a:rPr lang="es-ES_tradnl" dirty="0" err="1" smtClean="0"/>
-              <a:t>style</a:t>
+              <a:t>canvas</a:t>
             </a:r>
             <a:r>
               <a:rPr lang="es-ES_tradnl" dirty="0" smtClean="0"/>
@@ -4748,7 +4376,7 @@
     </p:spTree>
     <p:extLst>
       <p:ext uri="{BB962C8B-B14F-4D97-AF65-F5344CB8AC3E}">
-        <p14:creationId xmlns:p14="http://schemas.microsoft.com/office/powerpoint/2010/main" val="202465279"/>
+        <p14:creationId xmlns:p14="http://schemas.microsoft.com/office/powerpoint/2010/main" val="2125965985"/>
       </p:ext>
     </p:extLst>
   </p:cSld>
@@ -4792,57 +4420,163 @@
           <a:p>
             <a:r>
               <a:rPr lang="es-ES_tradnl" dirty="0" smtClean="0"/>
-              <a:t>HTML 5</a:t>
-            </a:r>
-            <a:endParaRPr lang="en-US" dirty="0"/>
-          </a:p>
-        </p:txBody>
-      </p:sp>
-      <p:sp>
-        <p:nvSpPr>
-          <p:cNvPr id="3" name="Content Placeholder 2"/>
-          <p:cNvSpPr>
-            <a:spLocks noGrp="1"/>
-          </p:cNvSpPr>
-          <p:nvPr>
-            <p:ph idx="1"/>
-          </p:nvPr>
-        </p:nvSpPr>
-        <p:spPr/>
-        <p:txBody>
-          <a:bodyPr/>
-          <a:lstStyle/>
-          <a:p>
-            <a:r>
-              <a:rPr lang="es-ES_tradnl" dirty="0" smtClean="0"/>
-              <a:t>&lt;!DOCTYPE </a:t>
-            </a:r>
-            <a:r>
-              <a:rPr lang="es-ES_tradnl" dirty="0" err="1" smtClean="0"/>
-              <a:t>html</a:t>
-            </a:r>
-            <a:r>
-              <a:rPr lang="es-ES_tradnl" dirty="0" smtClean="0"/>
-              <a:t>&gt;</a:t>
-            </a:r>
-          </a:p>
-          <a:p>
-            <a:r>
-              <a:rPr lang="es-ES_tradnl" dirty="0" smtClean="0"/>
               <a:t>Nuevos </a:t>
             </a:r>
             <a:r>
               <a:rPr lang="es-ES_tradnl" dirty="0" err="1" smtClean="0"/>
               <a:t>tags</a:t>
             </a:r>
+            <a:r>
+              <a:rPr lang="es-ES_tradnl" dirty="0" smtClean="0"/>
+              <a:t> (estructurales)</a:t>
+            </a:r>
             <a:endParaRPr lang="en-US" dirty="0"/>
+          </a:p>
+        </p:txBody>
+      </p:sp>
+      <p:sp>
+        <p:nvSpPr>
+          <p:cNvPr id="3" name="Content Placeholder 2"/>
+          <p:cNvSpPr>
+            <a:spLocks noGrp="1"/>
+          </p:cNvSpPr>
+          <p:nvPr>
+            <p:ph idx="1"/>
+          </p:nvPr>
+        </p:nvSpPr>
+        <p:spPr/>
+        <p:txBody>
+          <a:bodyPr/>
+          <a:lstStyle/>
+          <a:p>
+            <a:r>
+              <a:rPr lang="es-ES_tradnl" dirty="0" smtClean="0"/>
+              <a:t>&lt;</a:t>
+            </a:r>
+            <a:r>
+              <a:rPr lang="es-ES_tradnl" dirty="0" err="1" smtClean="0"/>
+              <a:t>header</a:t>
+            </a:r>
+            <a:r>
+              <a:rPr lang="es-ES_tradnl" dirty="0" smtClean="0"/>
+              <a:t>&gt; </a:t>
+            </a:r>
+            <a:r>
+              <a:rPr lang="es-ES_tradnl" dirty="0" smtClean="0">
+                <a:sym typeface="Wingdings" panose="05000000000000000000" pitchFamily="2" charset="2"/>
+              </a:rPr>
+              <a:t> encabezado</a:t>
+            </a:r>
+            <a:endParaRPr lang="es-ES_tradnl" dirty="0" smtClean="0"/>
+          </a:p>
+          <a:p>
+            <a:r>
+              <a:rPr lang="es-ES_tradnl" dirty="0" smtClean="0"/>
+              <a:t>&lt;</a:t>
+            </a:r>
+            <a:r>
+              <a:rPr lang="es-ES_tradnl" dirty="0" err="1" smtClean="0"/>
+              <a:t>aside</a:t>
+            </a:r>
+            <a:r>
+              <a:rPr lang="es-ES_tradnl" dirty="0" smtClean="0"/>
+              <a:t>&gt; </a:t>
+            </a:r>
+            <a:r>
+              <a:rPr lang="es-ES_tradnl" dirty="0" smtClean="0">
+                <a:sym typeface="Wingdings" panose="05000000000000000000" pitchFamily="2" charset="2"/>
+              </a:rPr>
+              <a:t> </a:t>
+            </a:r>
+            <a:r>
+              <a:rPr lang="es-ES_tradnl" dirty="0" err="1" smtClean="0">
+                <a:sym typeface="Wingdings" panose="05000000000000000000" pitchFamily="2" charset="2"/>
+              </a:rPr>
+              <a:t>info</a:t>
+            </a:r>
+            <a:r>
+              <a:rPr lang="es-ES_tradnl" dirty="0" smtClean="0">
+                <a:sym typeface="Wingdings" panose="05000000000000000000" pitchFamily="2" charset="2"/>
+              </a:rPr>
+              <a:t> complementaria / </a:t>
+            </a:r>
+            <a:r>
+              <a:rPr lang="es-ES_tradnl" dirty="0" err="1" smtClean="0">
+                <a:sym typeface="Wingdings" panose="05000000000000000000" pitchFamily="2" charset="2"/>
+              </a:rPr>
+              <a:t>sidebar</a:t>
+            </a:r>
+            <a:endParaRPr lang="es-ES_tradnl" dirty="0" smtClean="0"/>
+          </a:p>
+          <a:p>
+            <a:r>
+              <a:rPr lang="es-ES_tradnl" dirty="0" smtClean="0"/>
+              <a:t>&lt;</a:t>
+            </a:r>
+            <a:r>
+              <a:rPr lang="es-ES_tradnl" dirty="0" err="1" smtClean="0"/>
+              <a:t>footer</a:t>
+            </a:r>
+            <a:r>
+              <a:rPr lang="es-ES_tradnl" dirty="0" smtClean="0"/>
+              <a:t>&gt; </a:t>
+            </a:r>
+            <a:r>
+              <a:rPr lang="es-ES_tradnl" dirty="0" smtClean="0">
+                <a:sym typeface="Wingdings" panose="05000000000000000000" pitchFamily="2" charset="2"/>
+              </a:rPr>
+              <a:t> pie de página</a:t>
+            </a:r>
+            <a:endParaRPr lang="es-ES_tradnl" dirty="0" smtClean="0"/>
+          </a:p>
+          <a:p>
+            <a:r>
+              <a:rPr lang="es-ES_tradnl" dirty="0" smtClean="0"/>
+              <a:t>&lt;</a:t>
+            </a:r>
+            <a:r>
+              <a:rPr lang="es-ES_tradnl" dirty="0" err="1" smtClean="0"/>
+              <a:t>hgroup</a:t>
+            </a:r>
+            <a:r>
+              <a:rPr lang="es-ES_tradnl" dirty="0" smtClean="0"/>
+              <a:t>&gt; </a:t>
+            </a:r>
+            <a:r>
+              <a:rPr lang="es-ES_tradnl" dirty="0" smtClean="0">
+                <a:sym typeface="Wingdings" panose="05000000000000000000" pitchFamily="2" charset="2"/>
+              </a:rPr>
+              <a:t> grupo de encabezados</a:t>
+            </a:r>
+            <a:endParaRPr lang="es-ES_tradnl" dirty="0" smtClean="0"/>
+          </a:p>
+          <a:p>
+            <a:r>
+              <a:rPr lang="es-ES_tradnl" dirty="0" smtClean="0"/>
+              <a:t>&lt;</a:t>
+            </a:r>
+            <a:r>
+              <a:rPr lang="es-ES_tradnl" dirty="0" err="1" smtClean="0"/>
+              <a:t>nav</a:t>
+            </a:r>
+            <a:r>
+              <a:rPr lang="es-ES_tradnl" dirty="0" smtClean="0"/>
+              <a:t>&gt; </a:t>
+            </a:r>
+            <a:r>
+              <a:rPr lang="es-ES_tradnl" dirty="0" smtClean="0">
+                <a:sym typeface="Wingdings" panose="05000000000000000000" pitchFamily="2" charset="2"/>
+              </a:rPr>
+              <a:t> menú de navegación</a:t>
+            </a:r>
+            <a:endParaRPr lang="en-US" dirty="0" smtClean="0"/>
           </a:p>
         </p:txBody>
       </p:sp>
     </p:spTree>
     <p:extLst>
       <p:ext uri="{BB962C8B-B14F-4D97-AF65-F5344CB8AC3E}">
-        <p14:creationId xmlns:p14="http://schemas.microsoft.com/office/powerpoint/2010/main" val="1199194102"/>
+        <p14:creationId xmlns:p14="http://schemas.microsoft.com/office/powerpoint/2010/main" val="3014043091"/>
       </p:ext>
     </p:extLst>
   </p:cSld>
@@ -4890,310 +4624,6 @@
             </a:r>
             <a:r>
               <a:rPr lang="es-ES_tradnl" dirty="0" err="1" smtClean="0"/>
-              <a:t>Tags</a:t>
-            </a:r>
-            <a:r>
-              <a:rPr lang="es-ES_tradnl" dirty="0" smtClean="0"/>
-              <a:t> (media)</a:t>
-            </a:r>
-            <a:endParaRPr lang="en-US" dirty="0"/>
-          </a:p>
-        </p:txBody>
-      </p:sp>
-      <p:sp>
-        <p:nvSpPr>
-          <p:cNvPr id="3" name="Content Placeholder 2"/>
-          <p:cNvSpPr>
-            <a:spLocks noGrp="1"/>
-          </p:cNvSpPr>
-          <p:nvPr>
-            <p:ph idx="1"/>
-          </p:nvPr>
-        </p:nvSpPr>
-        <p:spPr/>
-        <p:txBody>
-          <a:bodyPr/>
-          <a:lstStyle/>
-          <a:p>
-            <a:r>
-              <a:rPr lang="es-ES_tradnl" dirty="0" smtClean="0"/>
-              <a:t>&lt;audio&gt;</a:t>
-            </a:r>
-          </a:p>
-          <a:p>
-            <a:r>
-              <a:rPr lang="es-ES_tradnl" dirty="0" smtClean="0"/>
-              <a:t>&lt;video&gt;</a:t>
-            </a:r>
-          </a:p>
-          <a:p>
-            <a:r>
-              <a:rPr lang="es-ES_tradnl" dirty="0" smtClean="0"/>
-              <a:t>&lt;</a:t>
-            </a:r>
-            <a:r>
-              <a:rPr lang="es-ES_tradnl" dirty="0" err="1" smtClean="0"/>
-              <a:t>canvas</a:t>
-            </a:r>
-            <a:r>
-              <a:rPr lang="es-ES_tradnl" dirty="0" smtClean="0"/>
-              <a:t>&gt;</a:t>
-            </a:r>
-            <a:endParaRPr lang="en-US" dirty="0"/>
-          </a:p>
-        </p:txBody>
-      </p:sp>
-    </p:spTree>
-    <p:extLst>
-      <p:ext uri="{BB962C8B-B14F-4D97-AF65-F5344CB8AC3E}">
-        <p14:creationId xmlns:p14="http://schemas.microsoft.com/office/powerpoint/2010/main" val="2125965985"/>
-      </p:ext>
-    </p:extLst>
-  </p:cSld>
-  <p:clrMapOvr>
-    <a:masterClrMapping/>
-  </p:clrMapOvr>
-</p:sld>
-</file>
-
-<file path=ppt/slides/slide16.xml><?xml version="1.0" encoding="utf-8"?>
-<p:sld xmlns:a="http://schemas.openxmlformats.org/drawingml/2006/main" xmlns:r="http://schemas.openxmlformats.org/officeDocument/2006/relationships" xmlns:p="http://schemas.openxmlformats.org/presentationml/2006/main">
-  <p:cSld>
-    <p:spTree>
-      <p:nvGrpSpPr>
-        <p:cNvPr id="1" name=""/>
-        <p:cNvGrpSpPr/>
-        <p:nvPr/>
-      </p:nvGrpSpPr>
-      <p:grpSpPr>
-        <a:xfrm>
-          <a:off x="0" y="0"/>
-          <a:ext cx="0" cy="0"/>
-          <a:chOff x="0" y="0"/>
-          <a:chExt cx="0" cy="0"/>
-        </a:xfrm>
-      </p:grpSpPr>
-      <p:sp>
-        <p:nvSpPr>
-          <p:cNvPr id="2" name="Title 1"/>
-          <p:cNvSpPr>
-            <a:spLocks noGrp="1"/>
-          </p:cNvSpPr>
-          <p:nvPr>
-            <p:ph type="title"/>
-          </p:nvPr>
-        </p:nvSpPr>
-        <p:spPr/>
-        <p:txBody>
-          <a:bodyPr/>
-          <a:lstStyle/>
-          <a:p>
-            <a:r>
-              <a:rPr lang="es-ES_tradnl" dirty="0" smtClean="0"/>
-              <a:t>Nuevos </a:t>
-            </a:r>
-            <a:r>
-              <a:rPr lang="es-ES_tradnl" dirty="0" err="1" smtClean="0"/>
-              <a:t>tags</a:t>
-            </a:r>
-            <a:r>
-              <a:rPr lang="es-ES_tradnl" dirty="0" smtClean="0"/>
-              <a:t> (estructurales)</a:t>
-            </a:r>
-            <a:endParaRPr lang="en-US" dirty="0"/>
-          </a:p>
-        </p:txBody>
-      </p:sp>
-      <p:sp>
-        <p:nvSpPr>
-          <p:cNvPr id="3" name="Content Placeholder 2"/>
-          <p:cNvSpPr>
-            <a:spLocks noGrp="1"/>
-          </p:cNvSpPr>
-          <p:nvPr>
-            <p:ph idx="1"/>
-          </p:nvPr>
-        </p:nvSpPr>
-        <p:spPr/>
-        <p:txBody>
-          <a:bodyPr/>
-          <a:lstStyle/>
-          <a:p>
-            <a:r>
-              <a:rPr lang="es-ES_tradnl" dirty="0" smtClean="0"/>
-              <a:t>&lt;</a:t>
-            </a:r>
-            <a:r>
-              <a:rPr lang="es-ES_tradnl" dirty="0" err="1" smtClean="0"/>
-              <a:t>header</a:t>
-            </a:r>
-            <a:r>
-              <a:rPr lang="es-ES_tradnl" dirty="0" smtClean="0"/>
-              <a:t>&gt; </a:t>
-            </a:r>
-            <a:r>
-              <a:rPr lang="es-ES_tradnl" dirty="0" smtClean="0">
-                <a:sym typeface="Wingdings" panose="05000000000000000000" pitchFamily="2" charset="2"/>
-              </a:rPr>
-              <a:t> encabezado</a:t>
-            </a:r>
-            <a:endParaRPr lang="es-ES_tradnl" dirty="0" smtClean="0"/>
-          </a:p>
-          <a:p>
-            <a:r>
-              <a:rPr lang="es-ES_tradnl" dirty="0" smtClean="0"/>
-              <a:t>&lt;</a:t>
-            </a:r>
-            <a:r>
-              <a:rPr lang="es-ES_tradnl" dirty="0" err="1" smtClean="0"/>
-              <a:t>aside</a:t>
-            </a:r>
-            <a:r>
-              <a:rPr lang="es-ES_tradnl" dirty="0" smtClean="0"/>
-              <a:t>&gt; </a:t>
-            </a:r>
-            <a:r>
-              <a:rPr lang="es-ES_tradnl" dirty="0" smtClean="0">
-                <a:sym typeface="Wingdings" panose="05000000000000000000" pitchFamily="2" charset="2"/>
-              </a:rPr>
-              <a:t> </a:t>
-            </a:r>
-            <a:r>
-              <a:rPr lang="es-ES_tradnl" dirty="0" err="1" smtClean="0">
-                <a:sym typeface="Wingdings" panose="05000000000000000000" pitchFamily="2" charset="2"/>
-              </a:rPr>
-              <a:t>info</a:t>
-            </a:r>
-            <a:r>
-              <a:rPr lang="es-ES_tradnl" dirty="0" smtClean="0">
-                <a:sym typeface="Wingdings" panose="05000000000000000000" pitchFamily="2" charset="2"/>
-              </a:rPr>
-              <a:t> complementaria / </a:t>
-            </a:r>
-            <a:r>
-              <a:rPr lang="es-ES_tradnl" dirty="0" err="1" smtClean="0">
-                <a:sym typeface="Wingdings" panose="05000000000000000000" pitchFamily="2" charset="2"/>
-              </a:rPr>
-              <a:t>sidebar</a:t>
-            </a:r>
-            <a:endParaRPr lang="es-ES_tradnl" dirty="0" smtClean="0"/>
-          </a:p>
-          <a:p>
-            <a:r>
-              <a:rPr lang="es-ES_tradnl" dirty="0" smtClean="0"/>
-              <a:t>&lt;</a:t>
-            </a:r>
-            <a:r>
-              <a:rPr lang="es-ES_tradnl" dirty="0" err="1" smtClean="0"/>
-              <a:t>footer</a:t>
-            </a:r>
-            <a:r>
-              <a:rPr lang="es-ES_tradnl" dirty="0" smtClean="0"/>
-              <a:t>&gt; </a:t>
-            </a:r>
-            <a:r>
-              <a:rPr lang="es-ES_tradnl" dirty="0" smtClean="0">
-                <a:sym typeface="Wingdings" panose="05000000000000000000" pitchFamily="2" charset="2"/>
-              </a:rPr>
-              <a:t> pie de página</a:t>
-            </a:r>
-            <a:endParaRPr lang="es-ES_tradnl" dirty="0" smtClean="0"/>
-          </a:p>
-          <a:p>
-            <a:r>
-              <a:rPr lang="es-ES_tradnl" dirty="0" smtClean="0"/>
-              <a:t>&lt;</a:t>
-            </a:r>
-            <a:r>
-              <a:rPr lang="es-ES_tradnl" dirty="0" err="1" smtClean="0"/>
-              <a:t>hgroup</a:t>
-            </a:r>
-            <a:r>
-              <a:rPr lang="es-ES_tradnl" dirty="0" smtClean="0"/>
-              <a:t>&gt; </a:t>
-            </a:r>
-            <a:r>
-              <a:rPr lang="es-ES_tradnl" dirty="0" smtClean="0">
-                <a:sym typeface="Wingdings" panose="05000000000000000000" pitchFamily="2" charset="2"/>
-              </a:rPr>
-              <a:t> grupo de encabezados</a:t>
-            </a:r>
-            <a:endParaRPr lang="es-ES_tradnl" dirty="0" smtClean="0"/>
-          </a:p>
-          <a:p>
-            <a:r>
-              <a:rPr lang="es-ES_tradnl" dirty="0" smtClean="0"/>
-              <a:t>&lt;</a:t>
-            </a:r>
-            <a:r>
-              <a:rPr lang="es-ES_tradnl" dirty="0" err="1" smtClean="0"/>
-              <a:t>nav</a:t>
-            </a:r>
-            <a:r>
-              <a:rPr lang="es-ES_tradnl" dirty="0" smtClean="0"/>
-              <a:t>&gt; </a:t>
-            </a:r>
-            <a:r>
-              <a:rPr lang="es-ES_tradnl" dirty="0" smtClean="0">
-                <a:sym typeface="Wingdings" panose="05000000000000000000" pitchFamily="2" charset="2"/>
-              </a:rPr>
-              <a:t> menú de navegación</a:t>
-            </a:r>
-            <a:endParaRPr lang="en-US" dirty="0" smtClean="0"/>
-          </a:p>
-        </p:txBody>
-      </p:sp>
-    </p:spTree>
-    <p:extLst>
-      <p:ext uri="{BB962C8B-B14F-4D97-AF65-F5344CB8AC3E}">
-        <p14:creationId xmlns:p14="http://schemas.microsoft.com/office/powerpoint/2010/main" val="3014043091"/>
-      </p:ext>
-    </p:extLst>
-  </p:cSld>
-  <p:clrMapOvr>
-    <a:masterClrMapping/>
-  </p:clrMapOvr>
-</p:sld>
-</file>
-
-<file path=ppt/slides/slide17.xml><?xml version="1.0" encoding="utf-8"?>
-<p:sld xmlns:a="http://schemas.openxmlformats.org/drawingml/2006/main" xmlns:r="http://schemas.openxmlformats.org/officeDocument/2006/relationships" xmlns:p="http://schemas.openxmlformats.org/presentationml/2006/main">
-  <p:cSld>
-    <p:spTree>
-      <p:nvGrpSpPr>
-        <p:cNvPr id="1" name=""/>
-        <p:cNvGrpSpPr/>
-        <p:nvPr/>
-      </p:nvGrpSpPr>
-      <p:grpSpPr>
-        <a:xfrm>
-          <a:off x="0" y="0"/>
-          <a:ext cx="0" cy="0"/>
-          <a:chOff x="0" y="0"/>
-          <a:chExt cx="0" cy="0"/>
-        </a:xfrm>
-      </p:grpSpPr>
-      <p:sp>
-        <p:nvSpPr>
-          <p:cNvPr id="2" name="Title 1"/>
-          <p:cNvSpPr>
-            <a:spLocks noGrp="1"/>
-          </p:cNvSpPr>
-          <p:nvPr>
-            <p:ph type="title"/>
-          </p:nvPr>
-        </p:nvSpPr>
-        <p:spPr/>
-        <p:txBody>
-          <a:bodyPr/>
-          <a:lstStyle/>
-          <a:p>
-            <a:r>
-              <a:rPr lang="es-ES_tradnl" dirty="0" smtClean="0"/>
-              <a:t>Nuevos </a:t>
-            </a:r>
-            <a:r>
-              <a:rPr lang="es-ES_tradnl" dirty="0" err="1" smtClean="0"/>
               <a:t>tags</a:t>
             </a:r>
             <a:r>
@@ -5288,7 +4718,7 @@
 </p:sld>
 </file>
 
-<file path=ppt/slides/slide18.xml><?xml version="1.0" encoding="utf-8"?>
+<file path=ppt/slides/slide16.xml><?xml version="1.0" encoding="utf-8"?>
 <p:sld xmlns:a="http://schemas.openxmlformats.org/drawingml/2006/main" xmlns:r="http://schemas.openxmlformats.org/officeDocument/2006/relationships" xmlns:p="http://schemas.openxmlformats.org/presentationml/2006/main">
   <p:cSld>
     <p:spTree>
@@ -5829,7 +5259,7 @@
 </p:sld>
 </file>
 
-<file path=ppt/slides/slide19.xml><?xml version="1.0" encoding="utf-8"?>
+<file path=ppt/slides/slide17.xml><?xml version="1.0" encoding="utf-8"?>
 <p:sld xmlns:a="http://schemas.openxmlformats.org/drawingml/2006/main" xmlns:r="http://schemas.openxmlformats.org/officeDocument/2006/relationships" xmlns:p="http://schemas.openxmlformats.org/presentationml/2006/main">
   <p:cSld>
     <p:spTree>
@@ -5885,38 +5315,45 @@
         </p:nvSpPr>
         <p:spPr/>
         <p:txBody>
-          <a:bodyPr/>
-          <a:lstStyle/>
-          <a:p>
-            <a:r>
-              <a:rPr lang="es-ES_tradnl" dirty="0" err="1" smtClean="0"/>
+          <a:bodyPr>
+            <a:normAutofit/>
+          </a:bodyPr>
+          <a:lstStyle/>
+          <a:p>
+            <a:r>
+              <a:rPr lang="es-ES_tradnl" sz="3600" dirty="0" err="1" smtClean="0"/>
               <a:t>Class</a:t>
             </a:r>
             <a:r>
-              <a:rPr lang="es-ES_tradnl" dirty="0" smtClean="0"/>
+              <a:rPr lang="es-ES_tradnl" sz="3600" dirty="0" smtClean="0"/>
               <a:t> == muchas veces</a:t>
             </a:r>
           </a:p>
           <a:p>
             <a:pPr lvl="1"/>
             <a:r>
-              <a:rPr lang="es-ES_tradnl" dirty="0" smtClean="0"/>
-              <a:t>reutilización</a:t>
-            </a:r>
-          </a:p>
-          <a:p>
-            <a:r>
-              <a:rPr lang="es-ES_tradnl" dirty="0" smtClean="0"/>
+              <a:rPr lang="es-ES_tradnl" sz="3200" dirty="0" smtClean="0"/>
+              <a:t>Reutilización</a:t>
+            </a:r>
+          </a:p>
+          <a:p>
+            <a:pPr marL="457200" lvl="1" indent="0">
+              <a:buNone/>
+            </a:pPr>
+            <a:endParaRPr lang="es-ES_tradnl" sz="3200" dirty="0" smtClean="0"/>
+          </a:p>
+          <a:p>
+            <a:r>
+              <a:rPr lang="es-ES_tradnl" sz="3600" dirty="0" smtClean="0"/>
               <a:t>Id == solo una vez</a:t>
             </a:r>
           </a:p>
           <a:p>
             <a:pPr lvl="1"/>
             <a:r>
-              <a:rPr lang="es-ES_tradnl" dirty="0" smtClean="0"/>
-              <a:t>diferenciación</a:t>
-            </a:r>
-            <a:endParaRPr lang="en-US" dirty="0"/>
+              <a:rPr lang="es-ES_tradnl" sz="3200" dirty="0" smtClean="0"/>
+              <a:t>Diferenciación</a:t>
+            </a:r>
           </a:p>
         </p:txBody>
       </p:sp>
@@ -5933,7 +5370,7 @@
 </p:sld>
 </file>
 
-<file path=ppt/slides/slide2.xml><?xml version="1.0" encoding="utf-8"?>
+<file path=ppt/slides/slide18.xml><?xml version="1.0" encoding="utf-8"?>
 <p:sld xmlns:a="http://schemas.openxmlformats.org/drawingml/2006/main" xmlns:r="http://schemas.openxmlformats.org/officeDocument/2006/relationships" xmlns:p="http://schemas.openxmlformats.org/presentationml/2006/main">
   <p:cSld>
     <p:spTree>
@@ -5952,98 +5389,6 @@
       </p:grpSpPr>
       <p:sp>
         <p:nvSpPr>
-          <p:cNvPr id="2" name="Title 1"/>
-          <p:cNvSpPr>
-            <a:spLocks noGrp="1"/>
-          </p:cNvSpPr>
-          <p:nvPr>
-            <p:ph type="title"/>
-          </p:nvPr>
-        </p:nvSpPr>
-        <p:spPr/>
-        <p:txBody>
-          <a:bodyPr/>
-          <a:lstStyle/>
-          <a:p>
-            <a:r>
-              <a:rPr lang="es-ES_tradnl" dirty="0" err="1" smtClean="0"/>
-              <a:t>Request</a:t>
-            </a:r>
-            <a:r>
-              <a:rPr lang="es-ES_tradnl" dirty="0" smtClean="0"/>
-              <a:t>	</a:t>
-            </a:r>
-            <a:endParaRPr lang="en-US" dirty="0"/>
-          </a:p>
-        </p:txBody>
-      </p:sp>
-      <p:sp>
-        <p:nvSpPr>
-          <p:cNvPr id="3" name="Content Placeholder 2"/>
-          <p:cNvSpPr>
-            <a:spLocks noGrp="1"/>
-          </p:cNvSpPr>
-          <p:nvPr>
-            <p:ph idx="1"/>
-          </p:nvPr>
-        </p:nvSpPr>
-        <p:spPr/>
-        <p:txBody>
-          <a:bodyPr/>
-          <a:lstStyle/>
-          <a:p>
-            <a:r>
-              <a:rPr lang="es-ES_tradnl" dirty="0" smtClean="0"/>
-              <a:t>Usuario envía un </a:t>
-            </a:r>
-            <a:r>
-              <a:rPr lang="es-ES_tradnl" dirty="0" err="1" smtClean="0"/>
-              <a:t>request</a:t>
-            </a:r>
-            <a:r>
-              <a:rPr lang="es-ES_tradnl" dirty="0" smtClean="0"/>
-              <a:t> a un servidor, este procesa y devuelve un </a:t>
-            </a:r>
-            <a:r>
-              <a:rPr lang="es-ES_tradnl" dirty="0" err="1" smtClean="0"/>
-              <a:t>html</a:t>
-            </a:r>
-            <a:endParaRPr lang="es-ES_tradnl" dirty="0" smtClean="0"/>
-          </a:p>
-        </p:txBody>
-      </p:sp>
-    </p:spTree>
-    <p:extLst>
-      <p:ext uri="{BB962C8B-B14F-4D97-AF65-F5344CB8AC3E}">
-        <p14:creationId xmlns:p14="http://schemas.microsoft.com/office/powerpoint/2010/main" val="2884283473"/>
-      </p:ext>
-    </p:extLst>
-  </p:cSld>
-  <p:clrMapOvr>
-    <a:masterClrMapping/>
-  </p:clrMapOvr>
-</p:sld>
-</file>
-
-<file path=ppt/slides/slide20.xml><?xml version="1.0" encoding="utf-8"?>
-<p:sld xmlns:a="http://schemas.openxmlformats.org/drawingml/2006/main" xmlns:r="http://schemas.openxmlformats.org/officeDocument/2006/relationships" xmlns:p="http://schemas.openxmlformats.org/presentationml/2006/main">
-  <p:cSld>
-    <p:spTree>
-      <p:nvGrpSpPr>
-        <p:cNvPr id="1" name=""/>
-        <p:cNvGrpSpPr/>
-        <p:nvPr/>
-      </p:nvGrpSpPr>
-      <p:grpSpPr>
-        <a:xfrm>
-          <a:off x="0" y="0"/>
-          <a:ext cx="0" cy="0"/>
-          <a:chOff x="0" y="0"/>
-          <a:chExt cx="0" cy="0"/>
-        </a:xfrm>
-      </p:grpSpPr>
-      <p:sp>
-        <p:nvSpPr>
           <p:cNvPr id="4" name="Title 3"/>
           <p:cNvSpPr>
             <a:spLocks noGrp="1"/>
@@ -6098,7 +5443,7 @@
 </p:sld>
 </file>
 
-<file path=ppt/slides/slide21.xml><?xml version="1.0" encoding="utf-8"?>
+<file path=ppt/slides/slide19.xml><?xml version="1.0" encoding="utf-8"?>
 <p:sld xmlns:a="http://schemas.openxmlformats.org/drawingml/2006/main" xmlns:r="http://schemas.openxmlformats.org/officeDocument/2006/relationships" xmlns:p="http://schemas.openxmlformats.org/presentationml/2006/main">
   <p:cSld>
     <p:spTree>
@@ -6381,7 +5726,72 @@
 </p:sld>
 </file>
 
-<file path=ppt/slides/slide22.xml><?xml version="1.0" encoding="utf-8"?>
+<file path=ppt/slides/slide2.xml><?xml version="1.0" encoding="utf-8"?>
+<p:sld xmlns:a="http://schemas.openxmlformats.org/drawingml/2006/main" xmlns:r="http://schemas.openxmlformats.org/officeDocument/2006/relationships" xmlns:p="http://schemas.openxmlformats.org/presentationml/2006/main">
+  <p:cSld>
+    <p:spTree>
+      <p:nvGrpSpPr>
+        <p:cNvPr id="1" name=""/>
+        <p:cNvGrpSpPr/>
+        <p:nvPr/>
+      </p:nvGrpSpPr>
+      <p:grpSpPr>
+        <a:xfrm>
+          <a:off x="0" y="0"/>
+          <a:ext cx="0" cy="0"/>
+          <a:chOff x="0" y="0"/>
+          <a:chExt cx="0" cy="0"/>
+        </a:xfrm>
+      </p:grpSpPr>
+      <p:sp>
+        <p:nvSpPr>
+          <p:cNvPr id="2" name="Title 1"/>
+          <p:cNvSpPr>
+            <a:spLocks noGrp="1"/>
+          </p:cNvSpPr>
+          <p:nvPr>
+            <p:ph type="title"/>
+          </p:nvPr>
+        </p:nvSpPr>
+        <p:spPr/>
+        <p:txBody>
+          <a:bodyPr/>
+          <a:lstStyle/>
+          <a:p>
+            <a:r>
+              <a:rPr lang="es-ES_tradnl" dirty="0" smtClean="0"/>
+              <a:t>HTML: </a:t>
+            </a:r>
+            <a:r>
+              <a:rPr lang="en-US" dirty="0" err="1"/>
+              <a:t>HyperText</a:t>
+            </a:r>
+            <a:r>
+              <a:rPr lang="en-US" dirty="0"/>
+              <a:t> Markup </a:t>
+            </a:r>
+            <a:r>
+              <a:rPr lang="en-US" dirty="0" smtClean="0"/>
+              <a:t>Language</a:t>
+            </a:r>
+            <a:endParaRPr lang="en-US" dirty="0"/>
+          </a:p>
+        </p:txBody>
+      </p:sp>
+    </p:spTree>
+    <p:extLst>
+      <p:ext uri="{BB962C8B-B14F-4D97-AF65-F5344CB8AC3E}">
+        <p14:creationId xmlns:p14="http://schemas.microsoft.com/office/powerpoint/2010/main" val="1469098206"/>
+      </p:ext>
+    </p:extLst>
+  </p:cSld>
+  <p:clrMapOvr>
+    <a:masterClrMapping/>
+  </p:clrMapOvr>
+</p:sld>
+</file>
+
+<file path=ppt/slides/slide20.xml><?xml version="1.0" encoding="utf-8"?>
 <p:sld xmlns:a="http://schemas.openxmlformats.org/drawingml/2006/main" xmlns:r="http://schemas.openxmlformats.org/officeDocument/2006/relationships" xmlns:p="http://schemas.openxmlformats.org/presentationml/2006/main">
   <p:cSld>
     <p:spTree>
@@ -6716,7 +6126,7 @@
 </p:sld>
 </file>
 
-<file path=ppt/slides/slide23.xml><?xml version="1.0" encoding="utf-8"?>
+<file path=ppt/slides/slide21.xml><?xml version="1.0" encoding="utf-8"?>
 <p:sld xmlns:a="http://schemas.openxmlformats.org/drawingml/2006/main" xmlns:r="http://schemas.openxmlformats.org/officeDocument/2006/relationships" xmlns:p="http://schemas.openxmlformats.org/presentationml/2006/main">
   <p:cSld>
     <p:spTree>
@@ -6788,14 +6198,25 @@
               <a:rPr lang="es-ES_tradnl" dirty="0" smtClean="0">
                 <a:sym typeface="Wingdings" panose="05000000000000000000" pitchFamily="2" charset="2"/>
               </a:rPr>
-              <a:t> &lt;etiqueta&gt;</a:t>
-            </a:r>
-            <a:endParaRPr lang="es-ES_tradnl" dirty="0" smtClean="0"/>
+              <a:t> &lt;etiqueta</a:t>
+            </a:r>
+            <a:r>
+              <a:rPr lang="es-ES_tradnl" dirty="0" smtClean="0">
+                <a:sym typeface="Wingdings" panose="05000000000000000000" pitchFamily="2" charset="2"/>
+              </a:rPr>
+              <a:t>&gt;</a:t>
+            </a:r>
           </a:p>
           <a:p>
             <a:pPr marL="0" indent="0">
               <a:buNone/>
             </a:pPr>
+            <a:endParaRPr lang="es-ES_tradnl" dirty="0" smtClean="0"/>
+          </a:p>
+          <a:p>
+            <a:pPr marL="0" indent="0">
+              <a:buNone/>
+            </a:pPr>
             <a:r>
               <a:rPr lang="es-ES_tradnl" dirty="0" smtClean="0"/>
               <a:t>.clase </a:t>
@@ -6816,8 +6237,19 @@
               <a:rPr lang="es-ES_tradnl" dirty="0" smtClean="0">
                 <a:sym typeface="Wingdings" panose="05000000000000000000" pitchFamily="2" charset="2"/>
               </a:rPr>
-              <a:t>=“clase”</a:t>
-            </a:r>
+              <a:t>=“clase</a:t>
+            </a:r>
+            <a:r>
+              <a:rPr lang="es-ES_tradnl" dirty="0" smtClean="0">
+                <a:sym typeface="Wingdings" panose="05000000000000000000" pitchFamily="2" charset="2"/>
+              </a:rPr>
+              <a:t>”</a:t>
+            </a:r>
+          </a:p>
+          <a:p>
+            <a:pPr marL="0" indent="0">
+              <a:buNone/>
+            </a:pPr>
             <a:endParaRPr lang="es-ES_tradnl" dirty="0" smtClean="0"/>
           </a:p>
           <a:p>
@@ -6851,7 +6283,7 @@
 </p:sld>
 </file>
 
-<file path=ppt/slides/slide24.xml><?xml version="1.0" encoding="utf-8"?>
+<file path=ppt/slides/slide22.xml><?xml version="1.0" encoding="utf-8"?>
 <p:sld xmlns:a="http://schemas.openxmlformats.org/drawingml/2006/main" xmlns:r="http://schemas.openxmlformats.org/officeDocument/2006/relationships" xmlns:p="http://schemas.openxmlformats.org/presentationml/2006/main">
   <p:cSld>
     <p:spTree>
@@ -7123,7 +6555,7 @@
 </p:sld>
 </file>
 
-<file path=ppt/slides/slide25.xml><?xml version="1.0" encoding="utf-8"?>
+<file path=ppt/slides/slide23.xml><?xml version="1.0" encoding="utf-8"?>
 <p:sld xmlns:a="http://schemas.openxmlformats.org/drawingml/2006/main" xmlns:r="http://schemas.openxmlformats.org/officeDocument/2006/relationships" xmlns:p="http://schemas.openxmlformats.org/presentationml/2006/main">
   <p:cSld>
     <p:spTree>
@@ -7196,7 +6628,7 @@
 </p:sld>
 </file>
 
-<file path=ppt/slides/slide26.xml><?xml version="1.0" encoding="utf-8"?>
+<file path=ppt/slides/slide24.xml><?xml version="1.0" encoding="utf-8"?>
 <p:sld xmlns:a="http://schemas.openxmlformats.org/drawingml/2006/main" xmlns:r="http://schemas.openxmlformats.org/officeDocument/2006/relationships" xmlns:p="http://schemas.openxmlformats.org/presentationml/2006/main">
   <p:cSld>
     <p:spTree>
@@ -7425,7 +6857,7 @@
 </p:sld>
 </file>
 
-<file path=ppt/slides/slide27.xml><?xml version="1.0" encoding="utf-8"?>
+<file path=ppt/slides/slide25.xml><?xml version="1.0" encoding="utf-8"?>
 <p:sld xmlns:a="http://schemas.openxmlformats.org/drawingml/2006/main" xmlns:r="http://schemas.openxmlformats.org/officeDocument/2006/relationships" xmlns:p="http://schemas.openxmlformats.org/presentationml/2006/main">
   <p:cSld>
     <p:spTree>
@@ -7537,7 +6969,7 @@
 </p:sld>
 </file>
 
-<file path=ppt/slides/slide28.xml><?xml version="1.0" encoding="utf-8"?>
+<file path=ppt/slides/slide26.xml><?xml version="1.0" encoding="utf-8"?>
 <p:sld xmlns:a="http://schemas.openxmlformats.org/drawingml/2006/main" xmlns:r="http://schemas.openxmlformats.org/officeDocument/2006/relationships" xmlns:p="http://schemas.openxmlformats.org/presentationml/2006/main">
   <p:cSld>
     <p:spTree>
@@ -7688,7 +7120,7 @@
 </p:sld>
 </file>
 
-<file path=ppt/slides/slide29.xml><?xml version="1.0" encoding="utf-8"?>
+<file path=ppt/slides/slide27.xml><?xml version="1.0" encoding="utf-8"?>
 <p:sld xmlns:a="http://schemas.openxmlformats.org/drawingml/2006/main" xmlns:r="http://schemas.openxmlformats.org/officeDocument/2006/relationships" xmlns:p="http://schemas.openxmlformats.org/presentationml/2006/main">
   <p:cSld>
     <p:spTree>
@@ -7721,8 +7153,12 @@
           <a:lstStyle/>
           <a:p>
             <a:r>
+              <a:rPr lang="es-ES_tradnl" dirty="0" err="1" smtClean="0"/>
+              <a:t>Frameworks</a:t>
+            </a:r>
+            <a:r>
               <a:rPr lang="es-ES_tradnl" dirty="0" smtClean="0"/>
-              <a:t>Para ver	</a:t>
+              <a:t> CSS</a:t>
             </a:r>
             <a:endParaRPr lang="en-US" dirty="0"/>
           </a:p>
@@ -7740,37 +7176,44 @@
         </p:nvSpPr>
         <p:spPr/>
         <p:txBody>
-          <a:bodyPr>
-            <a:normAutofit lnSpcReduction="10000"/>
-          </a:bodyPr>
+          <a:bodyPr/>
           <a:lstStyle/>
           <a:p>
             <a:r>
               <a:rPr lang="en-US" dirty="0" smtClean="0">
                 <a:hlinkClick r:id="rId2"/>
               </a:rPr>
-              <a:t>https://speakerdeck.com/shesho/html-plus-css</a:t>
+              <a:t>http://www.getskeleton.com/</a:t>
             </a:r>
             <a:endParaRPr lang="en-US" dirty="0" smtClean="0"/>
+          </a:p>
+          <a:p>
+            <a:endParaRPr lang="es-ES_tradnl" dirty="0"/>
           </a:p>
           <a:p>
             <a:r>
               <a:rPr lang="en-US" dirty="0" smtClean="0">
                 <a:hlinkClick r:id="rId3"/>
               </a:rPr>
-              <a:t>https://speakerdeck.com/ryhan/introductory-html-and-css</a:t>
+              <a:t>http://twitter.github.io/bootstrap/</a:t>
             </a:r>
             <a:endParaRPr lang="en-US" dirty="0" smtClean="0"/>
           </a:p>
           <a:p>
-            <a:endParaRPr lang="es-ES_tradnl" dirty="0" smtClean="0"/>
-          </a:p>
-          <a:p>
+            <a:endParaRPr lang="es-ES_tradnl" dirty="0"/>
+          </a:p>
+          <a:p>
+            <a:r>
+              <a:rPr lang="en-US" dirty="0">
+                <a:hlinkClick r:id="rId4"/>
+              </a:rPr>
+              <a:t>http://foundation.zurb.com</a:t>
+            </a:r>
             <a:r>
               <a:rPr lang="en-US" dirty="0" smtClean="0">
                 <a:hlinkClick r:id="rId4"/>
               </a:rPr>
-              <a:t>https://speakerdeck.com/lumilux/intro-to-html</a:t>
+              <a:t>/</a:t>
             </a:r>
             <a:endParaRPr lang="en-US" dirty="0" smtClean="0"/>
           </a:p>
@@ -7779,35 +7222,11 @@
           </a:p>
           <a:p>
             <a:r>
-              <a:rPr lang="en-US" dirty="0" smtClean="0">
+              <a:rPr lang="en-US" dirty="0">
                 <a:hlinkClick r:id="rId5"/>
               </a:rPr>
-              <a:t>https://speakerdeck.com/stupig/html-and-css-basics</a:t>
-            </a:r>
-            <a:endParaRPr lang="es-ES_tradnl" dirty="0"/>
-          </a:p>
-          <a:p>
-            <a:endParaRPr lang="es-ES_tradnl" dirty="0" smtClean="0"/>
-          </a:p>
-          <a:p>
-            <a:r>
-              <a:rPr lang="en-US" dirty="0" smtClean="0">
-                <a:hlinkClick r:id="rId6"/>
-              </a:rPr>
-              <a:t>https://speakerdeck.com/pacheco_hn/html-5</a:t>
-            </a:r>
-            <a:endParaRPr lang="en-US" dirty="0" smtClean="0"/>
-          </a:p>
-          <a:p>
-            <a:r>
-              <a:rPr lang="en-US" dirty="0" smtClean="0">
-                <a:hlinkClick r:id="rId7"/>
-              </a:rPr>
-              <a:t>https://speakerdeck.com/slant/html-and-css</a:t>
-            </a:r>
-            <a:endParaRPr lang="en-US" dirty="0" smtClean="0"/>
-          </a:p>
-          <a:p>
+              <a:t>http://purecss.io/</a:t>
+            </a:r>
             <a:endParaRPr lang="en-US" dirty="0"/>
           </a:p>
         </p:txBody>
@@ -7815,7 +7234,7 @@
     </p:spTree>
     <p:extLst>
       <p:ext uri="{BB962C8B-B14F-4D97-AF65-F5344CB8AC3E}">
-        <p14:creationId xmlns:p14="http://schemas.microsoft.com/office/powerpoint/2010/main" val="982115055"/>
+        <p14:creationId xmlns:p14="http://schemas.microsoft.com/office/powerpoint/2010/main" val="2313433037"/>
       </p:ext>
     </p:extLst>
   </p:cSld>
@@ -7825,7 +7244,7 @@
 </p:sld>
 </file>
 
-<file path=ppt/slides/slide3.xml><?xml version="1.0" encoding="utf-8"?>
+<file path=ppt/slides/slide28.xml><?xml version="1.0" encoding="utf-8"?>
 <p:sld xmlns:a="http://schemas.openxmlformats.org/drawingml/2006/main" xmlns:r="http://schemas.openxmlformats.org/officeDocument/2006/relationships" xmlns:p="http://schemas.openxmlformats.org/presentationml/2006/main">
   <p:cSld>
     <p:spTree>
@@ -7859,28 +7278,110 @@
           <a:p>
             <a:r>
               <a:rPr lang="es-ES_tradnl" dirty="0" smtClean="0"/>
-              <a:t>HTML: </a:t>
-            </a:r>
-            <a:r>
-              <a:rPr lang="en-US" dirty="0" err="1"/>
-              <a:t>HyperText</a:t>
-            </a:r>
-            <a:r>
-              <a:rPr lang="en-US" dirty="0"/>
-              <a:t> Markup </a:t>
-            </a:r>
-            <a:r>
-              <a:rPr lang="en-US" dirty="0" smtClean="0"/>
-              <a:t>Language</a:t>
+              <a:t>Recursos</a:t>
             </a:r>
             <a:endParaRPr lang="en-US" dirty="0"/>
+          </a:p>
+        </p:txBody>
+      </p:sp>
+      <p:sp>
+        <p:nvSpPr>
+          <p:cNvPr id="3" name="Content Placeholder 2"/>
+          <p:cNvSpPr>
+            <a:spLocks noGrp="1"/>
+          </p:cNvSpPr>
+          <p:nvPr>
+            <p:ph idx="1"/>
+          </p:nvPr>
+        </p:nvSpPr>
+        <p:spPr/>
+        <p:txBody>
+          <a:bodyPr/>
+          <a:lstStyle/>
+          <a:p>
+            <a:r>
+              <a:rPr lang="es-ES_tradnl" dirty="0">
+                <a:hlinkClick r:id="rId2"/>
+              </a:rPr>
+              <a:t>https://</a:t>
+            </a:r>
+            <a:r>
+              <a:rPr lang="es-ES_tradnl" dirty="0" smtClean="0">
+                <a:hlinkClick r:id="rId2"/>
+              </a:rPr>
+              <a:t>developer.mozilla.org/en-US/docs/Web/HTML</a:t>
+            </a:r>
+            <a:endParaRPr lang="es-ES_tradnl" dirty="0" smtClean="0"/>
+          </a:p>
+          <a:p>
+            <a:r>
+              <a:rPr lang="en-US" dirty="0" smtClean="0">
+                <a:hlinkClick r:id="rId3"/>
+              </a:rPr>
+              <a:t>https</a:t>
+            </a:r>
+            <a:r>
+              <a:rPr lang="en-US" dirty="0">
+                <a:hlinkClick r:id="rId3"/>
+              </a:rPr>
+              <a:t>://developer.mozilla.org/en-US/docs/Web/CSS</a:t>
+            </a:r>
+            <a:endParaRPr lang="es-ES_tradnl" dirty="0" smtClean="0"/>
+          </a:p>
+          <a:p>
+            <a:r>
+              <a:rPr lang="en-US" dirty="0">
+                <a:hlinkClick r:id="rId4"/>
+              </a:rPr>
+              <a:t>http://www.w3.org</a:t>
+            </a:r>
+            <a:r>
+              <a:rPr lang="en-US" dirty="0" smtClean="0">
+                <a:hlinkClick r:id="rId4"/>
+              </a:rPr>
+              <a:t>/</a:t>
+            </a:r>
+            <a:endParaRPr lang="en-US" dirty="0" smtClean="0"/>
+          </a:p>
+          <a:p>
+            <a:r>
+              <a:rPr lang="en-US" dirty="0">
+                <a:hlinkClick r:id="rId5"/>
+              </a:rPr>
+              <a:t>http://validator.w3.org/</a:t>
+            </a:r>
+            <a:endParaRPr lang="en-US" dirty="0" smtClean="0"/>
+          </a:p>
+          <a:p>
+            <a:r>
+              <a:rPr lang="en-US" dirty="0">
+                <a:hlinkClick r:id="rId6"/>
+              </a:rPr>
+              <a:t>http://</a:t>
+            </a:r>
+            <a:r>
+              <a:rPr lang="en-US" dirty="0" smtClean="0">
+                <a:hlinkClick r:id="rId6"/>
+              </a:rPr>
+              <a:t>www.codecademy.com/tracks/web</a:t>
+            </a:r>
+            <a:endParaRPr lang="en-US" dirty="0" smtClean="0"/>
+          </a:p>
+          <a:p>
+            <a:r>
+              <a:rPr lang="en-US" dirty="0">
+                <a:hlinkClick r:id="rId7"/>
+              </a:rPr>
+              <a:t>http://www.w3schools.com/</a:t>
+            </a:r>
+            <a:endParaRPr lang="es-ES_tradnl" dirty="0" smtClean="0"/>
           </a:p>
         </p:txBody>
       </p:sp>
     </p:spTree>
     <p:extLst>
       <p:ext uri="{BB962C8B-B14F-4D97-AF65-F5344CB8AC3E}">
-        <p14:creationId xmlns:p14="http://schemas.microsoft.com/office/powerpoint/2010/main" val="1469098206"/>
+        <p14:creationId xmlns:p14="http://schemas.microsoft.com/office/powerpoint/2010/main" val="1310797858"/>
       </p:ext>
     </p:extLst>
   </p:cSld>
@@ -7890,8 +7391,8 @@
 </p:sld>
 </file>
 
-<file path=ppt/slides/slide30.xml><?xml version="1.0" encoding="utf-8"?>
-<p:sld xmlns:a="http://schemas.openxmlformats.org/drawingml/2006/main" xmlns:r="http://schemas.openxmlformats.org/officeDocument/2006/relationships" xmlns:p="http://schemas.openxmlformats.org/presentationml/2006/main">
+<file path=ppt/slides/slide29.xml><?xml version="1.0" encoding="utf-8"?>
+<p:sld xmlns:a="http://schemas.openxmlformats.org/drawingml/2006/main" xmlns:r="http://schemas.openxmlformats.org/officeDocument/2006/relationships" xmlns:p="http://schemas.openxmlformats.org/presentationml/2006/main" show="0">
   <p:cSld>
     <p:spTree>
       <p:nvGrpSpPr>
@@ -7923,12 +7424,8 @@
           <a:lstStyle/>
           <a:p>
             <a:r>
-              <a:rPr lang="es-ES_tradnl" dirty="0" err="1" smtClean="0"/>
-              <a:t>Frameworks</a:t>
-            </a:r>
-            <a:r>
               <a:rPr lang="es-ES_tradnl" dirty="0" smtClean="0"/>
-              <a:t> CSS</a:t>
+              <a:t>Para ver	</a:t>
             </a:r>
             <a:endParaRPr lang="en-US" dirty="0"/>
           </a:p>
@@ -7946,50 +7443,37 @@
         </p:nvSpPr>
         <p:spPr/>
         <p:txBody>
-          <a:bodyPr/>
+          <a:bodyPr>
+            <a:normAutofit lnSpcReduction="10000"/>
+          </a:bodyPr>
           <a:lstStyle/>
           <a:p>
             <a:r>
               <a:rPr lang="en-US" dirty="0" smtClean="0">
                 <a:hlinkClick r:id="rId2"/>
               </a:rPr>
-              <a:t>http://www.getskeleton.com/</a:t>
+              <a:t>https://speakerdeck.com/shesho/html-plus-css</a:t>
             </a:r>
             <a:endParaRPr lang="en-US" dirty="0" smtClean="0"/>
-          </a:p>
-          <a:p>
-            <a:endParaRPr lang="es-ES_tradnl" dirty="0"/>
           </a:p>
           <a:p>
             <a:r>
               <a:rPr lang="en-US" dirty="0" smtClean="0">
                 <a:hlinkClick r:id="rId3"/>
               </a:rPr>
-              <a:t>http://twitter.github.io/bootstrap</a:t>
-            </a:r>
-            <a:r>
-              <a:rPr lang="en-US" dirty="0" smtClean="0">
-                <a:hlinkClick r:id="rId3"/>
-              </a:rPr>
-              <a:t>/</a:t>
+              <a:t>https://speakerdeck.com/ryhan/introductory-html-and-css</a:t>
             </a:r>
             <a:endParaRPr lang="en-US" dirty="0" smtClean="0"/>
           </a:p>
           <a:p>
-            <a:endParaRPr lang="es-ES_tradnl" dirty="0"/>
-          </a:p>
-          <a:p>
-            <a:r>
-              <a:rPr lang="en-US" dirty="0">
-                <a:hlinkClick r:id="rId4"/>
-              </a:rPr>
-              <a:t>http://foundation.zurb.com</a:t>
-            </a:r>
+            <a:endParaRPr lang="es-ES_tradnl" dirty="0" smtClean="0"/>
+          </a:p>
+          <a:p>
             <a:r>
               <a:rPr lang="en-US" dirty="0" smtClean="0">
                 <a:hlinkClick r:id="rId4"/>
               </a:rPr>
-              <a:t>/</a:t>
+              <a:t>https://speakerdeck.com/lumilux/intro-to-html</a:t>
             </a:r>
             <a:endParaRPr lang="en-US" dirty="0" smtClean="0"/>
           </a:p>
@@ -7998,11 +7482,35 @@
           </a:p>
           <a:p>
             <a:r>
-              <a:rPr lang="en-US" dirty="0">
+              <a:rPr lang="en-US" dirty="0" smtClean="0">
                 <a:hlinkClick r:id="rId5"/>
               </a:rPr>
-              <a:t>http://purecss.io/</a:t>
-            </a:r>
+              <a:t>https://speakerdeck.com/stupig/html-and-css-basics</a:t>
+            </a:r>
+            <a:endParaRPr lang="es-ES_tradnl" dirty="0"/>
+          </a:p>
+          <a:p>
+            <a:endParaRPr lang="es-ES_tradnl" dirty="0" smtClean="0"/>
+          </a:p>
+          <a:p>
+            <a:r>
+              <a:rPr lang="en-US" dirty="0" smtClean="0">
+                <a:hlinkClick r:id="rId6"/>
+              </a:rPr>
+              <a:t>https://speakerdeck.com/pacheco_hn/html-5</a:t>
+            </a:r>
+            <a:endParaRPr lang="en-US" dirty="0" smtClean="0"/>
+          </a:p>
+          <a:p>
+            <a:r>
+              <a:rPr lang="en-US" dirty="0" smtClean="0">
+                <a:hlinkClick r:id="rId7"/>
+              </a:rPr>
+              <a:t>https://speakerdeck.com/slant/html-and-css</a:t>
+            </a:r>
+            <a:endParaRPr lang="en-US" dirty="0" smtClean="0"/>
+          </a:p>
+          <a:p>
             <a:endParaRPr lang="en-US" dirty="0"/>
           </a:p>
         </p:txBody>
@@ -8010,164 +7518,25 @@
     </p:spTree>
     <p:extLst>
       <p:ext uri="{BB962C8B-B14F-4D97-AF65-F5344CB8AC3E}">
-        <p14:creationId xmlns:p14="http://schemas.microsoft.com/office/powerpoint/2010/main" val="2313433037"/>
+        <p14:creationId xmlns:p14="http://schemas.microsoft.com/office/powerpoint/2010/main" val="982115055"/>
       </p:ext>
     </p:extLst>
   </p:cSld>
   <p:clrMapOvr>
     <a:masterClrMapping/>
   </p:clrMapOvr>
+  <mc:AlternateContent xmlns:mc="http://schemas.openxmlformats.org/markup-compatibility/2006">
+    <mc:Choice xmlns:p14="http://schemas.microsoft.com/office/powerpoint/2010/main" Requires="p14">
+      <p:transition spd="slow" p14:dur="2000"/>
+    </mc:Choice>
+    <mc:Fallback>
+      <p:transition spd="slow"/>
+    </mc:Fallback>
+  </mc:AlternateContent>
 </p:sld>
 </file>
 
-<file path=ppt/slides/slide31.xml><?xml version="1.0" encoding="utf-8"?>
-<p:sld xmlns:a="http://schemas.openxmlformats.org/drawingml/2006/main" xmlns:r="http://schemas.openxmlformats.org/officeDocument/2006/relationships" xmlns:p="http://schemas.openxmlformats.org/presentationml/2006/main">
-  <p:cSld>
-    <p:spTree>
-      <p:nvGrpSpPr>
-        <p:cNvPr id="1" name=""/>
-        <p:cNvGrpSpPr/>
-        <p:nvPr/>
-      </p:nvGrpSpPr>
-      <p:grpSpPr>
-        <a:xfrm>
-          <a:off x="0" y="0"/>
-          <a:ext cx="0" cy="0"/>
-          <a:chOff x="0" y="0"/>
-          <a:chExt cx="0" cy="0"/>
-        </a:xfrm>
-      </p:grpSpPr>
-      <p:sp>
-        <p:nvSpPr>
-          <p:cNvPr id="2" name="Title 1"/>
-          <p:cNvSpPr>
-            <a:spLocks noGrp="1"/>
-          </p:cNvSpPr>
-          <p:nvPr>
-            <p:ph type="title"/>
-          </p:nvPr>
-        </p:nvSpPr>
-        <p:spPr/>
-        <p:txBody>
-          <a:bodyPr/>
-          <a:lstStyle/>
-          <a:p>
-            <a:r>
-              <a:rPr lang="es-ES_tradnl" dirty="0" smtClean="0"/>
-              <a:t>Recursos</a:t>
-            </a:r>
-            <a:endParaRPr lang="en-US" dirty="0"/>
-          </a:p>
-        </p:txBody>
-      </p:sp>
-      <p:sp>
-        <p:nvSpPr>
-          <p:cNvPr id="3" name="Content Placeholder 2"/>
-          <p:cNvSpPr>
-            <a:spLocks noGrp="1"/>
-          </p:cNvSpPr>
-          <p:nvPr>
-            <p:ph idx="1"/>
-          </p:nvPr>
-        </p:nvSpPr>
-        <p:spPr/>
-        <p:txBody>
-          <a:bodyPr/>
-          <a:lstStyle/>
-          <a:p>
-            <a:r>
-              <a:rPr lang="es-ES_tradnl" dirty="0">
-                <a:hlinkClick r:id="rId2"/>
-              </a:rPr>
-              <a:t>https://</a:t>
-            </a:r>
-            <a:r>
-              <a:rPr lang="es-ES_tradnl" dirty="0" smtClean="0">
-                <a:hlinkClick r:id="rId2"/>
-              </a:rPr>
-              <a:t>developer.mozilla.org/en-US/docs/Web/HTML</a:t>
-            </a:r>
-            <a:endParaRPr lang="es-ES_tradnl" dirty="0" smtClean="0"/>
-          </a:p>
-          <a:p>
-            <a:r>
-              <a:rPr lang="en-US" dirty="0" smtClean="0">
-                <a:hlinkClick r:id="rId3"/>
-              </a:rPr>
-              <a:t>https</a:t>
-            </a:r>
-            <a:r>
-              <a:rPr lang="en-US" dirty="0">
-                <a:hlinkClick r:id="rId3"/>
-              </a:rPr>
-              <a:t>://developer.mozilla.org/en-US/docs/Web/CSS</a:t>
-            </a:r>
-            <a:endParaRPr lang="es-ES_tradnl" dirty="0" smtClean="0"/>
-          </a:p>
-          <a:p>
-            <a:r>
-              <a:rPr lang="en-US" dirty="0">
-                <a:hlinkClick r:id="rId4"/>
-              </a:rPr>
-              <a:t>http://www.w3.org</a:t>
-            </a:r>
-            <a:r>
-              <a:rPr lang="en-US" dirty="0" smtClean="0">
-                <a:hlinkClick r:id="rId4"/>
-              </a:rPr>
-              <a:t>/</a:t>
-            </a:r>
-            <a:endParaRPr lang="en-US" dirty="0" smtClean="0"/>
-          </a:p>
-          <a:p>
-            <a:r>
-              <a:rPr lang="en-US" dirty="0">
-                <a:hlinkClick r:id="rId5"/>
-              </a:rPr>
-              <a:t>http://validator.w3.org/</a:t>
-            </a:r>
-            <a:endParaRPr lang="en-US" dirty="0" smtClean="0"/>
-          </a:p>
-          <a:p>
-            <a:r>
-              <a:rPr lang="en-US" dirty="0">
-                <a:hlinkClick r:id="rId6"/>
-              </a:rPr>
-              <a:t>http://</a:t>
-            </a:r>
-            <a:r>
-              <a:rPr lang="en-US" dirty="0" smtClean="0">
-                <a:hlinkClick r:id="rId6"/>
-              </a:rPr>
-              <a:t>www.codecademy.com/tracks/web</a:t>
-            </a:r>
-            <a:endParaRPr lang="en-US" dirty="0" smtClean="0"/>
-          </a:p>
-          <a:p>
-            <a:r>
-              <a:rPr lang="en-US" dirty="0">
-                <a:hlinkClick r:id="rId7"/>
-              </a:rPr>
-              <a:t>http://www.w3schools.com/</a:t>
-            </a:r>
-            <a:endParaRPr lang="es-ES_tradnl" dirty="0" smtClean="0"/>
-          </a:p>
-        </p:txBody>
-      </p:sp>
-    </p:spTree>
-    <p:extLst>
-      <p:ext uri="{BB962C8B-B14F-4D97-AF65-F5344CB8AC3E}">
-        <p14:creationId xmlns:p14="http://schemas.microsoft.com/office/powerpoint/2010/main" val="1310797858"/>
-      </p:ext>
-    </p:extLst>
-  </p:cSld>
-  <p:clrMapOvr>
-    <a:masterClrMapping/>
-  </p:clrMapOvr>
-</p:sld>
-</file>
-
-<file path=ppt/slides/slide4.xml><?xml version="1.0" encoding="utf-8"?>
+<file path=ppt/slides/slide3.xml><?xml version="1.0" encoding="utf-8"?>
 <p:sld xmlns:a="http://schemas.openxmlformats.org/drawingml/2006/main" xmlns:r="http://schemas.openxmlformats.org/officeDocument/2006/relationships" xmlns:p="http://schemas.openxmlformats.org/presentationml/2006/main">
   <p:cSld>
     <p:spTree>
@@ -8192,10 +7561,10 @@
         </p:nvGrpSpPr>
         <p:grpSpPr>
           <a:xfrm>
-            <a:off x="3440981" y="994884"/>
-            <a:ext cx="5310038" cy="4868233"/>
-            <a:chOff x="2852438" y="1196165"/>
-            <a:chExt cx="5310038" cy="4868233"/>
+            <a:off x="3018885" y="469269"/>
+            <a:ext cx="6154230" cy="5919462"/>
+            <a:chOff x="2430342" y="549780"/>
+            <a:chExt cx="6154230" cy="5919462"/>
           </a:xfrm>
         </p:grpSpPr>
         <p:sp>
@@ -8206,8 +7575,8 @@
           </p:nvSpPr>
           <p:spPr>
             <a:xfrm>
-              <a:off x="2852438" y="1196165"/>
-              <a:ext cx="2869780" cy="2869780"/>
+              <a:off x="2430342" y="549780"/>
+              <a:ext cx="3472434" cy="3472434"/>
             </a:xfrm>
             <a:prstGeom prst="ellipse">
               <a:avLst/>
@@ -8240,7 +7609,7 @@
             <a:p>
               <a:pPr algn="ctr"/>
               <a:r>
-                <a:rPr lang="es-ES_tradnl" sz="3200" b="1" dirty="0">
+                <a:rPr lang="es-ES_tradnl" sz="4000" b="1" dirty="0">
                   <a:ln w="3175">
                     <a:solidFill>
                       <a:schemeClr val="tx1">
@@ -8252,7 +7621,7 @@
                 </a:rPr>
                 <a:t>HTML</a:t>
               </a:r>
-              <a:endParaRPr lang="en-US" sz="3200" b="1" dirty="0">
+              <a:endParaRPr lang="en-US" sz="4000" b="1" dirty="0">
                 <a:ln w="3175">
                   <a:solidFill>
                     <a:schemeClr val="tx1">
@@ -8273,8 +7642,8 @@
           </p:nvSpPr>
           <p:spPr>
             <a:xfrm>
-              <a:off x="5292696" y="1196165"/>
-              <a:ext cx="2869780" cy="2869780"/>
+              <a:off x="5112138" y="549780"/>
+              <a:ext cx="3472434" cy="3472434"/>
             </a:xfrm>
             <a:prstGeom prst="ellipse">
               <a:avLst/>
@@ -8307,7 +7676,7 @@
             <a:p>
               <a:pPr algn="ctr"/>
               <a:r>
-                <a:rPr lang="es-ES_tradnl" sz="3200" b="1" dirty="0">
+                <a:rPr lang="es-ES_tradnl" sz="4000" b="1" dirty="0">
                   <a:ln w="3175">
                     <a:solidFill>
                       <a:schemeClr val="tx1">
@@ -8319,7 +7688,7 @@
                 </a:rPr>
                 <a:t>CSS</a:t>
               </a:r>
-              <a:endParaRPr lang="en-US" sz="3200" b="1" dirty="0">
+              <a:endParaRPr lang="en-US" sz="4000" b="1" dirty="0">
                 <a:ln w="3175">
                   <a:solidFill>
                     <a:schemeClr val="tx1">
@@ -8340,8 +7709,8 @@
           </p:nvSpPr>
           <p:spPr>
             <a:xfrm>
-              <a:off x="4072567" y="3194618"/>
-              <a:ext cx="2869780" cy="2869780"/>
+              <a:off x="3771240" y="2996808"/>
+              <a:ext cx="3472434" cy="3472434"/>
             </a:xfrm>
             <a:prstGeom prst="ellipse">
               <a:avLst/>
@@ -8374,7 +7743,7 @@
             <a:p>
               <a:pPr algn="ctr"/>
               <a:r>
-                <a:rPr lang="es-ES_tradnl" sz="3200" b="1" dirty="0" smtClean="0">
+                <a:rPr lang="es-ES_tradnl" sz="4000" b="1" dirty="0" smtClean="0">
                   <a:ln w="3175">
                     <a:solidFill>
                       <a:schemeClr val="tx1">
@@ -8386,7 +7755,7 @@
                 </a:rPr>
                 <a:t>JavaScript</a:t>
               </a:r>
-              <a:endParaRPr lang="en-US" b="1" dirty="0">
+              <a:endParaRPr lang="en-US" sz="2400" b="1" dirty="0">
                 <a:ln w="3175">
                   <a:solidFill>
                     <a:schemeClr val="tx1">
@@ -8413,7 +7782,7 @@
 </p:sld>
 </file>
 
-<file path=ppt/slides/slide5.xml><?xml version="1.0" encoding="utf-8"?>
+<file path=ppt/slides/slide4.xml><?xml version="1.0" encoding="utf-8"?>
 <p:sld xmlns:a="http://schemas.openxmlformats.org/drawingml/2006/main" xmlns:r="http://schemas.openxmlformats.org/officeDocument/2006/relationships" xmlns:p="http://schemas.openxmlformats.org/presentationml/2006/main">
   <p:cSld>
     <p:spTree>
@@ -8438,8 +7807,8 @@
         </p:nvSpPr>
         <p:spPr>
           <a:xfrm>
-            <a:off x="1129103" y="958942"/>
-            <a:ext cx="2869780" cy="2869780"/>
+            <a:off x="827776" y="657615"/>
+            <a:ext cx="3472434" cy="3472434"/>
           </a:xfrm>
           <a:prstGeom prst="ellipse">
             <a:avLst/>
@@ -8472,7 +7841,7 @@
           <a:p>
             <a:pPr algn="ctr"/>
             <a:r>
-              <a:rPr lang="es-ES_tradnl" sz="3200" b="1" dirty="0">
+              <a:rPr lang="es-ES_tradnl" sz="4400" b="1" dirty="0">
                 <a:ln w="3175">
                   <a:solidFill>
                     <a:schemeClr val="tx1">
@@ -8505,8 +7874,8 @@
         </p:nvSpPr>
         <p:spPr>
           <a:xfrm>
-            <a:off x="8543640" y="946910"/>
-            <a:ext cx="2869780" cy="2869780"/>
+            <a:off x="8242313" y="645583"/>
+            <a:ext cx="3472434" cy="3472434"/>
           </a:xfrm>
           <a:prstGeom prst="ellipse">
             <a:avLst/>
@@ -8539,7 +7908,7 @@
           <a:p>
             <a:pPr algn="ctr"/>
             <a:r>
-              <a:rPr lang="es-ES_tradnl" sz="3200" b="1" dirty="0" smtClean="0">
+              <a:rPr lang="es-ES_tradnl" sz="4000" b="1" dirty="0" smtClean="0">
                 <a:ln w="3175">
                   <a:solidFill>
                     <a:schemeClr val="tx1">
@@ -8572,13 +7941,13 @@
         </p:nvSpPr>
         <p:spPr>
           <a:xfrm>
-            <a:off x="1485939" y="4109399"/>
+            <a:off x="1485939" y="4566163"/>
             <a:ext cx="2156108" cy="896977"/>
           </a:xfrm>
           <a:prstGeom prst="wedgeRoundRectCallout">
             <a:avLst>
-              <a:gd name="adj1" fmla="val 17367"/>
-              <a:gd name="adj2" fmla="val -117869"/>
+              <a:gd name="adj1" fmla="val 10965"/>
+              <a:gd name="adj2" fmla="val -125563"/>
               <a:gd name="adj3" fmla="val 16667"/>
             </a:avLst>
           </a:prstGeom>
@@ -8620,7 +7989,7 @@
         </p:nvSpPr>
         <p:spPr>
           <a:xfrm>
-            <a:off x="8400151" y="4097367"/>
+            <a:off x="8400151" y="4566163"/>
             <a:ext cx="3156758" cy="896977"/>
           </a:xfrm>
           <a:prstGeom prst="wedgeRoundRectCallout">
@@ -8668,10 +8037,10 @@
         </p:nvGrpSpPr>
         <p:grpSpPr>
           <a:xfrm>
-            <a:off x="4764627" y="946910"/>
-            <a:ext cx="2869780" cy="4047434"/>
-            <a:chOff x="8400151" y="958942"/>
-            <a:chExt cx="2869780" cy="4047434"/>
+            <a:off x="4535044" y="657615"/>
+            <a:ext cx="3472434" cy="4817557"/>
+            <a:chOff x="8098824" y="657615"/>
+            <a:chExt cx="3472434" cy="4817557"/>
           </a:xfrm>
         </p:grpSpPr>
         <p:sp>
@@ -8682,8 +8051,8 @@
           </p:nvSpPr>
           <p:spPr>
             <a:xfrm>
-              <a:off x="8400151" y="958942"/>
-              <a:ext cx="2869780" cy="2869780"/>
+              <a:off x="8098824" y="657615"/>
+              <a:ext cx="3472434" cy="3472434"/>
             </a:xfrm>
             <a:prstGeom prst="ellipse">
               <a:avLst/>
@@ -8716,7 +8085,7 @@
             <a:p>
               <a:pPr algn="ctr"/>
               <a:r>
-                <a:rPr lang="es-ES_tradnl" sz="3200" b="1" dirty="0">
+                <a:rPr lang="es-ES_tradnl" sz="4400" b="1" dirty="0">
                   <a:ln w="3175">
                     <a:solidFill>
                       <a:schemeClr val="tx1">
@@ -8749,13 +8118,13 @@
           </p:nvSpPr>
           <p:spPr>
             <a:xfrm>
-              <a:off x="8530595" y="4109399"/>
+              <a:off x="8530595" y="4578195"/>
               <a:ext cx="2608891" cy="896977"/>
             </a:xfrm>
             <a:prstGeom prst="wedgeRoundRectCallout">
               <a:avLst>
-                <a:gd name="adj1" fmla="val 7996"/>
-                <a:gd name="adj2" fmla="val -108252"/>
+                <a:gd name="adj1" fmla="val 10641"/>
+                <a:gd name="adj2" fmla="val -127486"/>
                 <a:gd name="adj3" fmla="val 16667"/>
               </a:avLst>
             </a:prstGeom>
@@ -8803,131 +8172,7 @@
 </p:sld>
 </file>
 
-<file path=ppt/slides/slide6.xml><?xml version="1.0" encoding="utf-8"?>
-<p:sld xmlns:a="http://schemas.openxmlformats.org/drawingml/2006/main" xmlns:r="http://schemas.openxmlformats.org/officeDocument/2006/relationships" xmlns:p="http://schemas.openxmlformats.org/presentationml/2006/main">
-  <p:cSld>
-    <p:spTree>
-      <p:nvGrpSpPr>
-        <p:cNvPr id="1" name=""/>
-        <p:cNvGrpSpPr/>
-        <p:nvPr/>
-      </p:nvGrpSpPr>
-      <p:grpSpPr>
-        <a:xfrm>
-          <a:off x="0" y="0"/>
-          <a:ext cx="0" cy="0"/>
-          <a:chOff x="0" y="0"/>
-          <a:chExt cx="0" cy="0"/>
-        </a:xfrm>
-      </p:grpSpPr>
-      <p:sp>
-        <p:nvSpPr>
-          <p:cNvPr id="2" name="Title 1"/>
-          <p:cNvSpPr>
-            <a:spLocks noGrp="1"/>
-          </p:cNvSpPr>
-          <p:nvPr>
-            <p:ph type="title"/>
-          </p:nvPr>
-        </p:nvSpPr>
-        <p:spPr/>
-        <p:txBody>
-          <a:bodyPr/>
-          <a:lstStyle/>
-          <a:p>
-            <a:endParaRPr lang="en-US"/>
-          </a:p>
-        </p:txBody>
-      </p:sp>
-      <p:sp>
-        <p:nvSpPr>
-          <p:cNvPr id="3" name="Content Placeholder 2"/>
-          <p:cNvSpPr>
-            <a:spLocks noGrp="1"/>
-          </p:cNvSpPr>
-          <p:nvPr>
-            <p:ph idx="1"/>
-          </p:nvPr>
-        </p:nvSpPr>
-        <p:spPr/>
-        <p:txBody>
-          <a:bodyPr/>
-          <a:lstStyle/>
-          <a:p>
-            <a:r>
-              <a:rPr lang="es-ES_tradnl" dirty="0" smtClean="0"/>
-              <a:t>HTML : Contenido // que</a:t>
-            </a:r>
-          </a:p>
-          <a:p>
-            <a:pPr lvl="1"/>
-            <a:r>
-              <a:rPr lang="es-ES_tradnl" dirty="0" smtClean="0"/>
-              <a:t>&lt;p&gt;Hola mundo&lt;/p&gt;</a:t>
-            </a:r>
-          </a:p>
-          <a:p>
-            <a:r>
-              <a:rPr lang="es-ES_tradnl" dirty="0" smtClean="0"/>
-              <a:t>CSS: presentación //como</a:t>
-            </a:r>
-          </a:p>
-          <a:p>
-            <a:pPr lvl="1"/>
-            <a:r>
-              <a:rPr lang="es-ES_tradnl" dirty="0" smtClean="0"/>
-              <a:t>p { font-size:2em; </a:t>
-            </a:r>
-            <a:r>
-              <a:rPr lang="es-ES_tradnl" dirty="0" err="1" smtClean="0"/>
-              <a:t>font-weight:bold</a:t>
-            </a:r>
-            <a:r>
-              <a:rPr lang="es-ES_tradnl" dirty="0" smtClean="0"/>
-              <a:t>; </a:t>
-            </a:r>
-            <a:r>
-              <a:rPr lang="es-ES_tradnl" dirty="0" err="1" smtClean="0"/>
-              <a:t>color:red</a:t>
-            </a:r>
-            <a:r>
-              <a:rPr lang="es-ES_tradnl" dirty="0" smtClean="0"/>
-              <a:t>; </a:t>
-            </a:r>
-            <a:r>
-              <a:rPr lang="es-ES_tradnl" dirty="0" err="1" smtClean="0"/>
-              <a:t>background</a:t>
-            </a:r>
-            <a:r>
-              <a:rPr lang="es-ES_tradnl" dirty="0" smtClean="0"/>
-              <a:t>-color: </a:t>
-            </a:r>
-            <a:r>
-              <a:rPr lang="es-ES_tradnl" dirty="0" err="1" smtClean="0"/>
-              <a:t>black</a:t>
-            </a:r>
-            <a:r>
-              <a:rPr lang="es-ES_tradnl" dirty="0" smtClean="0"/>
-              <a:t>;}</a:t>
-            </a:r>
-            <a:endParaRPr lang="en-US" dirty="0"/>
-          </a:p>
-        </p:txBody>
-      </p:sp>
-    </p:spTree>
-    <p:extLst>
-      <p:ext uri="{BB962C8B-B14F-4D97-AF65-F5344CB8AC3E}">
-        <p14:creationId xmlns:p14="http://schemas.microsoft.com/office/powerpoint/2010/main" val="3215222923"/>
-      </p:ext>
-    </p:extLst>
-  </p:cSld>
-  <p:clrMapOvr>
-    <a:masterClrMapping/>
-  </p:clrMapOvr>
-</p:sld>
-</file>
-
-<file path=ppt/slides/slide7.xml><?xml version="1.0" encoding="utf-8"?>
+<file path=ppt/slides/slide5.xml><?xml version="1.0" encoding="utf-8"?>
 <p:sld xmlns:a="http://schemas.openxmlformats.org/drawingml/2006/main" xmlns:r="http://schemas.openxmlformats.org/officeDocument/2006/relationships" xmlns:p="http://schemas.openxmlformats.org/presentationml/2006/main">
   <p:cSld>
     <p:spTree>
@@ -8952,10 +8197,10 @@
         </p:nvGrpSpPr>
         <p:grpSpPr>
           <a:xfrm>
-            <a:off x="2783347" y="901336"/>
-            <a:ext cx="6625306" cy="5055328"/>
-            <a:chOff x="2783347" y="945405"/>
-            <a:chExt cx="6625306" cy="5055328"/>
+            <a:off x="2783347" y="903703"/>
+            <a:ext cx="6625306" cy="5052961"/>
+            <a:chOff x="2783347" y="947772"/>
+            <a:chExt cx="6625306" cy="5052961"/>
           </a:xfrm>
         </p:grpSpPr>
         <p:grpSp>
@@ -9365,8 +8610,8 @@
           </p:nvSpPr>
           <p:spPr>
             <a:xfrm>
-              <a:off x="5747133" y="945405"/>
-              <a:ext cx="782587" cy="584775"/>
+              <a:off x="4744574" y="947772"/>
+              <a:ext cx="2778133" cy="584775"/>
             </a:xfrm>
             <a:prstGeom prst="rect">
               <a:avLst/>
@@ -9385,7 +8630,7 @@
                     <a:srgbClr val="C00000"/>
                   </a:solidFill>
                 </a:rPr>
-                <a:t>CSS</a:t>
+                <a:t>CSS / JavaScript</a:t>
               </a:r>
               <a:endParaRPr lang="en-US" sz="3200" dirty="0">
                 <a:solidFill>
@@ -9577,7 +8822,7 @@
 </p:sld>
 </file>
 
-<file path=ppt/slides/slide8.xml><?xml version="1.0" encoding="utf-8"?>
+<file path=ppt/slides/slide6.xml><?xml version="1.0" encoding="utf-8"?>
 <p:sld xmlns:a="http://schemas.openxmlformats.org/drawingml/2006/main" xmlns:r="http://schemas.openxmlformats.org/officeDocument/2006/relationships" xmlns:p="http://schemas.openxmlformats.org/presentationml/2006/main">
   <p:cSld>
     <p:spTree>
@@ -9803,7 +9048,7 @@
 </p:sld>
 </file>
 
-<file path=ppt/slides/slide9.xml><?xml version="1.0" encoding="utf-8"?>
+<file path=ppt/slides/slide7.xml><?xml version="1.0" encoding="utf-8"?>
 <p:sld xmlns:a="http://schemas.openxmlformats.org/drawingml/2006/main" xmlns:r="http://schemas.openxmlformats.org/officeDocument/2006/relationships" xmlns:p="http://schemas.openxmlformats.org/presentationml/2006/main">
   <p:cSld>
     <p:spTree>
@@ -9874,7 +9119,15 @@
                   <a:schemeClr val="accent2"/>
                 </a:solidFill>
               </a:rPr>
-              <a:t>&lt;</a:t>
+              <a:t>&lt;etiqueta </a:t>
+            </a:r>
+            <a:r>
+              <a:rPr lang="es-ES_tradnl" b="1" dirty="0" smtClean="0">
+                <a:solidFill>
+                  <a:schemeClr val="accent2"/>
+                </a:solidFill>
+              </a:rPr>
+              <a:t>atributo</a:t>
             </a:r>
             <a:r>
               <a:rPr lang="es-ES_tradnl" dirty="0" smtClean="0">
@@ -9882,7 +9135,7 @@
                   <a:schemeClr val="accent2"/>
                 </a:solidFill>
               </a:rPr>
-              <a:t>etiqueta </a:t>
+              <a:t>=“</a:t>
             </a:r>
             <a:r>
               <a:rPr lang="es-ES_tradnl" b="1" dirty="0" smtClean="0">
@@ -9890,7 +9143,7 @@
                   <a:schemeClr val="accent2"/>
                 </a:solidFill>
               </a:rPr>
-              <a:t>atributo</a:t>
+              <a:t>valor</a:t>
             </a:r>
             <a:r>
               <a:rPr lang="es-ES_tradnl" dirty="0" smtClean="0">
@@ -9898,29 +9151,8 @@
                   <a:schemeClr val="accent2"/>
                 </a:solidFill>
               </a:rPr>
-              <a:t>=“</a:t>
-            </a:r>
-            <a:r>
-              <a:rPr lang="es-ES_tradnl" b="1" dirty="0" smtClean="0">
-                <a:solidFill>
-                  <a:schemeClr val="accent2"/>
-                </a:solidFill>
-              </a:rPr>
-              <a:t>valor</a:t>
-            </a:r>
-            <a:r>
-              <a:rPr lang="es-ES_tradnl" dirty="0" smtClean="0">
-                <a:solidFill>
-                  <a:schemeClr val="accent2"/>
-                </a:solidFill>
-              </a:rPr>
               <a:t>”&gt;</a:t>
             </a:r>
-            <a:endParaRPr lang="es-ES_tradnl" dirty="0" smtClean="0">
-              <a:solidFill>
-                <a:schemeClr val="accent2"/>
-              </a:solidFill>
-            </a:endParaRPr>
           </a:p>
           <a:p>
             <a:pPr marL="0" indent="0">
@@ -10019,6 +9251,554 @@
     <p:extLst>
       <p:ext uri="{BB962C8B-B14F-4D97-AF65-F5344CB8AC3E}">
         <p14:creationId xmlns:p14="http://schemas.microsoft.com/office/powerpoint/2010/main" val="1613332830"/>
+      </p:ext>
+    </p:extLst>
+  </p:cSld>
+  <p:clrMapOvr>
+    <a:masterClrMapping/>
+  </p:clrMapOvr>
+</p:sld>
+</file>
+
+<file path=ppt/slides/slide8.xml><?xml version="1.0" encoding="utf-8"?>
+<p:sld xmlns:a="http://schemas.openxmlformats.org/drawingml/2006/main" xmlns:r="http://schemas.openxmlformats.org/officeDocument/2006/relationships" xmlns:p="http://schemas.openxmlformats.org/presentationml/2006/main">
+  <p:cSld>
+    <p:spTree>
+      <p:nvGrpSpPr>
+        <p:cNvPr id="1" name=""/>
+        <p:cNvGrpSpPr/>
+        <p:nvPr/>
+      </p:nvGrpSpPr>
+      <p:grpSpPr>
+        <a:xfrm>
+          <a:off x="0" y="0"/>
+          <a:ext cx="0" cy="0"/>
+          <a:chOff x="0" y="0"/>
+          <a:chExt cx="0" cy="0"/>
+        </a:xfrm>
+      </p:grpSpPr>
+      <p:sp>
+        <p:nvSpPr>
+          <p:cNvPr id="2" name="Title 1"/>
+          <p:cNvSpPr>
+            <a:spLocks noGrp="1"/>
+          </p:cNvSpPr>
+          <p:nvPr>
+            <p:ph type="title"/>
+          </p:nvPr>
+        </p:nvSpPr>
+        <p:spPr/>
+        <p:txBody>
+          <a:bodyPr/>
+          <a:lstStyle/>
+          <a:p>
+            <a:r>
+              <a:rPr lang="es-ES_tradnl" dirty="0" smtClean="0"/>
+              <a:t>Estructura básica</a:t>
+            </a:r>
+            <a:endParaRPr lang="en-US" dirty="0"/>
+          </a:p>
+        </p:txBody>
+      </p:sp>
+      <p:sp>
+        <p:nvSpPr>
+          <p:cNvPr id="3" name="Content Placeholder 2"/>
+          <p:cNvSpPr>
+            <a:spLocks noGrp="1"/>
+          </p:cNvSpPr>
+          <p:nvPr>
+            <p:ph idx="1"/>
+          </p:nvPr>
+        </p:nvSpPr>
+        <p:spPr/>
+        <p:txBody>
+          <a:bodyPr/>
+          <a:lstStyle/>
+          <a:p>
+            <a:pPr marL="0" indent="0">
+              <a:buNone/>
+            </a:pPr>
+            <a:r>
+              <a:rPr lang="es-ES_tradnl" dirty="0" smtClean="0"/>
+              <a:t>&lt;</a:t>
+            </a:r>
+            <a:r>
+              <a:rPr lang="es-ES_tradnl" dirty="0" err="1" smtClean="0"/>
+              <a:t>html</a:t>
+            </a:r>
+            <a:r>
+              <a:rPr lang="es-ES_tradnl" dirty="0" smtClean="0"/>
+              <a:t>&gt;</a:t>
+            </a:r>
+          </a:p>
+          <a:p>
+            <a:pPr marL="457200" lvl="1" indent="0">
+              <a:buNone/>
+            </a:pPr>
+            <a:r>
+              <a:rPr lang="es-ES_tradnl" dirty="0" smtClean="0">
+                <a:solidFill>
+                  <a:srgbClr val="00B050"/>
+                </a:solidFill>
+              </a:rPr>
+              <a:t>&lt;head&gt;</a:t>
+            </a:r>
+          </a:p>
+          <a:p>
+            <a:pPr marL="457200" lvl="1" indent="0">
+              <a:buNone/>
+            </a:pPr>
+            <a:r>
+              <a:rPr lang="es-ES_tradnl" dirty="0" smtClean="0">
+                <a:solidFill>
+                  <a:srgbClr val="00B050"/>
+                </a:solidFill>
+              </a:rPr>
+              <a:t>…</a:t>
+            </a:r>
+          </a:p>
+          <a:p>
+            <a:pPr marL="457200" lvl="1" indent="0">
+              <a:buNone/>
+            </a:pPr>
+            <a:r>
+              <a:rPr lang="es-ES_tradnl" dirty="0" smtClean="0">
+                <a:solidFill>
+                  <a:srgbClr val="00B050"/>
+                </a:solidFill>
+              </a:rPr>
+              <a:t>&lt;/head&gt;</a:t>
+            </a:r>
+          </a:p>
+          <a:p>
+            <a:pPr marL="457200" lvl="1" indent="0">
+              <a:buNone/>
+            </a:pPr>
+            <a:r>
+              <a:rPr lang="es-ES_tradnl" dirty="0" smtClean="0">
+                <a:solidFill>
+                  <a:schemeClr val="accent2">
+                    <a:lumMod val="75000"/>
+                  </a:schemeClr>
+                </a:solidFill>
+              </a:rPr>
+              <a:t>&lt;</a:t>
+            </a:r>
+            <a:r>
+              <a:rPr lang="es-ES_tradnl" dirty="0" err="1" smtClean="0">
+                <a:solidFill>
+                  <a:schemeClr val="accent2">
+                    <a:lumMod val="75000"/>
+                  </a:schemeClr>
+                </a:solidFill>
+              </a:rPr>
+              <a:t>body</a:t>
+            </a:r>
+            <a:r>
+              <a:rPr lang="es-ES_tradnl" dirty="0" smtClean="0">
+                <a:solidFill>
+                  <a:schemeClr val="accent2">
+                    <a:lumMod val="75000"/>
+                  </a:schemeClr>
+                </a:solidFill>
+              </a:rPr>
+              <a:t>&gt;</a:t>
+            </a:r>
+          </a:p>
+          <a:p>
+            <a:pPr marL="457200" lvl="1" indent="0">
+              <a:buNone/>
+            </a:pPr>
+            <a:r>
+              <a:rPr lang="es-ES_tradnl" dirty="0" smtClean="0">
+                <a:solidFill>
+                  <a:schemeClr val="accent2">
+                    <a:lumMod val="75000"/>
+                  </a:schemeClr>
+                </a:solidFill>
+              </a:rPr>
+              <a:t>…</a:t>
+            </a:r>
+          </a:p>
+          <a:p>
+            <a:pPr marL="457200" lvl="1" indent="0">
+              <a:buNone/>
+            </a:pPr>
+            <a:r>
+              <a:rPr lang="es-ES_tradnl" dirty="0" smtClean="0">
+                <a:solidFill>
+                  <a:schemeClr val="accent2">
+                    <a:lumMod val="75000"/>
+                  </a:schemeClr>
+                </a:solidFill>
+              </a:rPr>
+              <a:t>&lt;/</a:t>
+            </a:r>
+            <a:r>
+              <a:rPr lang="es-ES_tradnl" dirty="0" err="1" smtClean="0">
+                <a:solidFill>
+                  <a:schemeClr val="accent2">
+                    <a:lumMod val="75000"/>
+                  </a:schemeClr>
+                </a:solidFill>
+              </a:rPr>
+              <a:t>body</a:t>
+            </a:r>
+            <a:r>
+              <a:rPr lang="es-ES_tradnl" dirty="0" smtClean="0">
+                <a:solidFill>
+                  <a:schemeClr val="accent2">
+                    <a:lumMod val="75000"/>
+                  </a:schemeClr>
+                </a:solidFill>
+              </a:rPr>
+              <a:t>&gt;</a:t>
+            </a:r>
+          </a:p>
+          <a:p>
+            <a:pPr marL="0" indent="0">
+              <a:buNone/>
+            </a:pPr>
+            <a:r>
+              <a:rPr lang="es-ES_tradnl" dirty="0" smtClean="0"/>
+              <a:t>&lt;/</a:t>
+            </a:r>
+            <a:r>
+              <a:rPr lang="es-ES_tradnl" dirty="0" err="1" smtClean="0"/>
+              <a:t>html</a:t>
+            </a:r>
+            <a:r>
+              <a:rPr lang="es-ES_tradnl" dirty="0" smtClean="0"/>
+              <a:t>&gt;</a:t>
+            </a:r>
+            <a:endParaRPr lang="en-US" dirty="0"/>
+          </a:p>
+        </p:txBody>
+      </p:sp>
+    </p:spTree>
+    <p:extLst>
+      <p:ext uri="{BB962C8B-B14F-4D97-AF65-F5344CB8AC3E}">
+        <p14:creationId xmlns:p14="http://schemas.microsoft.com/office/powerpoint/2010/main" val="2347869269"/>
+      </p:ext>
+    </p:extLst>
+  </p:cSld>
+  <p:clrMapOvr>
+    <a:masterClrMapping/>
+  </p:clrMapOvr>
+</p:sld>
+</file>
+
+<file path=ppt/slides/slide9.xml><?xml version="1.0" encoding="utf-8"?>
+<p:sld xmlns:a="http://schemas.openxmlformats.org/drawingml/2006/main" xmlns:r="http://schemas.openxmlformats.org/officeDocument/2006/relationships" xmlns:p="http://schemas.openxmlformats.org/presentationml/2006/main">
+  <p:cSld>
+    <p:spTree>
+      <p:nvGrpSpPr>
+        <p:cNvPr id="1" name=""/>
+        <p:cNvGrpSpPr/>
+        <p:nvPr/>
+      </p:nvGrpSpPr>
+      <p:grpSpPr>
+        <a:xfrm>
+          <a:off x="0" y="0"/>
+          <a:ext cx="0" cy="0"/>
+          <a:chOff x="0" y="0"/>
+          <a:chExt cx="0" cy="0"/>
+        </a:xfrm>
+      </p:grpSpPr>
+      <p:sp>
+        <p:nvSpPr>
+          <p:cNvPr id="2" name="Title 1"/>
+          <p:cNvSpPr>
+            <a:spLocks noGrp="1"/>
+          </p:cNvSpPr>
+          <p:nvPr>
+            <p:ph type="title"/>
+          </p:nvPr>
+        </p:nvSpPr>
+        <p:spPr/>
+        <p:txBody>
+          <a:bodyPr/>
+          <a:lstStyle/>
+          <a:p>
+            <a:r>
+              <a:rPr lang="es-ES_tradnl" dirty="0"/>
+              <a:t>Block vs </a:t>
+            </a:r>
+            <a:r>
+              <a:rPr lang="es-ES_tradnl" dirty="0" err="1" smtClean="0"/>
+              <a:t>inline</a:t>
+            </a:r>
+            <a:endParaRPr lang="en-US" dirty="0"/>
+          </a:p>
+        </p:txBody>
+      </p:sp>
+      <p:grpSp>
+        <p:nvGrpSpPr>
+          <p:cNvPr id="14" name="Group 13"/>
+          <p:cNvGrpSpPr/>
+          <p:nvPr/>
+        </p:nvGrpSpPr>
+        <p:grpSpPr>
+          <a:xfrm>
+            <a:off x="1823047" y="2644131"/>
+            <a:ext cx="8545906" cy="2674638"/>
+            <a:chOff x="2233883" y="2702225"/>
+            <a:chExt cx="8545906" cy="2674638"/>
+          </a:xfrm>
+        </p:grpSpPr>
+        <p:grpSp>
+          <p:nvGrpSpPr>
+            <p:cNvPr id="12" name="Group 11"/>
+            <p:cNvGrpSpPr/>
+            <p:nvPr/>
+          </p:nvGrpSpPr>
+          <p:grpSpPr>
+            <a:xfrm>
+              <a:off x="2233883" y="2961019"/>
+              <a:ext cx="1897812" cy="1828800"/>
+              <a:chOff x="2398145" y="3657601"/>
+              <a:chExt cx="1897812" cy="1828800"/>
+            </a:xfrm>
+          </p:grpSpPr>
+          <p:sp>
+            <p:nvSpPr>
+              <p:cNvPr id="4" name="Rectangle 3"/>
+              <p:cNvSpPr/>
+              <p:nvPr/>
+            </p:nvSpPr>
+            <p:spPr>
+              <a:xfrm>
+                <a:off x="2398146" y="3657601"/>
+                <a:ext cx="1897811" cy="914400"/>
+              </a:xfrm>
+              <a:prstGeom prst="rect">
+                <a:avLst/>
+              </a:prstGeom>
+            </p:spPr>
+            <p:style>
+              <a:lnRef idx="2">
+                <a:schemeClr val="accent1">
+                  <a:shade val="50000"/>
+                </a:schemeClr>
+              </a:lnRef>
+              <a:fillRef idx="1">
+                <a:schemeClr val="accent1"/>
+              </a:fillRef>
+              <a:effectRef idx="0">
+                <a:schemeClr val="accent1"/>
+              </a:effectRef>
+              <a:fontRef idx="minor">
+                <a:schemeClr val="lt1"/>
+              </a:fontRef>
+            </p:style>
+            <p:txBody>
+              <a:bodyPr rtlCol="0" anchor="ctr"/>
+              <a:lstStyle/>
+              <a:p>
+                <a:pPr algn="ctr"/>
+                <a:r>
+                  <a:rPr lang="es-ES_tradnl" sz="3200" dirty="0"/>
+                  <a:t>b</a:t>
+                </a:r>
+                <a:r>
+                  <a:rPr lang="es-ES_tradnl" sz="3200" dirty="0" smtClean="0"/>
+                  <a:t>lock</a:t>
+                </a:r>
+                <a:endParaRPr lang="en-US" sz="3200" dirty="0"/>
+              </a:p>
+            </p:txBody>
+          </p:sp>
+          <p:sp>
+            <p:nvSpPr>
+              <p:cNvPr id="5" name="Rectangle 4"/>
+              <p:cNvSpPr/>
+              <p:nvPr/>
+            </p:nvSpPr>
+            <p:spPr>
+              <a:xfrm>
+                <a:off x="2398145" y="4572001"/>
+                <a:ext cx="1897811" cy="914400"/>
+              </a:xfrm>
+              <a:prstGeom prst="rect">
+                <a:avLst/>
+              </a:prstGeom>
+            </p:spPr>
+            <p:style>
+              <a:lnRef idx="2">
+                <a:schemeClr val="accent1">
+                  <a:shade val="50000"/>
+                </a:schemeClr>
+              </a:lnRef>
+              <a:fillRef idx="1">
+                <a:schemeClr val="accent1"/>
+              </a:fillRef>
+              <a:effectRef idx="0">
+                <a:schemeClr val="accent1"/>
+              </a:effectRef>
+              <a:fontRef idx="minor">
+                <a:schemeClr val="lt1"/>
+              </a:fontRef>
+            </p:style>
+            <p:txBody>
+              <a:bodyPr rtlCol="0" anchor="ctr"/>
+              <a:lstStyle/>
+              <a:p>
+                <a:pPr algn="ctr"/>
+                <a:r>
+                  <a:rPr lang="es-ES_tradnl" sz="3200" dirty="0" smtClean="0"/>
+                  <a:t>block</a:t>
+                </a:r>
+                <a:endParaRPr lang="en-US" sz="3200" dirty="0"/>
+              </a:p>
+            </p:txBody>
+          </p:sp>
+        </p:grpSp>
+        <p:grpSp>
+          <p:nvGrpSpPr>
+            <p:cNvPr id="11" name="Group 10"/>
+            <p:cNvGrpSpPr/>
+            <p:nvPr/>
+          </p:nvGrpSpPr>
+          <p:grpSpPr>
+            <a:xfrm>
+              <a:off x="6984167" y="3339218"/>
+              <a:ext cx="3795622" cy="914400"/>
+              <a:chOff x="6648094" y="3725246"/>
+              <a:chExt cx="3795622" cy="914400"/>
+            </a:xfrm>
+          </p:grpSpPr>
+          <p:sp>
+            <p:nvSpPr>
+              <p:cNvPr id="6" name="Rectangle 5"/>
+              <p:cNvSpPr/>
+              <p:nvPr/>
+            </p:nvSpPr>
+            <p:spPr>
+              <a:xfrm>
+                <a:off x="6648094" y="3725246"/>
+                <a:ext cx="1897811" cy="914400"/>
+              </a:xfrm>
+              <a:prstGeom prst="rect">
+                <a:avLst/>
+              </a:prstGeom>
+            </p:spPr>
+            <p:style>
+              <a:lnRef idx="2">
+                <a:schemeClr val="accent1">
+                  <a:shade val="50000"/>
+                </a:schemeClr>
+              </a:lnRef>
+              <a:fillRef idx="1">
+                <a:schemeClr val="accent1"/>
+              </a:fillRef>
+              <a:effectRef idx="0">
+                <a:schemeClr val="accent1"/>
+              </a:effectRef>
+              <a:fontRef idx="minor">
+                <a:schemeClr val="lt1"/>
+              </a:fontRef>
+            </p:style>
+            <p:txBody>
+              <a:bodyPr rtlCol="0" anchor="ctr"/>
+              <a:lstStyle/>
+              <a:p>
+                <a:pPr algn="ctr"/>
+                <a:r>
+                  <a:rPr lang="es-ES_tradnl" sz="3200" dirty="0" err="1" smtClean="0"/>
+                  <a:t>inline</a:t>
+                </a:r>
+                <a:endParaRPr lang="en-US" sz="3200" dirty="0"/>
+              </a:p>
+            </p:txBody>
+          </p:sp>
+          <p:sp>
+            <p:nvSpPr>
+              <p:cNvPr id="7" name="Rectangle 6"/>
+              <p:cNvSpPr/>
+              <p:nvPr/>
+            </p:nvSpPr>
+            <p:spPr>
+              <a:xfrm>
+                <a:off x="8545905" y="3725246"/>
+                <a:ext cx="1897811" cy="914400"/>
+              </a:xfrm>
+              <a:prstGeom prst="rect">
+                <a:avLst/>
+              </a:prstGeom>
+            </p:spPr>
+            <p:style>
+              <a:lnRef idx="2">
+                <a:schemeClr val="accent1">
+                  <a:shade val="50000"/>
+                </a:schemeClr>
+              </a:lnRef>
+              <a:fillRef idx="1">
+                <a:schemeClr val="accent1"/>
+              </a:fillRef>
+              <a:effectRef idx="0">
+                <a:schemeClr val="accent1"/>
+              </a:effectRef>
+              <a:fontRef idx="minor">
+                <a:schemeClr val="lt1"/>
+              </a:fontRef>
+            </p:style>
+            <p:txBody>
+              <a:bodyPr rtlCol="0" anchor="ctr"/>
+              <a:lstStyle/>
+              <a:p>
+                <a:pPr algn="ctr"/>
+                <a:r>
+                  <a:rPr lang="es-ES_tradnl" sz="3200" dirty="0" err="1" smtClean="0"/>
+                  <a:t>inline</a:t>
+                </a:r>
+                <a:endParaRPr lang="en-US" sz="3200" dirty="0"/>
+              </a:p>
+            </p:txBody>
+          </p:sp>
+        </p:grpSp>
+        <p:cxnSp>
+          <p:nvCxnSpPr>
+            <p:cNvPr id="9" name="Straight Connector 8"/>
+            <p:cNvCxnSpPr/>
+            <p:nvPr/>
+          </p:nvCxnSpPr>
+          <p:spPr>
+            <a:xfrm>
+              <a:off x="6000750" y="2702225"/>
+              <a:ext cx="0" cy="2674638"/>
+            </a:xfrm>
+            <a:prstGeom prst="line">
+              <a:avLst/>
+            </a:prstGeom>
+            <a:ln w="28575">
+              <a:solidFill>
+                <a:schemeClr val="bg2">
+                  <a:lumMod val="75000"/>
+                </a:schemeClr>
+              </a:solidFill>
+              <a:prstDash val="dash"/>
+            </a:ln>
+          </p:spPr>
+          <p:style>
+            <a:lnRef idx="1">
+              <a:schemeClr val="accent1"/>
+            </a:lnRef>
+            <a:fillRef idx="0">
+              <a:schemeClr val="accent1"/>
+            </a:fillRef>
+            <a:effectRef idx="0">
+              <a:schemeClr val="accent1"/>
+            </a:effectRef>
+            <a:fontRef idx="minor">
+              <a:schemeClr val="tx1"/>
+            </a:fontRef>
+          </p:style>
+        </p:cxnSp>
+      </p:grpSp>
+    </p:spTree>
+    <p:extLst>
+      <p:ext uri="{BB962C8B-B14F-4D97-AF65-F5344CB8AC3E}">
+        <p14:creationId xmlns:p14="http://schemas.microsoft.com/office/powerpoint/2010/main" val="3714999485"/>
       </p:ext>
     </p:extLst>
   </p:cSld>

</xml_diff>

<commit_message>
# Agregado diapositiva sobre features nuevas de CSS 3
</commit_message>
<xml_diff>
--- a/Slides/Clase.pptx
+++ b/Slides/Clase.pptx
@@ -5,7 +5,7 @@
     <p:sldMasterId id="2147483648" r:id="rId1"/>
   </p:sldMasterIdLst>
   <p:notesMasterIdLst>
-    <p:notesMasterId r:id="rId40"/>
+    <p:notesMasterId r:id="rId41"/>
   </p:notesMasterIdLst>
   <p:sldIdLst>
     <p:sldId id="256" r:id="rId2"/>
@@ -24,9 +24,9 @@
     <p:sldId id="268" r:id="rId15"/>
     <p:sldId id="269" r:id="rId16"/>
     <p:sldId id="270" r:id="rId17"/>
-    <p:sldId id="271" r:id="rId18"/>
-    <p:sldId id="291" r:id="rId19"/>
-    <p:sldId id="280" r:id="rId20"/>
+    <p:sldId id="280" r:id="rId18"/>
+    <p:sldId id="271" r:id="rId19"/>
+    <p:sldId id="291" r:id="rId20"/>
     <p:sldId id="290" r:id="rId21"/>
     <p:sldId id="292" r:id="rId22"/>
     <p:sldId id="296" r:id="rId23"/>
@@ -40,12 +40,13 @@
     <p:sldId id="286" r:id="rId31"/>
     <p:sldId id="287" r:id="rId32"/>
     <p:sldId id="293" r:id="rId33"/>
-    <p:sldId id="295" r:id="rId34"/>
-    <p:sldId id="261" r:id="rId35"/>
-    <p:sldId id="294" r:id="rId36"/>
-    <p:sldId id="297" r:id="rId37"/>
-    <p:sldId id="298" r:id="rId38"/>
-    <p:sldId id="283" r:id="rId39"/>
+    <p:sldId id="299" r:id="rId34"/>
+    <p:sldId id="295" r:id="rId35"/>
+    <p:sldId id="261" r:id="rId36"/>
+    <p:sldId id="294" r:id="rId37"/>
+    <p:sldId id="297" r:id="rId38"/>
+    <p:sldId id="298" r:id="rId39"/>
+    <p:sldId id="283" r:id="rId40"/>
   </p:sldIdLst>
   <p:sldSz cx="12192000" cy="6858000"/>
   <p:notesSz cx="6858000" cy="9144000"/>
@@ -246,7 +247,7 @@
           <a:p>
             <a:fld id="{9EE80FC8-2411-480F-8805-F0ECF3A4843D}" type="datetimeFigureOut">
               <a:rPr lang="en-US" smtClean="0"/>
-              <a:t>6/10/2013</a:t>
+              <a:t>6/11/2013</a:t>
             </a:fld>
             <a:endParaRPr lang="en-US"/>
           </a:p>
@@ -923,11 +924,7 @@
             </a:r>
             <a:r>
               <a:rPr lang="es-ES_tradnl" dirty="0" smtClean="0"/>
-              <a:t> son </a:t>
-            </a:r>
-            <a:r>
-              <a:rPr lang="es-ES_tradnl" dirty="0" smtClean="0"/>
-              <a:t>cajas</a:t>
+              <a:t> son cajas</a:t>
             </a:r>
           </a:p>
           <a:p>
@@ -1431,7 +1428,7 @@
           <a:p>
             <a:fld id="{33490EC4-9ED2-4743-9A12-62D7D00FD99C}" type="slidenum">
               <a:rPr lang="en-US" smtClean="0"/>
-              <a:t>34</a:t>
+              <a:t>35</a:t>
             </a:fld>
             <a:endParaRPr lang="en-US"/>
           </a:p>
@@ -1581,7 +1578,7 @@
           <a:p>
             <a:fld id="{8C91A079-CAE8-47E0-8427-4BEC14467E6E}" type="datetimeFigureOut">
               <a:rPr lang="en-US" smtClean="0"/>
-              <a:t>6/10/2013</a:t>
+              <a:t>6/11/2013</a:t>
             </a:fld>
             <a:endParaRPr lang="en-US"/>
           </a:p>
@@ -1751,7 +1748,7 @@
           <a:p>
             <a:fld id="{8C91A079-CAE8-47E0-8427-4BEC14467E6E}" type="datetimeFigureOut">
               <a:rPr lang="en-US" smtClean="0"/>
-              <a:t>6/10/2013</a:t>
+              <a:t>6/11/2013</a:t>
             </a:fld>
             <a:endParaRPr lang="en-US"/>
           </a:p>
@@ -1931,7 +1928,7 @@
           <a:p>
             <a:fld id="{8C91A079-CAE8-47E0-8427-4BEC14467E6E}" type="datetimeFigureOut">
               <a:rPr lang="en-US" smtClean="0"/>
-              <a:t>6/10/2013</a:t>
+              <a:t>6/11/2013</a:t>
             </a:fld>
             <a:endParaRPr lang="en-US"/>
           </a:p>
@@ -2101,7 +2098,7 @@
           <a:p>
             <a:fld id="{8C91A079-CAE8-47E0-8427-4BEC14467E6E}" type="datetimeFigureOut">
               <a:rPr lang="en-US" smtClean="0"/>
-              <a:t>6/10/2013</a:t>
+              <a:t>6/11/2013</a:t>
             </a:fld>
             <a:endParaRPr lang="en-US"/>
           </a:p>
@@ -2347,7 +2344,7 @@
           <a:p>
             <a:fld id="{8C91A079-CAE8-47E0-8427-4BEC14467E6E}" type="datetimeFigureOut">
               <a:rPr lang="en-US" smtClean="0"/>
-              <a:t>6/10/2013</a:t>
+              <a:t>6/11/2013</a:t>
             </a:fld>
             <a:endParaRPr lang="en-US"/>
           </a:p>
@@ -2579,7 +2576,7 @@
           <a:p>
             <a:fld id="{8C91A079-CAE8-47E0-8427-4BEC14467E6E}" type="datetimeFigureOut">
               <a:rPr lang="en-US" smtClean="0"/>
-              <a:t>6/10/2013</a:t>
+              <a:t>6/11/2013</a:t>
             </a:fld>
             <a:endParaRPr lang="en-US"/>
           </a:p>
@@ -2946,7 +2943,7 @@
           <a:p>
             <a:fld id="{8C91A079-CAE8-47E0-8427-4BEC14467E6E}" type="datetimeFigureOut">
               <a:rPr lang="en-US" smtClean="0"/>
-              <a:t>6/10/2013</a:t>
+              <a:t>6/11/2013</a:t>
             </a:fld>
             <a:endParaRPr lang="en-US"/>
           </a:p>
@@ -3064,7 +3061,7 @@
           <a:p>
             <a:fld id="{8C91A079-CAE8-47E0-8427-4BEC14467E6E}" type="datetimeFigureOut">
               <a:rPr lang="en-US" smtClean="0"/>
-              <a:t>6/10/2013</a:t>
+              <a:t>6/11/2013</a:t>
             </a:fld>
             <a:endParaRPr lang="en-US"/>
           </a:p>
@@ -3159,7 +3156,7 @@
           <a:p>
             <a:fld id="{8C91A079-CAE8-47E0-8427-4BEC14467E6E}" type="datetimeFigureOut">
               <a:rPr lang="en-US" smtClean="0"/>
-              <a:t>6/10/2013</a:t>
+              <a:t>6/11/2013</a:t>
             </a:fld>
             <a:endParaRPr lang="en-US"/>
           </a:p>
@@ -3436,7 +3433,7 @@
           <a:p>
             <a:fld id="{8C91A079-CAE8-47E0-8427-4BEC14467E6E}" type="datetimeFigureOut">
               <a:rPr lang="en-US" smtClean="0"/>
-              <a:t>6/10/2013</a:t>
+              <a:t>6/11/2013</a:t>
             </a:fld>
             <a:endParaRPr lang="en-US"/>
           </a:p>
@@ -3689,7 +3686,7 @@
           <a:p>
             <a:fld id="{8C91A079-CAE8-47E0-8427-4BEC14467E6E}" type="datetimeFigureOut">
               <a:rPr lang="en-US" smtClean="0"/>
-              <a:t>6/10/2013</a:t>
+              <a:t>6/11/2013</a:t>
             </a:fld>
             <a:endParaRPr lang="en-US"/>
           </a:p>
@@ -3902,7 +3899,7 @@
           <a:p>
             <a:fld id="{8C91A079-CAE8-47E0-8427-4BEC14467E6E}" type="datetimeFigureOut">
               <a:rPr lang="en-US" smtClean="0"/>
-              <a:t>6/10/2013</a:t>
+              <a:t>6/11/2013</a:t>
             </a:fld>
             <a:endParaRPr lang="en-US"/>
           </a:p>
@@ -4827,13 +4824,7 @@
               <a:rPr lang="es-ES_tradnl" dirty="0" smtClean="0">
                 <a:sym typeface="Wingdings" panose="05000000000000000000" pitchFamily="2" charset="2"/>
               </a:rPr>
-              <a:t> </a:t>
-            </a:r>
-            <a:r>
-              <a:rPr lang="es-ES_tradnl" dirty="0" smtClean="0">
-                <a:sym typeface="Wingdings" panose="05000000000000000000" pitchFamily="2" charset="2"/>
-              </a:rPr>
-              <a:t>títulos</a:t>
+              <a:t> títulos</a:t>
             </a:r>
             <a:endParaRPr lang="es-ES_tradnl" dirty="0" smtClean="0"/>
           </a:p>
@@ -4915,11 +4906,7 @@
           <a:p>
             <a:r>
               <a:rPr lang="es-ES_tradnl" dirty="0" smtClean="0"/>
-              <a:t>&lt;</a:t>
-            </a:r>
-            <a:r>
-              <a:rPr lang="es-ES_tradnl" dirty="0" smtClean="0"/>
-              <a:t>div&gt; </a:t>
+              <a:t>&lt;div&gt; </a:t>
             </a:r>
             <a:r>
               <a:rPr lang="es-ES_tradnl" dirty="0">
@@ -4952,83 +4939,67 @@
               <a:rPr lang="es-ES_tradnl" dirty="0" smtClean="0">
                 <a:sym typeface="Wingdings" panose="05000000000000000000" pitchFamily="2" charset="2"/>
               </a:rPr>
-              <a:t> agrupación de elementos </a:t>
+              <a:t> agrupación de elementos (</a:t>
+            </a:r>
+            <a:r>
+              <a:rPr lang="es-ES_tradnl" dirty="0" err="1" smtClean="0">
+                <a:sym typeface="Wingdings" panose="05000000000000000000" pitchFamily="2" charset="2"/>
+              </a:rPr>
+              <a:t>inline</a:t>
             </a:r>
             <a:r>
               <a:rPr lang="es-ES_tradnl" dirty="0" smtClean="0">
                 <a:sym typeface="Wingdings" panose="05000000000000000000" pitchFamily="2" charset="2"/>
               </a:rPr>
-              <a:t>(</a:t>
+              <a:t>)</a:t>
+            </a:r>
+            <a:endParaRPr lang="es-ES_tradnl" dirty="0" smtClean="0"/>
+          </a:p>
+          <a:p>
+            <a:r>
+              <a:rPr lang="es-ES_tradnl" dirty="0" smtClean="0"/>
+              <a:t>&lt;</a:t>
+            </a:r>
+            <a:r>
+              <a:rPr lang="es-ES_tradnl" dirty="0" err="1" smtClean="0"/>
+              <a:t>img</a:t>
+            </a:r>
+            <a:r>
+              <a:rPr lang="es-ES_tradnl" dirty="0" smtClean="0"/>
+              <a:t>&gt; </a:t>
+            </a:r>
+            <a:r>
+              <a:rPr lang="es-ES_tradnl" dirty="0" smtClean="0">
+                <a:sym typeface="Wingdings" panose="05000000000000000000" pitchFamily="2" charset="2"/>
+              </a:rPr>
+              <a:t> </a:t>
             </a:r>
             <a:r>
               <a:rPr lang="es-ES_tradnl" dirty="0" err="1" smtClean="0">
                 <a:sym typeface="Wingdings" panose="05000000000000000000" pitchFamily="2" charset="2"/>
               </a:rPr>
-              <a:t>inline</a:t>
+              <a:t>imagenes</a:t>
+            </a:r>
+            <a:endParaRPr lang="es-ES_tradnl" dirty="0" smtClean="0"/>
+          </a:p>
+          <a:p>
+            <a:r>
+              <a:rPr lang="es-ES_tradnl" dirty="0" smtClean="0"/>
+              <a:t>&lt;input&gt;, &lt;</a:t>
+            </a:r>
+            <a:r>
+              <a:rPr lang="es-ES_tradnl" dirty="0" err="1" smtClean="0"/>
+              <a:t>form</a:t>
+            </a:r>
+            <a:r>
+              <a:rPr lang="es-ES_tradnl" dirty="0" smtClean="0"/>
+              <a:t>&gt; </a:t>
             </a:r>
             <a:r>
               <a:rPr lang="es-ES_tradnl" dirty="0" smtClean="0">
                 <a:sym typeface="Wingdings" panose="05000000000000000000" pitchFamily="2" charset="2"/>
               </a:rPr>
-              <a:t>)</a:t>
-            </a:r>
-            <a:endParaRPr lang="es-ES_tradnl" dirty="0" smtClean="0"/>
-          </a:p>
-          <a:p>
-            <a:r>
-              <a:rPr lang="es-ES_tradnl" dirty="0" smtClean="0"/>
-              <a:t>&lt;</a:t>
-            </a:r>
-            <a:r>
-              <a:rPr lang="es-ES_tradnl" dirty="0" err="1" smtClean="0"/>
-              <a:t>img</a:t>
-            </a:r>
-            <a:r>
-              <a:rPr lang="es-ES_tradnl" dirty="0" smtClean="0"/>
-              <a:t>&gt; </a:t>
-            </a:r>
-            <a:r>
-              <a:rPr lang="es-ES_tradnl" dirty="0" smtClean="0">
-                <a:sym typeface="Wingdings" panose="05000000000000000000" pitchFamily="2" charset="2"/>
-              </a:rPr>
-              <a:t> </a:t>
-            </a:r>
-            <a:r>
-              <a:rPr lang="es-ES_tradnl" dirty="0" err="1" smtClean="0">
-                <a:sym typeface="Wingdings" panose="05000000000000000000" pitchFamily="2" charset="2"/>
-              </a:rPr>
-              <a:t>imagenes</a:t>
-            </a:r>
-            <a:endParaRPr lang="es-ES_tradnl" dirty="0" smtClean="0"/>
-          </a:p>
-          <a:p>
-            <a:r>
-              <a:rPr lang="es-ES_tradnl" dirty="0" smtClean="0"/>
-              <a:t>&lt;input</a:t>
-            </a:r>
-            <a:r>
-              <a:rPr lang="es-ES_tradnl" dirty="0" smtClean="0"/>
-              <a:t>&gt;, &lt;</a:t>
-            </a:r>
-            <a:r>
-              <a:rPr lang="es-ES_tradnl" dirty="0" err="1" smtClean="0"/>
-              <a:t>form</a:t>
-            </a:r>
-            <a:r>
-              <a:rPr lang="es-ES_tradnl" dirty="0" smtClean="0"/>
-              <a:t>&gt; </a:t>
-            </a:r>
-            <a:r>
-              <a:rPr lang="es-ES_tradnl" dirty="0" smtClean="0">
-                <a:sym typeface="Wingdings" panose="05000000000000000000" pitchFamily="2" charset="2"/>
-              </a:rPr>
-              <a:t> </a:t>
-            </a:r>
-            <a:r>
-              <a:rPr lang="es-ES_tradnl" dirty="0" smtClean="0">
-                <a:sym typeface="Wingdings" panose="05000000000000000000" pitchFamily="2" charset="2"/>
-              </a:rPr>
-              <a:t>elementos para formularios</a:t>
+              <a:t> elementos para formularios</a:t>
             </a:r>
           </a:p>
           <a:p>
@@ -5699,13 +5670,7 @@
               <a:rPr lang="es-ES_tradnl" dirty="0" smtClean="0">
                 <a:sym typeface="Wingdings" panose="05000000000000000000" pitchFamily="2" charset="2"/>
               </a:rPr>
-              <a:t> menú de </a:t>
-            </a:r>
-            <a:r>
-              <a:rPr lang="es-ES_tradnl" dirty="0" smtClean="0">
-                <a:sym typeface="Wingdings" panose="05000000000000000000" pitchFamily="2" charset="2"/>
-              </a:rPr>
-              <a:t>navegación</a:t>
+              <a:t> menú de navegación</a:t>
             </a:r>
           </a:p>
           <a:p>
@@ -5772,397 +5737,6 @@
 </file>
 
 <file path=ppt/slides/slide17.xml><?xml version="1.0" encoding="utf-8"?>
-<p:sld xmlns:a="http://schemas.openxmlformats.org/drawingml/2006/main" xmlns:r="http://schemas.openxmlformats.org/officeDocument/2006/relationships" xmlns:p="http://schemas.openxmlformats.org/presentationml/2006/main">
-  <p:cSld>
-    <p:spTree>
-      <p:nvGrpSpPr>
-        <p:cNvPr id="1" name=""/>
-        <p:cNvGrpSpPr/>
-        <p:nvPr/>
-      </p:nvGrpSpPr>
-      <p:grpSpPr>
-        <a:xfrm>
-          <a:off x="0" y="0"/>
-          <a:ext cx="0" cy="0"/>
-          <a:chOff x="0" y="0"/>
-          <a:chExt cx="0" cy="0"/>
-        </a:xfrm>
-      </p:grpSpPr>
-      <p:sp>
-        <p:nvSpPr>
-          <p:cNvPr id="2" name="Title 1"/>
-          <p:cNvSpPr>
-            <a:spLocks noGrp="1"/>
-          </p:cNvSpPr>
-          <p:nvPr>
-            <p:ph type="title"/>
-          </p:nvPr>
-        </p:nvSpPr>
-        <p:spPr/>
-        <p:txBody>
-          <a:bodyPr/>
-          <a:lstStyle/>
-          <a:p>
-            <a:r>
-              <a:rPr lang="es-ES_tradnl" dirty="0" smtClean="0"/>
-              <a:t>Nuevos </a:t>
-            </a:r>
-            <a:r>
-              <a:rPr lang="es-ES_tradnl" dirty="0" err="1" smtClean="0"/>
-              <a:t>tags</a:t>
-            </a:r>
-            <a:r>
-              <a:rPr lang="es-ES_tradnl" dirty="0" smtClean="0"/>
-              <a:t> (semánticos)</a:t>
-            </a:r>
-            <a:endParaRPr lang="en-US" dirty="0"/>
-          </a:p>
-        </p:txBody>
-      </p:sp>
-      <p:sp>
-        <p:nvSpPr>
-          <p:cNvPr id="3" name="Content Placeholder 2"/>
-          <p:cNvSpPr>
-            <a:spLocks noGrp="1"/>
-          </p:cNvSpPr>
-          <p:nvPr>
-            <p:ph idx="1"/>
-          </p:nvPr>
-        </p:nvSpPr>
-        <p:spPr/>
-        <p:txBody>
-          <a:bodyPr/>
-          <a:lstStyle/>
-          <a:p>
-            <a:r>
-              <a:rPr lang="es-ES_tradnl" dirty="0" smtClean="0"/>
-              <a:t>&lt;</a:t>
-            </a:r>
-            <a:r>
-              <a:rPr lang="es-ES_tradnl" dirty="0" smtClean="0"/>
-              <a:t>time&gt; </a:t>
-            </a:r>
-            <a:r>
-              <a:rPr lang="es-ES_tradnl" dirty="0" smtClean="0">
-                <a:sym typeface="Wingdings" panose="05000000000000000000" pitchFamily="2" charset="2"/>
-              </a:rPr>
-              <a:t> </a:t>
-            </a:r>
-            <a:r>
-              <a:rPr lang="es-ES_tradnl" dirty="0" smtClean="0">
-                <a:sym typeface="Wingdings" panose="05000000000000000000" pitchFamily="2" charset="2"/>
-              </a:rPr>
-              <a:t>fecha/hora</a:t>
-            </a:r>
-          </a:p>
-          <a:p>
-            <a:r>
-              <a:rPr lang="es-ES_tradnl" dirty="0">
-                <a:sym typeface="Wingdings" panose="05000000000000000000" pitchFamily="2" charset="2"/>
-              </a:rPr>
-              <a:t>&lt;</a:t>
-            </a:r>
-            <a:r>
-              <a:rPr lang="es-ES_tradnl" dirty="0" smtClean="0">
-                <a:sym typeface="Wingdings" panose="05000000000000000000" pitchFamily="2" charset="2"/>
-              </a:rPr>
-              <a:t>figure&gt;  contenido </a:t>
-            </a:r>
-            <a:r>
-              <a:rPr lang="es-ES_tradnl" dirty="0" err="1" smtClean="0">
-                <a:sym typeface="Wingdings" panose="05000000000000000000" pitchFamily="2" charset="2"/>
-              </a:rPr>
-              <a:t>autocontenido</a:t>
-            </a:r>
-            <a:endParaRPr lang="es-ES_tradnl" dirty="0" smtClean="0">
-              <a:sym typeface="Wingdings" panose="05000000000000000000" pitchFamily="2" charset="2"/>
-            </a:endParaRPr>
-          </a:p>
-          <a:p>
-            <a:r>
-              <a:rPr lang="es-ES_tradnl" dirty="0" smtClean="0">
-                <a:sym typeface="Wingdings" panose="05000000000000000000" pitchFamily="2" charset="2"/>
-              </a:rPr>
-              <a:t>&lt;</a:t>
-            </a:r>
-            <a:r>
-              <a:rPr lang="es-ES_tradnl" dirty="0" err="1" smtClean="0">
-                <a:sym typeface="Wingdings" panose="05000000000000000000" pitchFamily="2" charset="2"/>
-              </a:rPr>
-              <a:t>figcaption</a:t>
-            </a:r>
-            <a:r>
-              <a:rPr lang="es-ES_tradnl" dirty="0" smtClean="0">
-                <a:sym typeface="Wingdings" panose="05000000000000000000" pitchFamily="2" charset="2"/>
-              </a:rPr>
-              <a:t>&gt;  leyenda vinculada al contenido de figure</a:t>
-            </a:r>
-          </a:p>
-          <a:p>
-            <a:r>
-              <a:rPr lang="es-ES_tradnl" dirty="0" smtClean="0">
-                <a:sym typeface="Wingdings" panose="05000000000000000000" pitchFamily="2" charset="2"/>
-              </a:rPr>
-              <a:t>&lt;</a:t>
-            </a:r>
-            <a:r>
-              <a:rPr lang="es-ES_tradnl" dirty="0" err="1" smtClean="0">
-                <a:sym typeface="Wingdings" panose="05000000000000000000" pitchFamily="2" charset="2"/>
-              </a:rPr>
-              <a:t>mark</a:t>
-            </a:r>
-            <a:r>
-              <a:rPr lang="es-ES_tradnl" dirty="0" smtClean="0">
-                <a:sym typeface="Wingdings" panose="05000000000000000000" pitchFamily="2" charset="2"/>
-              </a:rPr>
-              <a:t>&gt;  marca relevancia (resaltado, diferente a </a:t>
-            </a:r>
-            <a:r>
-              <a:rPr lang="es-ES_tradnl" dirty="0" err="1" smtClean="0">
-                <a:sym typeface="Wingdings" panose="05000000000000000000" pitchFamily="2" charset="2"/>
-              </a:rPr>
-              <a:t>strong</a:t>
-            </a:r>
-            <a:r>
-              <a:rPr lang="es-ES_tradnl" dirty="0" smtClean="0">
-                <a:sym typeface="Wingdings" panose="05000000000000000000" pitchFamily="2" charset="2"/>
-              </a:rPr>
-              <a:t>, que marca importancia)</a:t>
-            </a:r>
-          </a:p>
-          <a:p>
-            <a:r>
-              <a:rPr lang="es-ES_tradnl" dirty="0" smtClean="0">
-                <a:sym typeface="Wingdings" panose="05000000000000000000" pitchFamily="2" charset="2"/>
-              </a:rPr>
-              <a:t>&lt;</a:t>
-            </a:r>
-            <a:r>
-              <a:rPr lang="es-ES_tradnl" dirty="0" err="1">
-                <a:sym typeface="Wingdings" panose="05000000000000000000" pitchFamily="2" charset="2"/>
-              </a:rPr>
-              <a:t>p</a:t>
-            </a:r>
-            <a:r>
-              <a:rPr lang="es-ES_tradnl" dirty="0" err="1" smtClean="0">
-                <a:sym typeface="Wingdings" panose="05000000000000000000" pitchFamily="2" charset="2"/>
-              </a:rPr>
-              <a:t>rogress</a:t>
-            </a:r>
-            <a:r>
-              <a:rPr lang="es-ES_tradnl" dirty="0" smtClean="0">
-                <a:sym typeface="Wingdings" panose="05000000000000000000" pitchFamily="2" charset="2"/>
-              </a:rPr>
-              <a:t>&gt;  </a:t>
-            </a:r>
-            <a:r>
-              <a:rPr lang="es-ES_tradnl" dirty="0" err="1" smtClean="0">
-                <a:sym typeface="Wingdings" panose="05000000000000000000" pitchFamily="2" charset="2"/>
-              </a:rPr>
-              <a:t>progress</a:t>
-            </a:r>
-            <a:r>
-              <a:rPr lang="es-ES_tradnl" dirty="0" smtClean="0">
-                <a:sym typeface="Wingdings" panose="05000000000000000000" pitchFamily="2" charset="2"/>
-              </a:rPr>
-              <a:t> bar</a:t>
-            </a:r>
-            <a:endParaRPr lang="en-US" dirty="0"/>
-          </a:p>
-        </p:txBody>
-      </p:sp>
-    </p:spTree>
-    <p:extLst>
-      <p:ext uri="{BB962C8B-B14F-4D97-AF65-F5344CB8AC3E}">
-        <p14:creationId xmlns:p14="http://schemas.microsoft.com/office/powerpoint/2010/main" val="3573270690"/>
-      </p:ext>
-    </p:extLst>
-  </p:cSld>
-  <p:clrMapOvr>
-    <a:masterClrMapping/>
-  </p:clrMapOvr>
-</p:sld>
-</file>
-
-<file path=ppt/slides/slide18.xml><?xml version="1.0" encoding="utf-8"?>
-<p:sld xmlns:a="http://schemas.openxmlformats.org/drawingml/2006/main" xmlns:r="http://schemas.openxmlformats.org/officeDocument/2006/relationships" xmlns:p="http://schemas.openxmlformats.org/presentationml/2006/main">
-  <p:cSld>
-    <p:spTree>
-      <p:nvGrpSpPr>
-        <p:cNvPr id="1" name=""/>
-        <p:cNvGrpSpPr/>
-        <p:nvPr/>
-      </p:nvGrpSpPr>
-      <p:grpSpPr>
-        <a:xfrm>
-          <a:off x="0" y="0"/>
-          <a:ext cx="0" cy="0"/>
-          <a:chOff x="0" y="0"/>
-          <a:chExt cx="0" cy="0"/>
-        </a:xfrm>
-      </p:grpSpPr>
-      <p:sp>
-        <p:nvSpPr>
-          <p:cNvPr id="2" name="Title 1"/>
-          <p:cNvSpPr>
-            <a:spLocks noGrp="1"/>
-          </p:cNvSpPr>
-          <p:nvPr>
-            <p:ph type="title"/>
-          </p:nvPr>
-        </p:nvSpPr>
-        <p:spPr/>
-        <p:txBody>
-          <a:bodyPr/>
-          <a:lstStyle/>
-          <a:p>
-            <a:r>
-              <a:rPr lang="es-ES_tradnl" dirty="0" smtClean="0"/>
-              <a:t>Performance e Integración</a:t>
-            </a:r>
-            <a:endParaRPr lang="en-US" dirty="0"/>
-          </a:p>
-        </p:txBody>
-      </p:sp>
-      <p:sp>
-        <p:nvSpPr>
-          <p:cNvPr id="3" name="Content Placeholder 2"/>
-          <p:cNvSpPr>
-            <a:spLocks noGrp="1"/>
-          </p:cNvSpPr>
-          <p:nvPr>
-            <p:ph idx="1"/>
-          </p:nvPr>
-        </p:nvSpPr>
-        <p:spPr/>
-        <p:txBody>
-          <a:bodyPr/>
-          <a:lstStyle/>
-          <a:p>
-            <a:r>
-              <a:rPr lang="es-ES_tradnl" dirty="0" smtClean="0"/>
-              <a:t>Web </a:t>
-            </a:r>
-            <a:r>
-              <a:rPr lang="es-ES_tradnl" dirty="0" err="1" smtClean="0"/>
-              <a:t>Workers</a:t>
-            </a:r>
-            <a:endParaRPr lang="es-ES_tradnl" dirty="0" smtClean="0"/>
-          </a:p>
-          <a:p>
-            <a:pPr lvl="1"/>
-            <a:r>
-              <a:rPr lang="es-ES_tradnl" dirty="0" smtClean="0"/>
-              <a:t>Procesos de </a:t>
-            </a:r>
-            <a:r>
-              <a:rPr lang="es-ES_tradnl" dirty="0" err="1" smtClean="0"/>
-              <a:t>Javascript</a:t>
-            </a:r>
-            <a:r>
-              <a:rPr lang="es-ES_tradnl" dirty="0" smtClean="0"/>
-              <a:t> en </a:t>
-            </a:r>
-            <a:r>
-              <a:rPr lang="es-ES_tradnl" dirty="0" err="1" smtClean="0"/>
-              <a:t>background</a:t>
-            </a:r>
-            <a:endParaRPr lang="es-ES_tradnl" dirty="0" smtClean="0"/>
-          </a:p>
-          <a:p>
-            <a:r>
-              <a:rPr lang="es-ES_tradnl" dirty="0" err="1" smtClean="0"/>
-              <a:t>XMLHttpRequest</a:t>
-            </a:r>
-            <a:r>
-              <a:rPr lang="es-ES_tradnl" dirty="0" smtClean="0"/>
-              <a:t> </a:t>
-            </a:r>
-            <a:r>
-              <a:rPr lang="es-ES_tradnl" dirty="0" err="1" smtClean="0"/>
-              <a:t>level</a:t>
-            </a:r>
-            <a:r>
-              <a:rPr lang="es-ES_tradnl" dirty="0" smtClean="0"/>
-              <a:t> 2</a:t>
-            </a:r>
-          </a:p>
-          <a:p>
-            <a:r>
-              <a:rPr lang="es-ES_tradnl" dirty="0" smtClean="0"/>
-              <a:t>Jit-</a:t>
-            </a:r>
-            <a:r>
-              <a:rPr lang="es-ES_tradnl" dirty="0" err="1" smtClean="0"/>
-              <a:t>compiling</a:t>
-            </a:r>
-            <a:r>
-              <a:rPr lang="es-ES_tradnl" dirty="0" smtClean="0"/>
-              <a:t> JavaScript </a:t>
-            </a:r>
-            <a:r>
-              <a:rPr lang="es-ES_tradnl" dirty="0" err="1" smtClean="0"/>
-              <a:t>engines</a:t>
-            </a:r>
-            <a:endParaRPr lang="es-ES_tradnl" dirty="0" smtClean="0"/>
-          </a:p>
-          <a:p>
-            <a:r>
-              <a:rPr lang="es-ES_tradnl" dirty="0" err="1" smtClean="0"/>
-              <a:t>History</a:t>
-            </a:r>
-            <a:r>
-              <a:rPr lang="es-ES_tradnl" dirty="0" smtClean="0"/>
-              <a:t> API</a:t>
-            </a:r>
-          </a:p>
-          <a:p>
-            <a:pPr lvl="1"/>
-            <a:r>
-              <a:rPr lang="es-ES_tradnl" dirty="0" smtClean="0"/>
-              <a:t>Permite modificar el historial. Ideal para Web Apps</a:t>
-            </a:r>
-          </a:p>
-          <a:p>
-            <a:r>
-              <a:rPr lang="es-ES_tradnl" dirty="0" err="1" smtClean="0"/>
-              <a:t>Drag</a:t>
-            </a:r>
-            <a:r>
-              <a:rPr lang="es-ES_tradnl" dirty="0" smtClean="0"/>
-              <a:t> and </a:t>
-            </a:r>
-            <a:r>
-              <a:rPr lang="es-ES_tradnl" dirty="0" err="1" smtClean="0"/>
-              <a:t>drop</a:t>
-            </a:r>
-            <a:endParaRPr lang="es-ES_tradnl" dirty="0"/>
-          </a:p>
-          <a:p>
-            <a:pPr marL="0" indent="0">
-              <a:buNone/>
-            </a:pPr>
-            <a:endParaRPr lang="es-ES_tradnl" dirty="0" smtClean="0"/>
-          </a:p>
-          <a:p>
-            <a:endParaRPr lang="en-US" dirty="0"/>
-          </a:p>
-        </p:txBody>
-      </p:sp>
-    </p:spTree>
-    <p:extLst>
-      <p:ext uri="{BB962C8B-B14F-4D97-AF65-F5344CB8AC3E}">
-        <p14:creationId xmlns:p14="http://schemas.microsoft.com/office/powerpoint/2010/main" val="491141864"/>
-      </p:ext>
-    </p:extLst>
-  </p:cSld>
-  <p:clrMapOvr>
-    <a:masterClrMapping/>
-  </p:clrMapOvr>
-</p:sld>
-</file>
-
-<file path=ppt/slides/slide19.xml><?xml version="1.0" encoding="utf-8"?>
 <p:sld xmlns:a="http://schemas.openxmlformats.org/drawingml/2006/main" xmlns:r="http://schemas.openxmlformats.org/officeDocument/2006/relationships" xmlns:p="http://schemas.openxmlformats.org/presentationml/2006/main">
   <p:cSld>
     <p:spTree>
@@ -6694,6 +6268,387 @@
     <p:extLst>
       <p:ext uri="{BB962C8B-B14F-4D97-AF65-F5344CB8AC3E}">
         <p14:creationId xmlns:p14="http://schemas.microsoft.com/office/powerpoint/2010/main" val="2455534035"/>
+      </p:ext>
+    </p:extLst>
+  </p:cSld>
+  <p:clrMapOvr>
+    <a:masterClrMapping/>
+  </p:clrMapOvr>
+</p:sld>
+</file>
+
+<file path=ppt/slides/slide18.xml><?xml version="1.0" encoding="utf-8"?>
+<p:sld xmlns:a="http://schemas.openxmlformats.org/drawingml/2006/main" xmlns:r="http://schemas.openxmlformats.org/officeDocument/2006/relationships" xmlns:p="http://schemas.openxmlformats.org/presentationml/2006/main">
+  <p:cSld>
+    <p:spTree>
+      <p:nvGrpSpPr>
+        <p:cNvPr id="1" name=""/>
+        <p:cNvGrpSpPr/>
+        <p:nvPr/>
+      </p:nvGrpSpPr>
+      <p:grpSpPr>
+        <a:xfrm>
+          <a:off x="0" y="0"/>
+          <a:ext cx="0" cy="0"/>
+          <a:chOff x="0" y="0"/>
+          <a:chExt cx="0" cy="0"/>
+        </a:xfrm>
+      </p:grpSpPr>
+      <p:sp>
+        <p:nvSpPr>
+          <p:cNvPr id="2" name="Title 1"/>
+          <p:cNvSpPr>
+            <a:spLocks noGrp="1"/>
+          </p:cNvSpPr>
+          <p:nvPr>
+            <p:ph type="title"/>
+          </p:nvPr>
+        </p:nvSpPr>
+        <p:spPr/>
+        <p:txBody>
+          <a:bodyPr/>
+          <a:lstStyle/>
+          <a:p>
+            <a:r>
+              <a:rPr lang="es-ES_tradnl" dirty="0" smtClean="0"/>
+              <a:t>Nuevos </a:t>
+            </a:r>
+            <a:r>
+              <a:rPr lang="es-ES_tradnl" dirty="0" err="1" smtClean="0"/>
+              <a:t>tags</a:t>
+            </a:r>
+            <a:r>
+              <a:rPr lang="es-ES_tradnl" dirty="0" smtClean="0"/>
+              <a:t> (semánticos)</a:t>
+            </a:r>
+            <a:endParaRPr lang="en-US" dirty="0"/>
+          </a:p>
+        </p:txBody>
+      </p:sp>
+      <p:sp>
+        <p:nvSpPr>
+          <p:cNvPr id="3" name="Content Placeholder 2"/>
+          <p:cNvSpPr>
+            <a:spLocks noGrp="1"/>
+          </p:cNvSpPr>
+          <p:nvPr>
+            <p:ph idx="1"/>
+          </p:nvPr>
+        </p:nvSpPr>
+        <p:spPr/>
+        <p:txBody>
+          <a:bodyPr/>
+          <a:lstStyle/>
+          <a:p>
+            <a:r>
+              <a:rPr lang="es-ES_tradnl" dirty="0" smtClean="0"/>
+              <a:t>&lt;time&gt; </a:t>
+            </a:r>
+            <a:r>
+              <a:rPr lang="es-ES_tradnl" dirty="0" smtClean="0">
+                <a:sym typeface="Wingdings" panose="05000000000000000000" pitchFamily="2" charset="2"/>
+              </a:rPr>
+              <a:t> fecha/hora</a:t>
+            </a:r>
+          </a:p>
+          <a:p>
+            <a:r>
+              <a:rPr lang="es-ES_tradnl" dirty="0">
+                <a:sym typeface="Wingdings" panose="05000000000000000000" pitchFamily="2" charset="2"/>
+              </a:rPr>
+              <a:t>&lt;</a:t>
+            </a:r>
+            <a:r>
+              <a:rPr lang="es-ES_tradnl" dirty="0" smtClean="0">
+                <a:sym typeface="Wingdings" panose="05000000000000000000" pitchFamily="2" charset="2"/>
+              </a:rPr>
+              <a:t>figure&gt;  contenido </a:t>
+            </a:r>
+            <a:r>
+              <a:rPr lang="es-ES_tradnl" dirty="0" err="1" smtClean="0">
+                <a:sym typeface="Wingdings" panose="05000000000000000000" pitchFamily="2" charset="2"/>
+              </a:rPr>
+              <a:t>autocontenido</a:t>
+            </a:r>
+            <a:endParaRPr lang="es-ES_tradnl" dirty="0" smtClean="0">
+              <a:sym typeface="Wingdings" panose="05000000000000000000" pitchFamily="2" charset="2"/>
+            </a:endParaRPr>
+          </a:p>
+          <a:p>
+            <a:r>
+              <a:rPr lang="es-ES_tradnl" dirty="0" smtClean="0">
+                <a:sym typeface="Wingdings" panose="05000000000000000000" pitchFamily="2" charset="2"/>
+              </a:rPr>
+              <a:t>&lt;</a:t>
+            </a:r>
+            <a:r>
+              <a:rPr lang="es-ES_tradnl" dirty="0" err="1" smtClean="0">
+                <a:sym typeface="Wingdings" panose="05000000000000000000" pitchFamily="2" charset="2"/>
+              </a:rPr>
+              <a:t>figcaption</a:t>
+            </a:r>
+            <a:r>
+              <a:rPr lang="es-ES_tradnl" dirty="0" smtClean="0">
+                <a:sym typeface="Wingdings" panose="05000000000000000000" pitchFamily="2" charset="2"/>
+              </a:rPr>
+              <a:t>&gt;  leyenda vinculada al contenido de figure</a:t>
+            </a:r>
+          </a:p>
+          <a:p>
+            <a:r>
+              <a:rPr lang="es-ES_tradnl" dirty="0" smtClean="0">
+                <a:sym typeface="Wingdings" panose="05000000000000000000" pitchFamily="2" charset="2"/>
+              </a:rPr>
+              <a:t>&lt;</a:t>
+            </a:r>
+            <a:r>
+              <a:rPr lang="es-ES_tradnl" dirty="0" err="1" smtClean="0">
+                <a:sym typeface="Wingdings" panose="05000000000000000000" pitchFamily="2" charset="2"/>
+              </a:rPr>
+              <a:t>mark</a:t>
+            </a:r>
+            <a:r>
+              <a:rPr lang="es-ES_tradnl" dirty="0" smtClean="0">
+                <a:sym typeface="Wingdings" panose="05000000000000000000" pitchFamily="2" charset="2"/>
+              </a:rPr>
+              <a:t>&gt;  marca relevancia (resaltado, diferente a </a:t>
+            </a:r>
+            <a:r>
+              <a:rPr lang="es-ES_tradnl" dirty="0" err="1" smtClean="0">
+                <a:sym typeface="Wingdings" panose="05000000000000000000" pitchFamily="2" charset="2"/>
+              </a:rPr>
+              <a:t>strong</a:t>
+            </a:r>
+            <a:r>
+              <a:rPr lang="es-ES_tradnl" dirty="0" smtClean="0">
+                <a:sym typeface="Wingdings" panose="05000000000000000000" pitchFamily="2" charset="2"/>
+              </a:rPr>
+              <a:t>, que marca importancia)</a:t>
+            </a:r>
+          </a:p>
+          <a:p>
+            <a:r>
+              <a:rPr lang="es-ES_tradnl" dirty="0" smtClean="0">
+                <a:sym typeface="Wingdings" panose="05000000000000000000" pitchFamily="2" charset="2"/>
+              </a:rPr>
+              <a:t>&lt;</a:t>
+            </a:r>
+            <a:r>
+              <a:rPr lang="es-ES_tradnl" dirty="0" err="1">
+                <a:sym typeface="Wingdings" panose="05000000000000000000" pitchFamily="2" charset="2"/>
+              </a:rPr>
+              <a:t>p</a:t>
+            </a:r>
+            <a:r>
+              <a:rPr lang="es-ES_tradnl" dirty="0" err="1" smtClean="0">
+                <a:sym typeface="Wingdings" panose="05000000000000000000" pitchFamily="2" charset="2"/>
+              </a:rPr>
+              <a:t>rogress</a:t>
+            </a:r>
+            <a:r>
+              <a:rPr lang="es-ES_tradnl" dirty="0" smtClean="0">
+                <a:sym typeface="Wingdings" panose="05000000000000000000" pitchFamily="2" charset="2"/>
+              </a:rPr>
+              <a:t>&gt;  </a:t>
+            </a:r>
+            <a:r>
+              <a:rPr lang="es-ES_tradnl" dirty="0" err="1" smtClean="0">
+                <a:sym typeface="Wingdings" panose="05000000000000000000" pitchFamily="2" charset="2"/>
+              </a:rPr>
+              <a:t>progress</a:t>
+            </a:r>
+            <a:r>
+              <a:rPr lang="es-ES_tradnl" dirty="0" smtClean="0">
+                <a:sym typeface="Wingdings" panose="05000000000000000000" pitchFamily="2" charset="2"/>
+              </a:rPr>
+              <a:t> bar</a:t>
+            </a:r>
+            <a:endParaRPr lang="en-US" dirty="0"/>
+          </a:p>
+        </p:txBody>
+      </p:sp>
+    </p:spTree>
+    <p:extLst>
+      <p:ext uri="{BB962C8B-B14F-4D97-AF65-F5344CB8AC3E}">
+        <p14:creationId xmlns:p14="http://schemas.microsoft.com/office/powerpoint/2010/main" val="3573270690"/>
+      </p:ext>
+    </p:extLst>
+  </p:cSld>
+  <p:clrMapOvr>
+    <a:masterClrMapping/>
+  </p:clrMapOvr>
+</p:sld>
+</file>
+
+<file path=ppt/slides/slide19.xml><?xml version="1.0" encoding="utf-8"?>
+<p:sld xmlns:a="http://schemas.openxmlformats.org/drawingml/2006/main" xmlns:r="http://schemas.openxmlformats.org/officeDocument/2006/relationships" xmlns:p="http://schemas.openxmlformats.org/presentationml/2006/main">
+  <p:cSld>
+    <p:spTree>
+      <p:nvGrpSpPr>
+        <p:cNvPr id="1" name=""/>
+        <p:cNvGrpSpPr/>
+        <p:nvPr/>
+      </p:nvGrpSpPr>
+      <p:grpSpPr>
+        <a:xfrm>
+          <a:off x="0" y="0"/>
+          <a:ext cx="0" cy="0"/>
+          <a:chOff x="0" y="0"/>
+          <a:chExt cx="0" cy="0"/>
+        </a:xfrm>
+      </p:grpSpPr>
+      <p:sp>
+        <p:nvSpPr>
+          <p:cNvPr id="2" name="Title 1"/>
+          <p:cNvSpPr>
+            <a:spLocks noGrp="1"/>
+          </p:cNvSpPr>
+          <p:nvPr>
+            <p:ph type="title"/>
+          </p:nvPr>
+        </p:nvSpPr>
+        <p:spPr/>
+        <p:txBody>
+          <a:bodyPr/>
+          <a:lstStyle/>
+          <a:p>
+            <a:r>
+              <a:rPr lang="es-ES_tradnl" dirty="0" smtClean="0"/>
+              <a:t>Performance e Integración</a:t>
+            </a:r>
+            <a:endParaRPr lang="en-US" dirty="0"/>
+          </a:p>
+        </p:txBody>
+      </p:sp>
+      <p:sp>
+        <p:nvSpPr>
+          <p:cNvPr id="3" name="Content Placeholder 2"/>
+          <p:cNvSpPr>
+            <a:spLocks noGrp="1"/>
+          </p:cNvSpPr>
+          <p:nvPr>
+            <p:ph idx="1"/>
+          </p:nvPr>
+        </p:nvSpPr>
+        <p:spPr/>
+        <p:txBody>
+          <a:bodyPr/>
+          <a:lstStyle/>
+          <a:p>
+            <a:r>
+              <a:rPr lang="es-ES_tradnl" dirty="0" smtClean="0"/>
+              <a:t>Web </a:t>
+            </a:r>
+            <a:r>
+              <a:rPr lang="es-ES_tradnl" dirty="0" err="1" smtClean="0"/>
+              <a:t>Workers</a:t>
+            </a:r>
+            <a:endParaRPr lang="es-ES_tradnl" dirty="0" smtClean="0"/>
+          </a:p>
+          <a:p>
+            <a:pPr lvl="1"/>
+            <a:r>
+              <a:rPr lang="es-ES_tradnl" dirty="0" smtClean="0"/>
+              <a:t>Procesos de </a:t>
+            </a:r>
+            <a:r>
+              <a:rPr lang="es-ES_tradnl" dirty="0" err="1" smtClean="0"/>
+              <a:t>Javascript</a:t>
+            </a:r>
+            <a:r>
+              <a:rPr lang="es-ES_tradnl" dirty="0" smtClean="0"/>
+              <a:t> en </a:t>
+            </a:r>
+            <a:r>
+              <a:rPr lang="es-ES_tradnl" dirty="0" err="1" smtClean="0"/>
+              <a:t>background</a:t>
+            </a:r>
+            <a:endParaRPr lang="es-ES_tradnl" dirty="0" smtClean="0"/>
+          </a:p>
+          <a:p>
+            <a:r>
+              <a:rPr lang="es-ES_tradnl" dirty="0" err="1" smtClean="0"/>
+              <a:t>XMLHttpRequest</a:t>
+            </a:r>
+            <a:r>
+              <a:rPr lang="es-ES_tradnl" dirty="0" smtClean="0"/>
+              <a:t> </a:t>
+            </a:r>
+            <a:r>
+              <a:rPr lang="es-ES_tradnl" dirty="0" err="1" smtClean="0"/>
+              <a:t>level</a:t>
+            </a:r>
+            <a:r>
+              <a:rPr lang="es-ES_tradnl" dirty="0" smtClean="0"/>
+              <a:t> 2</a:t>
+            </a:r>
+          </a:p>
+          <a:p>
+            <a:r>
+              <a:rPr lang="es-ES_tradnl" dirty="0" smtClean="0"/>
+              <a:t>Jit-</a:t>
+            </a:r>
+            <a:r>
+              <a:rPr lang="es-ES_tradnl" dirty="0" err="1" smtClean="0"/>
+              <a:t>compiling</a:t>
+            </a:r>
+            <a:r>
+              <a:rPr lang="es-ES_tradnl" dirty="0" smtClean="0"/>
+              <a:t> JavaScript </a:t>
+            </a:r>
+            <a:r>
+              <a:rPr lang="es-ES_tradnl" dirty="0" err="1" smtClean="0"/>
+              <a:t>engines</a:t>
+            </a:r>
+            <a:endParaRPr lang="es-ES_tradnl" dirty="0" smtClean="0"/>
+          </a:p>
+          <a:p>
+            <a:r>
+              <a:rPr lang="es-ES_tradnl" dirty="0" err="1" smtClean="0"/>
+              <a:t>History</a:t>
+            </a:r>
+            <a:r>
+              <a:rPr lang="es-ES_tradnl" dirty="0" smtClean="0"/>
+              <a:t> API</a:t>
+            </a:r>
+          </a:p>
+          <a:p>
+            <a:pPr lvl="1"/>
+            <a:r>
+              <a:rPr lang="es-ES_tradnl" dirty="0" smtClean="0"/>
+              <a:t>Permite modificar el historial. Ideal para Web Apps</a:t>
+            </a:r>
+          </a:p>
+          <a:p>
+            <a:r>
+              <a:rPr lang="es-ES_tradnl" dirty="0" err="1" smtClean="0"/>
+              <a:t>Drag</a:t>
+            </a:r>
+            <a:r>
+              <a:rPr lang="es-ES_tradnl" dirty="0" smtClean="0"/>
+              <a:t> and </a:t>
+            </a:r>
+            <a:r>
+              <a:rPr lang="es-ES_tradnl" dirty="0" err="1" smtClean="0"/>
+              <a:t>drop</a:t>
+            </a:r>
+            <a:endParaRPr lang="es-ES_tradnl" dirty="0"/>
+          </a:p>
+          <a:p>
+            <a:pPr marL="0" indent="0">
+              <a:buNone/>
+            </a:pPr>
+            <a:endParaRPr lang="es-ES_tradnl" dirty="0" smtClean="0"/>
+          </a:p>
+          <a:p>
+            <a:endParaRPr lang="en-US" dirty="0"/>
+          </a:p>
+        </p:txBody>
+      </p:sp>
+    </p:spTree>
+    <p:extLst>
+      <p:ext uri="{BB962C8B-B14F-4D97-AF65-F5344CB8AC3E}">
+        <p14:creationId xmlns:p14="http://schemas.microsoft.com/office/powerpoint/2010/main" val="491141864"/>
       </p:ext>
     </p:extLst>
   </p:cSld>
@@ -10035,8 +9990,108 @@
           <a:p>
             <a:r>
               <a:rPr lang="es-ES_tradnl" dirty="0" smtClean="0"/>
-              <a:t>Demo CSS</a:t>
-            </a:r>
+              <a:t>CSS 3</a:t>
+            </a:r>
+            <a:endParaRPr lang="en-US" dirty="0"/>
+          </a:p>
+        </p:txBody>
+      </p:sp>
+      <p:sp>
+        <p:nvSpPr>
+          <p:cNvPr id="3" name="Content Placeholder 2"/>
+          <p:cNvSpPr>
+            <a:spLocks noGrp="1"/>
+          </p:cNvSpPr>
+          <p:nvPr>
+            <p:ph idx="1"/>
+          </p:nvPr>
+        </p:nvSpPr>
+        <p:spPr/>
+        <p:txBody>
+          <a:bodyPr/>
+          <a:lstStyle/>
+          <a:p>
+            <a:r>
+              <a:rPr lang="es-ES_tradnl" dirty="0" smtClean="0"/>
+              <a:t>Media </a:t>
+            </a:r>
+            <a:r>
+              <a:rPr lang="es-ES_tradnl" dirty="0" err="1" smtClean="0"/>
+              <a:t>Queries</a:t>
+            </a:r>
+            <a:endParaRPr lang="es-ES_tradnl" dirty="0" smtClean="0"/>
+          </a:p>
+          <a:p>
+            <a:r>
+              <a:rPr lang="es-ES_tradnl" dirty="0" smtClean="0"/>
+              <a:t>Soporte para</a:t>
+            </a:r>
+          </a:p>
+          <a:p>
+            <a:pPr lvl="1"/>
+            <a:r>
+              <a:rPr lang="es-ES_tradnl" dirty="0" err="1" smtClean="0"/>
+              <a:t>Animations</a:t>
+            </a:r>
+            <a:endParaRPr lang="es-ES_tradnl" dirty="0" smtClean="0"/>
+          </a:p>
+          <a:p>
+            <a:pPr lvl="1"/>
+            <a:r>
+              <a:rPr lang="es-ES_tradnl" dirty="0" err="1" smtClean="0"/>
+              <a:t>Transitions</a:t>
+            </a:r>
+            <a:endParaRPr lang="es-ES_tradnl" dirty="0" smtClean="0"/>
+          </a:p>
+          <a:p>
+            <a:pPr lvl="1"/>
+            <a:r>
+              <a:rPr lang="es-ES_tradnl" dirty="0" err="1" smtClean="0"/>
+              <a:t>Transformations</a:t>
+            </a:r>
+            <a:r>
+              <a:rPr lang="es-ES_tradnl" dirty="0" smtClean="0"/>
+              <a:t> (2d y 3d)</a:t>
+            </a:r>
+          </a:p>
+          <a:p>
+            <a:pPr lvl="1"/>
+            <a:r>
+              <a:rPr lang="es-ES_tradnl" dirty="0" err="1" smtClean="0"/>
+              <a:t>Gradients</a:t>
+            </a:r>
+            <a:endParaRPr lang="es-ES_tradnl" dirty="0" smtClean="0"/>
+          </a:p>
+          <a:p>
+            <a:r>
+              <a:rPr lang="es-ES_tradnl" dirty="0" smtClean="0"/>
+              <a:t>Web </a:t>
+            </a:r>
+            <a:r>
+              <a:rPr lang="es-ES_tradnl" dirty="0" err="1" smtClean="0"/>
+              <a:t>Fonts</a:t>
+            </a:r>
+            <a:endParaRPr lang="es-ES_tradnl" dirty="0" smtClean="0"/>
+          </a:p>
+          <a:p>
+            <a:r>
+              <a:rPr lang="es-ES_tradnl" dirty="0" err="1" smtClean="0"/>
+              <a:t>Pseudo</a:t>
+            </a:r>
+            <a:r>
+              <a:rPr lang="es-ES_tradnl" dirty="0" smtClean="0"/>
+              <a:t> clases y </a:t>
+            </a:r>
+            <a:r>
+              <a:rPr lang="es-ES_tradnl" dirty="0" err="1" smtClean="0"/>
+              <a:t>pseudo</a:t>
+            </a:r>
+            <a:r>
+              <a:rPr lang="es-ES_tradnl" dirty="0" smtClean="0"/>
+              <a:t> elementos</a:t>
+            </a:r>
+          </a:p>
+          <a:p>
             <a:endParaRPr lang="en-US" dirty="0"/>
           </a:p>
         </p:txBody>
@@ -10044,7 +10099,7 @@
     </p:spTree>
     <p:extLst>
       <p:ext uri="{BB962C8B-B14F-4D97-AF65-F5344CB8AC3E}">
-        <p14:creationId xmlns:p14="http://schemas.microsoft.com/office/powerpoint/2010/main" val="1343058198"/>
+        <p14:creationId xmlns:p14="http://schemas.microsoft.com/office/powerpoint/2010/main" val="413119868"/>
       </p:ext>
     </p:extLst>
   </p:cSld>
@@ -10087,114 +10142,8 @@
           <a:lstStyle/>
           <a:p>
             <a:r>
-              <a:rPr lang="es-ES_tradnl" dirty="0" err="1" smtClean="0"/>
-              <a:t>Frameworks</a:t>
-            </a:r>
-            <a:r>
-              <a:rPr lang="es-ES_tradnl" dirty="0" smtClean="0"/>
-              <a:t> CSS</a:t>
-            </a:r>
-            <a:endParaRPr lang="en-US" dirty="0"/>
-          </a:p>
-        </p:txBody>
-      </p:sp>
-      <p:sp>
-        <p:nvSpPr>
-          <p:cNvPr id="3" name="Content Placeholder 2"/>
-          <p:cNvSpPr>
-            <a:spLocks noGrp="1"/>
-          </p:cNvSpPr>
-          <p:nvPr>
-            <p:ph idx="1"/>
-          </p:nvPr>
-        </p:nvSpPr>
-        <p:spPr/>
-        <p:txBody>
-          <a:bodyPr>
-            <a:normAutofit/>
-          </a:bodyPr>
-          <a:lstStyle/>
-          <a:p>
-            <a:r>
-              <a:rPr lang="en-US" dirty="0" smtClean="0">
-                <a:hlinkClick r:id="rId3"/>
-              </a:rPr>
-              <a:t>http://www.getskeleton.com</a:t>
-            </a:r>
-            <a:r>
-              <a:rPr lang="en-US" dirty="0" smtClean="0">
-                <a:hlinkClick r:id="rId3"/>
-              </a:rPr>
-              <a:t>/</a:t>
-            </a:r>
-            <a:endParaRPr lang="es-ES_tradnl" dirty="0"/>
-          </a:p>
-          <a:p>
-            <a:r>
-              <a:rPr lang="en-US" dirty="0" smtClean="0">
-                <a:hlinkClick r:id="rId4"/>
-              </a:rPr>
-              <a:t>http://twitter.github.io/bootstrap</a:t>
-            </a:r>
-            <a:r>
-              <a:rPr lang="en-US" dirty="0" smtClean="0">
-                <a:hlinkClick r:id="rId4"/>
-              </a:rPr>
-              <a:t>/</a:t>
-            </a:r>
-            <a:endParaRPr lang="es-ES_tradnl" dirty="0"/>
-          </a:p>
-          <a:p>
-            <a:r>
-              <a:rPr lang="en-US" dirty="0">
-                <a:hlinkClick r:id="rId5"/>
-              </a:rPr>
-              <a:t>http://foundation.zurb.com</a:t>
-            </a:r>
-            <a:r>
-              <a:rPr lang="en-US" dirty="0" smtClean="0">
-                <a:hlinkClick r:id="rId5"/>
-              </a:rPr>
-              <a:t>/</a:t>
-            </a:r>
-            <a:endParaRPr lang="es-ES_tradnl" dirty="0"/>
-          </a:p>
-          <a:p>
-            <a:r>
-              <a:rPr lang="en-US" dirty="0">
-                <a:hlinkClick r:id="rId6"/>
-              </a:rPr>
-              <a:t>http://purecss.io</a:t>
-            </a:r>
-            <a:r>
-              <a:rPr lang="en-US" dirty="0" smtClean="0">
-                <a:hlinkClick r:id="rId6"/>
-              </a:rPr>
-              <a:t>/</a:t>
-            </a:r>
-            <a:endParaRPr lang="en-US" dirty="0" smtClean="0"/>
-          </a:p>
-          <a:p>
-            <a:r>
-              <a:rPr lang="en-US" dirty="0">
-                <a:hlinkClick r:id="rId7"/>
-              </a:rPr>
-              <a:t>http://960.gs</a:t>
-            </a:r>
-            <a:r>
-              <a:rPr lang="en-US" dirty="0" smtClean="0">
-                <a:hlinkClick r:id="rId7"/>
-              </a:rPr>
-              <a:t>/</a:t>
-            </a:r>
-            <a:endParaRPr lang="es-ES_tradnl" dirty="0"/>
-          </a:p>
-          <a:p>
-            <a:r>
-              <a:rPr lang="en-US" dirty="0">
-                <a:hlinkClick r:id="rId8"/>
-              </a:rPr>
-              <a:t>http://unsemantic.com/</a:t>
+              <a:rPr lang="es-ES_tradnl" dirty="0" smtClean="0"/>
+              <a:t>Demo CSS</a:t>
             </a:r>
             <a:endParaRPr lang="en-US" dirty="0"/>
           </a:p>
@@ -10203,7 +10152,7 @@
     </p:spTree>
     <p:extLst>
       <p:ext uri="{BB962C8B-B14F-4D97-AF65-F5344CB8AC3E}">
-        <p14:creationId xmlns:p14="http://schemas.microsoft.com/office/powerpoint/2010/main" val="2313433037"/>
+        <p14:creationId xmlns:p14="http://schemas.microsoft.com/office/powerpoint/2010/main" val="1343058198"/>
       </p:ext>
     </p:extLst>
   </p:cSld>
@@ -10247,7 +10196,11 @@
           <a:p>
             <a:r>
               <a:rPr lang="es-ES_tradnl" dirty="0" err="1" smtClean="0"/>
-              <a:t>Bootstrap</a:t>
+              <a:t>Frameworks</a:t>
+            </a:r>
+            <a:r>
+              <a:rPr lang="es-ES_tradnl" dirty="0" smtClean="0"/>
+              <a:t> CSS</a:t>
             </a:r>
             <a:endParaRPr lang="en-US" dirty="0"/>
           </a:p>
@@ -10265,154 +10218,80 @@
         </p:nvSpPr>
         <p:spPr/>
         <p:txBody>
-          <a:bodyPr/>
-          <a:lstStyle/>
-          <a:p>
-            <a:r>
-              <a:rPr lang="es-ES_tradnl" dirty="0" err="1" smtClean="0"/>
-              <a:t>Scaffolding</a:t>
-            </a:r>
-            <a:endParaRPr lang="es-ES_tradnl" dirty="0" smtClean="0"/>
-          </a:p>
-          <a:p>
-            <a:pPr lvl="1"/>
-            <a:r>
-              <a:rPr lang="es-ES_tradnl" dirty="0" err="1" smtClean="0"/>
-              <a:t>Grid</a:t>
-            </a:r>
-            <a:r>
-              <a:rPr lang="es-ES_tradnl" dirty="0" smtClean="0"/>
-              <a:t> </a:t>
-            </a:r>
-            <a:r>
-              <a:rPr lang="es-ES_tradnl" dirty="0" err="1" smtClean="0"/>
-              <a:t>system</a:t>
-            </a:r>
-            <a:r>
-              <a:rPr lang="es-ES_tradnl" dirty="0" smtClean="0"/>
-              <a:t>: 12 columnas</a:t>
-            </a:r>
-          </a:p>
-          <a:p>
-            <a:pPr lvl="1"/>
-            <a:r>
-              <a:rPr lang="es-ES_tradnl" dirty="0" err="1" smtClean="0"/>
-              <a:t>Layouts</a:t>
-            </a:r>
-            <a:endParaRPr lang="es-ES_tradnl" dirty="0" smtClean="0"/>
-          </a:p>
-          <a:p>
-            <a:pPr lvl="1"/>
-            <a:r>
-              <a:rPr lang="es-ES_tradnl" dirty="0" err="1" smtClean="0"/>
-              <a:t>Responsive</a:t>
-            </a:r>
-            <a:r>
-              <a:rPr lang="es-ES_tradnl" dirty="0" smtClean="0"/>
-              <a:t> </a:t>
-            </a:r>
-            <a:r>
-              <a:rPr lang="es-ES_tradnl" dirty="0" err="1" smtClean="0"/>
-              <a:t>design</a:t>
-            </a:r>
-            <a:endParaRPr lang="es-ES_tradnl" dirty="0" smtClean="0"/>
-          </a:p>
-          <a:p>
-            <a:r>
-              <a:rPr lang="es-ES_tradnl" dirty="0" smtClean="0"/>
-              <a:t>Base </a:t>
-            </a:r>
-            <a:r>
-              <a:rPr lang="es-ES_tradnl" dirty="0" err="1" smtClean="0"/>
-              <a:t>css</a:t>
-            </a:r>
-            <a:endParaRPr lang="es-ES_tradnl" dirty="0" smtClean="0"/>
-          </a:p>
-          <a:p>
-            <a:pPr lvl="1"/>
-            <a:r>
-              <a:rPr lang="es-ES_tradnl" dirty="0" err="1" smtClean="0"/>
-              <a:t>Tag</a:t>
-            </a:r>
-            <a:r>
-              <a:rPr lang="es-ES_tradnl" dirty="0" smtClean="0"/>
-              <a:t> </a:t>
-            </a:r>
-            <a:r>
-              <a:rPr lang="es-ES_tradnl" dirty="0" err="1"/>
-              <a:t>c</a:t>
-            </a:r>
-            <a:r>
-              <a:rPr lang="es-ES_tradnl" dirty="0" err="1" smtClean="0"/>
-              <a:t>ode</a:t>
-            </a:r>
-            <a:r>
-              <a:rPr lang="es-ES_tradnl" dirty="0" smtClean="0"/>
-              <a:t>, Tablas, </a:t>
-            </a:r>
-            <a:r>
-              <a:rPr lang="es-ES_tradnl" dirty="0" err="1" smtClean="0"/>
-              <a:t>forms</a:t>
-            </a:r>
-            <a:r>
-              <a:rPr lang="es-ES_tradnl" dirty="0" smtClean="0"/>
-              <a:t>, botones, imágenes e iconos</a:t>
-            </a:r>
-          </a:p>
-          <a:p>
-            <a:r>
-              <a:rPr lang="es-ES_tradnl" dirty="0" smtClean="0"/>
-              <a:t>Componentes</a:t>
-            </a:r>
-          </a:p>
-          <a:p>
-            <a:pPr lvl="1"/>
-            <a:r>
-              <a:rPr lang="es-ES_tradnl" dirty="0" smtClean="0"/>
-              <a:t>Grupos de botones, </a:t>
-            </a:r>
-            <a:r>
-              <a:rPr lang="es-ES_tradnl" dirty="0" err="1" smtClean="0"/>
-              <a:t>tabs</a:t>
-            </a:r>
-            <a:r>
-              <a:rPr lang="es-ES_tradnl" dirty="0" smtClean="0"/>
-              <a:t>, </a:t>
-            </a:r>
-            <a:r>
-              <a:rPr lang="es-ES_tradnl" dirty="0" err="1" smtClean="0"/>
-              <a:t>nav</a:t>
-            </a:r>
-            <a:r>
-              <a:rPr lang="es-ES_tradnl" dirty="0" smtClean="0"/>
-              <a:t> bar, </a:t>
-            </a:r>
-            <a:r>
-              <a:rPr lang="es-ES_tradnl" dirty="0" err="1" smtClean="0"/>
-              <a:t>dropdowns</a:t>
-            </a:r>
-            <a:r>
-              <a:rPr lang="es-ES_tradnl" dirty="0" smtClean="0"/>
-              <a:t>, </a:t>
-            </a:r>
-            <a:r>
-              <a:rPr lang="es-ES_tradnl" dirty="0" err="1" smtClean="0"/>
-              <a:t>alerts</a:t>
-            </a:r>
-            <a:r>
-              <a:rPr lang="es-ES_tradnl" dirty="0" smtClean="0"/>
-              <a:t>, </a:t>
-            </a:r>
-            <a:r>
-              <a:rPr lang="es-ES_tradnl" dirty="0" err="1" smtClean="0"/>
-              <a:t>progress</a:t>
-            </a:r>
-            <a:r>
-              <a:rPr lang="es-ES_tradnl" dirty="0" smtClean="0"/>
-              <a:t> bar, paginación, etc.</a:t>
-            </a:r>
-          </a:p>
-          <a:p>
+          <a:bodyPr>
+            <a:normAutofit/>
+          </a:bodyPr>
+          <a:lstStyle/>
+          <a:p>
+            <a:r>
+              <a:rPr lang="en-US" dirty="0" smtClean="0">
+                <a:hlinkClick r:id="rId3"/>
+              </a:rPr>
+              <a:t>http://www.getskeleton.com/</a:t>
+            </a:r>
+            <a:endParaRPr lang="es-ES_tradnl" dirty="0"/>
+          </a:p>
+          <a:p>
+            <a:r>
+              <a:rPr lang="en-US" dirty="0" smtClean="0">
+                <a:hlinkClick r:id="rId4"/>
+              </a:rPr>
+              <a:t>http://twitter.github.io/bootstrap/</a:t>
+            </a:r>
+            <a:endParaRPr lang="es-ES_tradnl" dirty="0"/>
+          </a:p>
+          <a:p>
+            <a:r>
+              <a:rPr lang="en-US" dirty="0">
+                <a:hlinkClick r:id="rId5"/>
+              </a:rPr>
+              <a:t>http://foundation.zurb.com</a:t>
+            </a:r>
+            <a:r>
+              <a:rPr lang="en-US" dirty="0" smtClean="0">
+                <a:hlinkClick r:id="rId5"/>
+              </a:rPr>
+              <a:t>/</a:t>
+            </a:r>
+            <a:endParaRPr lang="es-ES_tradnl" dirty="0"/>
+          </a:p>
+          <a:p>
+            <a:r>
+              <a:rPr lang="en-US" dirty="0">
+                <a:hlinkClick r:id="rId6"/>
+              </a:rPr>
+              <a:t>http://purecss.io</a:t>
+            </a:r>
+            <a:r>
+              <a:rPr lang="en-US" dirty="0" smtClean="0">
+                <a:hlinkClick r:id="rId6"/>
+              </a:rPr>
+              <a:t>/</a:t>
+            </a:r>
+            <a:endParaRPr lang="en-US" dirty="0" smtClean="0"/>
+          </a:p>
+          <a:p>
+            <a:r>
+              <a:rPr lang="en-US" dirty="0">
+                <a:hlinkClick r:id="rId7"/>
+              </a:rPr>
+              <a:t>http://960.gs</a:t>
+            </a:r>
+            <a:r>
+              <a:rPr lang="en-US" dirty="0" smtClean="0">
+                <a:hlinkClick r:id="rId7"/>
+              </a:rPr>
+              <a:t>/</a:t>
+            </a:r>
+            <a:endParaRPr lang="es-ES_tradnl" dirty="0"/>
+          </a:p>
+          <a:p>
+            <a:r>
+              <a:rPr lang="en-US" dirty="0">
+                <a:hlinkClick r:id="rId8"/>
+              </a:rPr>
+              <a:t>http://unsemantic.com/</a:t>
+            </a:r>
             <a:endParaRPr lang="en-US" dirty="0"/>
           </a:p>
         </p:txBody>
@@ -10420,7 +10299,7 @@
     </p:spTree>
     <p:extLst>
       <p:ext uri="{BB962C8B-B14F-4D97-AF65-F5344CB8AC3E}">
-        <p14:creationId xmlns:p14="http://schemas.microsoft.com/office/powerpoint/2010/main" val="1813128353"/>
+        <p14:creationId xmlns:p14="http://schemas.microsoft.com/office/powerpoint/2010/main" val="2313433037"/>
       </p:ext>
     </p:extLst>
   </p:cSld>
@@ -10463,13 +10342,173 @@
           <a:lstStyle/>
           <a:p>
             <a:r>
-              <a:rPr lang="es-ES_tradnl" dirty="0" smtClean="0"/>
-              <a:t>Demo </a:t>
-            </a:r>
-            <a:r>
               <a:rPr lang="es-ES_tradnl" dirty="0" err="1" smtClean="0"/>
               <a:t>Bootstrap</a:t>
             </a:r>
+            <a:endParaRPr lang="en-US" dirty="0"/>
+          </a:p>
+        </p:txBody>
+      </p:sp>
+      <p:sp>
+        <p:nvSpPr>
+          <p:cNvPr id="3" name="Content Placeholder 2"/>
+          <p:cNvSpPr>
+            <a:spLocks noGrp="1"/>
+          </p:cNvSpPr>
+          <p:nvPr>
+            <p:ph idx="1"/>
+          </p:nvPr>
+        </p:nvSpPr>
+        <p:spPr/>
+        <p:txBody>
+          <a:bodyPr/>
+          <a:lstStyle/>
+          <a:p>
+            <a:r>
+              <a:rPr lang="es-ES_tradnl" dirty="0" err="1" smtClean="0"/>
+              <a:t>Scaffolding</a:t>
+            </a:r>
+            <a:endParaRPr lang="es-ES_tradnl" dirty="0" smtClean="0"/>
+          </a:p>
+          <a:p>
+            <a:pPr lvl="1"/>
+            <a:r>
+              <a:rPr lang="es-ES_tradnl" dirty="0" err="1" smtClean="0"/>
+              <a:t>Grid</a:t>
+            </a:r>
+            <a:r>
+              <a:rPr lang="es-ES_tradnl" dirty="0" smtClean="0"/>
+              <a:t> </a:t>
+            </a:r>
+            <a:r>
+              <a:rPr lang="es-ES_tradnl" dirty="0" err="1" smtClean="0"/>
+              <a:t>system</a:t>
+            </a:r>
+            <a:r>
+              <a:rPr lang="es-ES_tradnl" dirty="0" smtClean="0"/>
+              <a:t>: 12 columnas</a:t>
+            </a:r>
+          </a:p>
+          <a:p>
+            <a:pPr lvl="1"/>
+            <a:r>
+              <a:rPr lang="es-ES_tradnl" dirty="0" err="1" smtClean="0"/>
+              <a:t>Layouts</a:t>
+            </a:r>
+            <a:endParaRPr lang="es-ES_tradnl" dirty="0" smtClean="0"/>
+          </a:p>
+          <a:p>
+            <a:pPr lvl="1"/>
+            <a:r>
+              <a:rPr lang="es-ES_tradnl" dirty="0" err="1" smtClean="0"/>
+              <a:t>Responsive</a:t>
+            </a:r>
+            <a:r>
+              <a:rPr lang="es-ES_tradnl" dirty="0" smtClean="0"/>
+              <a:t> </a:t>
+            </a:r>
+            <a:r>
+              <a:rPr lang="es-ES_tradnl" dirty="0" err="1" smtClean="0"/>
+              <a:t>design</a:t>
+            </a:r>
+            <a:endParaRPr lang="es-ES_tradnl" dirty="0" smtClean="0"/>
+          </a:p>
+          <a:p>
+            <a:r>
+              <a:rPr lang="es-ES_tradnl" dirty="0" smtClean="0"/>
+              <a:t>Base </a:t>
+            </a:r>
+            <a:r>
+              <a:rPr lang="es-ES_tradnl" dirty="0" err="1" smtClean="0"/>
+              <a:t>css</a:t>
+            </a:r>
+            <a:endParaRPr lang="es-ES_tradnl" dirty="0" smtClean="0"/>
+          </a:p>
+          <a:p>
+            <a:pPr lvl="1"/>
+            <a:r>
+              <a:rPr lang="es-ES_tradnl" dirty="0" err="1" smtClean="0"/>
+              <a:t>Tag</a:t>
+            </a:r>
+            <a:r>
+              <a:rPr lang="es-ES_tradnl" dirty="0" smtClean="0"/>
+              <a:t> </a:t>
+            </a:r>
+            <a:r>
+              <a:rPr lang="es-ES_tradnl" dirty="0" err="1"/>
+              <a:t>c</a:t>
+            </a:r>
+            <a:r>
+              <a:rPr lang="es-ES_tradnl" dirty="0" err="1" smtClean="0"/>
+              <a:t>ode</a:t>
+            </a:r>
+            <a:r>
+              <a:rPr lang="es-ES_tradnl" dirty="0" smtClean="0"/>
+              <a:t>, Tablas, </a:t>
+            </a:r>
+            <a:r>
+              <a:rPr lang="es-ES_tradnl" dirty="0" err="1" smtClean="0"/>
+              <a:t>forms</a:t>
+            </a:r>
+            <a:r>
+              <a:rPr lang="es-ES_tradnl" dirty="0" smtClean="0"/>
+              <a:t>, botones, imágenes e iconos</a:t>
+            </a:r>
+          </a:p>
+          <a:p>
+            <a:r>
+              <a:rPr lang="es-ES_tradnl" dirty="0" smtClean="0"/>
+              <a:t>Componentes</a:t>
+            </a:r>
+          </a:p>
+          <a:p>
+            <a:pPr lvl="1"/>
+            <a:r>
+              <a:rPr lang="es-ES_tradnl" dirty="0" smtClean="0"/>
+              <a:t>Grupos de botones, </a:t>
+            </a:r>
+            <a:r>
+              <a:rPr lang="es-ES_tradnl" dirty="0" err="1" smtClean="0"/>
+              <a:t>tabs</a:t>
+            </a:r>
+            <a:r>
+              <a:rPr lang="es-ES_tradnl" dirty="0" smtClean="0"/>
+              <a:t>, </a:t>
+            </a:r>
+            <a:r>
+              <a:rPr lang="es-ES_tradnl" dirty="0" err="1" smtClean="0"/>
+              <a:t>nav</a:t>
+            </a:r>
+            <a:r>
+              <a:rPr lang="es-ES_tradnl" dirty="0" smtClean="0"/>
+              <a:t> bar, </a:t>
+            </a:r>
+            <a:r>
+              <a:rPr lang="es-ES_tradnl" dirty="0" err="1" smtClean="0"/>
+              <a:t>dropdowns</a:t>
+            </a:r>
+            <a:r>
+              <a:rPr lang="es-ES_tradnl" dirty="0" smtClean="0"/>
+              <a:t>, </a:t>
+            </a:r>
+            <a:r>
+              <a:rPr lang="es-ES_tradnl" dirty="0" err="1" smtClean="0"/>
+              <a:t>alerts</a:t>
+            </a:r>
+            <a:r>
+              <a:rPr lang="es-ES_tradnl" dirty="0" smtClean="0"/>
+              <a:t>, </a:t>
+            </a:r>
+            <a:r>
+              <a:rPr lang="es-ES_tradnl" dirty="0" err="1" smtClean="0"/>
+              <a:t>progress</a:t>
+            </a:r>
+            <a:r>
+              <a:rPr lang="es-ES_tradnl" dirty="0" smtClean="0"/>
+              <a:t> bar, paginación, etc.</a:t>
+            </a:r>
+          </a:p>
+          <a:p>
             <a:endParaRPr lang="en-US" dirty="0"/>
           </a:p>
         </p:txBody>
@@ -10477,7 +10516,7 @@
     </p:spTree>
     <p:extLst>
       <p:ext uri="{BB962C8B-B14F-4D97-AF65-F5344CB8AC3E}">
-        <p14:creationId xmlns:p14="http://schemas.microsoft.com/office/powerpoint/2010/main" val="442459297"/>
+        <p14:creationId xmlns:p14="http://schemas.microsoft.com/office/powerpoint/2010/main" val="1813128353"/>
       </p:ext>
     </p:extLst>
   </p:cSld>
@@ -10521,6 +10560,63 @@
           <a:p>
             <a:r>
               <a:rPr lang="es-ES_tradnl" dirty="0" smtClean="0"/>
+              <a:t>Demo </a:t>
+            </a:r>
+            <a:r>
+              <a:rPr lang="es-ES_tradnl" dirty="0" err="1" smtClean="0"/>
+              <a:t>Bootstrap</a:t>
+            </a:r>
+            <a:endParaRPr lang="en-US" dirty="0"/>
+          </a:p>
+        </p:txBody>
+      </p:sp>
+    </p:spTree>
+    <p:extLst>
+      <p:ext uri="{BB962C8B-B14F-4D97-AF65-F5344CB8AC3E}">
+        <p14:creationId xmlns:p14="http://schemas.microsoft.com/office/powerpoint/2010/main" val="442459297"/>
+      </p:ext>
+    </p:extLst>
+  </p:cSld>
+  <p:clrMapOvr>
+    <a:masterClrMapping/>
+  </p:clrMapOvr>
+</p:sld>
+</file>
+
+<file path=ppt/slides/slide38.xml><?xml version="1.0" encoding="utf-8"?>
+<p:sld xmlns:a="http://schemas.openxmlformats.org/drawingml/2006/main" xmlns:r="http://schemas.openxmlformats.org/officeDocument/2006/relationships" xmlns:p="http://schemas.openxmlformats.org/presentationml/2006/main">
+  <p:cSld>
+    <p:spTree>
+      <p:nvGrpSpPr>
+        <p:cNvPr id="1" name=""/>
+        <p:cNvGrpSpPr/>
+        <p:nvPr/>
+      </p:nvGrpSpPr>
+      <p:grpSpPr>
+        <a:xfrm>
+          <a:off x="0" y="0"/>
+          <a:ext cx="0" cy="0"/>
+          <a:chOff x="0" y="0"/>
+          <a:chExt cx="0" cy="0"/>
+        </a:xfrm>
+      </p:grpSpPr>
+      <p:sp>
+        <p:nvSpPr>
+          <p:cNvPr id="2" name="Title 1"/>
+          <p:cNvSpPr>
+            <a:spLocks noGrp="1"/>
+          </p:cNvSpPr>
+          <p:nvPr>
+            <p:ph type="title"/>
+          </p:nvPr>
+        </p:nvSpPr>
+        <p:spPr/>
+        <p:txBody>
+          <a:bodyPr/>
+          <a:lstStyle/>
+          <a:p>
+            <a:r>
+              <a:rPr lang="es-ES_tradnl" dirty="0" smtClean="0"/>
               <a:t>Preprocesadores CSS</a:t>
             </a:r>
             <a:endParaRPr lang="en-US" dirty="0"/>
@@ -10617,7 +10713,7 @@
 </p:sld>
 </file>
 
-<file path=ppt/slides/slide38.xml><?xml version="1.0" encoding="utf-8"?>
+<file path=ppt/slides/slide39.xml><?xml version="1.0" encoding="utf-8"?>
 <p:sld xmlns:a="http://schemas.openxmlformats.org/drawingml/2006/main" xmlns:r="http://schemas.openxmlformats.org/officeDocument/2006/relationships" xmlns:p="http://schemas.openxmlformats.org/presentationml/2006/main">
   <p:cSld>
     <p:spTree>

</xml_diff>

<commit_message>
# Arreglo de diapositivas
</commit_message>
<xml_diff>
--- a/Slides/Clase.pptx
+++ b/Slides/Clase.pptx
@@ -250,7 +250,7 @@
           <a:p>
             <a:fld id="{7BA71279-A592-4655-B490-FD6D69922214}" type="datetimeFigureOut">
               <a:rPr lang="en-US" smtClean="0"/>
-              <a:t>6/13/2013</a:t>
+              <a:t>6/16/2013</a:t>
             </a:fld>
             <a:endParaRPr lang="en-US"/>
           </a:p>
@@ -415,7 +415,7 @@
           <a:p>
             <a:fld id="{9EE80FC8-2411-480F-8805-F0ECF3A4843D}" type="datetimeFigureOut">
               <a:rPr lang="en-US" smtClean="0"/>
-              <a:t>6/13/2013</a:t>
+              <a:t>6/16/2013</a:t>
             </a:fld>
             <a:endParaRPr lang="en-US"/>
           </a:p>
@@ -881,7 +881,6 @@
               <a:rPr lang="en-US" dirty="0"/>
               <a:t>-based discussion boards. The invention of HTML made use of a model of content stored on a central server that could be transferred and displayed on a local workstation via a browser. It simplified access to content and enabled the display of "rich" content (such as sophisticated text formatting and the display of images).</a:t>
             </a:r>
-            <a:endParaRPr lang="en-US" dirty="0"/>
           </a:p>
         </p:txBody>
       </p:sp>
@@ -1706,7 +1705,7 @@
           <a:p>
             <a:fld id="{8C91A079-CAE8-47E0-8427-4BEC14467E6E}" type="datetimeFigureOut">
               <a:rPr lang="en-US" smtClean="0"/>
-              <a:t>6/13/2013</a:t>
+              <a:t>6/16/2013</a:t>
             </a:fld>
             <a:endParaRPr lang="en-US"/>
           </a:p>
@@ -1876,7 +1875,7 @@
           <a:p>
             <a:fld id="{8C91A079-CAE8-47E0-8427-4BEC14467E6E}" type="datetimeFigureOut">
               <a:rPr lang="en-US" smtClean="0"/>
-              <a:t>6/13/2013</a:t>
+              <a:t>6/16/2013</a:t>
             </a:fld>
             <a:endParaRPr lang="en-US"/>
           </a:p>
@@ -2056,7 +2055,7 @@
           <a:p>
             <a:fld id="{8C91A079-CAE8-47E0-8427-4BEC14467E6E}" type="datetimeFigureOut">
               <a:rPr lang="en-US" smtClean="0"/>
-              <a:t>6/13/2013</a:t>
+              <a:t>6/16/2013</a:t>
             </a:fld>
             <a:endParaRPr lang="en-US"/>
           </a:p>
@@ -2226,7 +2225,7 @@
           <a:p>
             <a:fld id="{8C91A079-CAE8-47E0-8427-4BEC14467E6E}" type="datetimeFigureOut">
               <a:rPr lang="en-US" smtClean="0"/>
-              <a:t>6/13/2013</a:t>
+              <a:t>6/16/2013</a:t>
             </a:fld>
             <a:endParaRPr lang="en-US"/>
           </a:p>
@@ -2472,7 +2471,7 @@
           <a:p>
             <a:fld id="{8C91A079-CAE8-47E0-8427-4BEC14467E6E}" type="datetimeFigureOut">
               <a:rPr lang="en-US" smtClean="0"/>
-              <a:t>6/13/2013</a:t>
+              <a:t>6/16/2013</a:t>
             </a:fld>
             <a:endParaRPr lang="en-US"/>
           </a:p>
@@ -2704,7 +2703,7 @@
           <a:p>
             <a:fld id="{8C91A079-CAE8-47E0-8427-4BEC14467E6E}" type="datetimeFigureOut">
               <a:rPr lang="en-US" smtClean="0"/>
-              <a:t>6/13/2013</a:t>
+              <a:t>6/16/2013</a:t>
             </a:fld>
             <a:endParaRPr lang="en-US"/>
           </a:p>
@@ -3071,7 +3070,7 @@
           <a:p>
             <a:fld id="{8C91A079-CAE8-47E0-8427-4BEC14467E6E}" type="datetimeFigureOut">
               <a:rPr lang="en-US" smtClean="0"/>
-              <a:t>6/13/2013</a:t>
+              <a:t>6/16/2013</a:t>
             </a:fld>
             <a:endParaRPr lang="en-US"/>
           </a:p>
@@ -3189,7 +3188,7 @@
           <a:p>
             <a:fld id="{8C91A079-CAE8-47E0-8427-4BEC14467E6E}" type="datetimeFigureOut">
               <a:rPr lang="en-US" smtClean="0"/>
-              <a:t>6/13/2013</a:t>
+              <a:t>6/16/2013</a:t>
             </a:fld>
             <a:endParaRPr lang="en-US"/>
           </a:p>
@@ -3284,7 +3283,7 @@
           <a:p>
             <a:fld id="{8C91A079-CAE8-47E0-8427-4BEC14467E6E}" type="datetimeFigureOut">
               <a:rPr lang="en-US" smtClean="0"/>
-              <a:t>6/13/2013</a:t>
+              <a:t>6/16/2013</a:t>
             </a:fld>
             <a:endParaRPr lang="en-US"/>
           </a:p>
@@ -3561,7 +3560,7 @@
           <a:p>
             <a:fld id="{8C91A079-CAE8-47E0-8427-4BEC14467E6E}" type="datetimeFigureOut">
               <a:rPr lang="en-US" smtClean="0"/>
-              <a:t>6/13/2013</a:t>
+              <a:t>6/16/2013</a:t>
             </a:fld>
             <a:endParaRPr lang="en-US"/>
           </a:p>
@@ -3814,7 +3813,7 @@
           <a:p>
             <a:fld id="{8C91A079-CAE8-47E0-8427-4BEC14467E6E}" type="datetimeFigureOut">
               <a:rPr lang="en-US" smtClean="0"/>
-              <a:t>6/13/2013</a:t>
+              <a:t>6/16/2013</a:t>
             </a:fld>
             <a:endParaRPr lang="en-US"/>
           </a:p>
@@ -4027,7 +4026,7 @@
           <a:p>
             <a:fld id="{8C91A079-CAE8-47E0-8427-4BEC14467E6E}" type="datetimeFigureOut">
               <a:rPr lang="en-US" smtClean="0"/>
-              <a:t>6/13/2013</a:t>
+              <a:t>6/16/2013</a:t>
             </a:fld>
             <a:endParaRPr lang="en-US"/>
           </a:p>
@@ -9292,7 +9291,7 @@
             <a:pPr algn="ctr"/>
             <a:r>
               <a:rPr lang="es-ES_tradnl" sz="3200" dirty="0" err="1" smtClean="0"/>
-              <a:t>Padding</a:t>
+              <a:t>Border</a:t>
             </a:r>
             <a:endParaRPr lang="en-US" sz="3200" dirty="0"/>
           </a:p>
@@ -9335,8 +9334,8 @@
           <a:p>
             <a:pPr algn="ctr"/>
             <a:r>
-              <a:rPr lang="es-ES_tradnl" sz="3200" dirty="0" err="1" smtClean="0"/>
-              <a:t>Border</a:t>
+              <a:rPr lang="es-ES_tradnl" sz="3200" dirty="0" err="1"/>
+              <a:t>Padding</a:t>
             </a:r>
             <a:endParaRPr lang="en-US" sz="3200" dirty="0"/>
           </a:p>

</xml_diff>

<commit_message>
# Retocadas algunas notas
</commit_message>
<xml_diff>
--- a/Slides/Clase.pptx
+++ b/Slides/Clase.pptx
@@ -1196,22 +1196,6 @@
           <a:bodyPr/>
           <a:lstStyle/>
           <a:p>
-            <a:r>
-              <a:rPr lang="es-ES_tradnl" dirty="0" err="1" smtClean="0"/>
-              <a:t>Td</a:t>
-            </a:r>
-            <a:r>
-              <a:rPr lang="es-ES_tradnl" dirty="0" smtClean="0"/>
-              <a:t> : </a:t>
-            </a:r>
-            <a:r>
-              <a:rPr lang="es-ES_tradnl" dirty="0" err="1" smtClean="0"/>
-              <a:t>table</a:t>
-            </a:r>
-            <a:r>
-              <a:rPr lang="es-ES_tradnl" dirty="0" smtClean="0"/>
-              <a:t> data</a:t>
-            </a:r>
             <a:endParaRPr lang="en-US" dirty="0"/>
           </a:p>
         </p:txBody>
@@ -1295,48 +1279,6 @@
         <p:txBody>
           <a:bodyPr/>
           <a:lstStyle/>
-          <a:p>
-            <a:pPr defTabSz="924458">
-              <a:defRPr/>
-            </a:pPr>
-            <a:r>
-              <a:rPr lang="es-ES_tradnl" dirty="0" err="1" smtClean="0"/>
-              <a:t>Margin</a:t>
-            </a:r>
-            <a:r>
-              <a:rPr lang="es-ES_tradnl" dirty="0" smtClean="0"/>
-              <a:t>, </a:t>
-            </a:r>
-            <a:r>
-              <a:rPr lang="es-ES_tradnl" dirty="0" err="1" smtClean="0"/>
-              <a:t>border</a:t>
-            </a:r>
-            <a:r>
-              <a:rPr lang="es-ES_tradnl" dirty="0" smtClean="0"/>
-              <a:t>, </a:t>
-            </a:r>
-            <a:r>
-              <a:rPr lang="es-ES_tradnl" dirty="0" err="1" smtClean="0"/>
-              <a:t>padding</a:t>
-            </a:r>
-            <a:r>
-              <a:rPr lang="es-ES_tradnl" dirty="0" smtClean="0"/>
-              <a:t>, </a:t>
-            </a:r>
-            <a:r>
-              <a:rPr lang="es-ES_tradnl" dirty="0" err="1" smtClean="0"/>
-              <a:t>height</a:t>
-            </a:r>
-            <a:r>
-              <a:rPr lang="es-ES_tradnl" dirty="0" smtClean="0"/>
-              <a:t> &amp; </a:t>
-            </a:r>
-            <a:r>
-              <a:rPr lang="es-ES_tradnl" dirty="0" err="1" smtClean="0"/>
-              <a:t>width</a:t>
-            </a:r>
-            <a:endParaRPr lang="en-US" dirty="0" smtClean="0"/>
-          </a:p>
           <a:p>
             <a:endParaRPr lang="en-US" dirty="0"/>
           </a:p>

</xml_diff>